<commit_message>
Edits image for better visibility
</commit_message>
<xml_diff>
--- a/misc_files/project_slides.pptx
+++ b/misc_files/project_slides.pptx
@@ -107,15 +107,1488 @@
       </a:defRPr>
     </a:lvl9pPr>
   </p:defaultTextStyle>
+  <p:extLst>
+    <p:ext uri="{EFAFB233-063F-42B5-8137-9DF3F51BA10A}">
+      <p15:sldGuideLst xmlns:p15="http://schemas.microsoft.com/office/powerpoint/2012/main"/>
+    </p:ext>
+  </p:extLst>
 </p:presentation>
 </file>
 
 <file path=ppt/revisionInfo.xml><?xml version="1.0" encoding="utf-8"?>
 <p1510:revInfo xmlns:a="http://schemas.openxmlformats.org/drawingml/2006/main" xmlns:r="http://schemas.openxmlformats.org/officeDocument/2006/relationships" xmlns:p1510="http://schemas.microsoft.com/office/powerpoint/2015/10/main">
   <p1510:revLst>
-    <p1510:client id="{5D13D954-F149-3944-BE6D-5630D4E0E09B}" v="6" dt="2021-02-02T15:41:03.655"/>
+    <p1510:client id="{5D13D954-F149-3944-BE6D-5630D4E0E09B}" v="14" dt="2021-02-02T15:57:17.464"/>
   </p1510:revLst>
 </p1510:revInfo>
+</file>
+
+<file path=ppt/changesInfos/changesInfo1.xml><?xml version="1.0" encoding="utf-8"?>
+<pc:chgInfo xmlns:a="http://schemas.openxmlformats.org/drawingml/2006/main" xmlns:r="http://schemas.openxmlformats.org/officeDocument/2006/relationships" xmlns:ac="http://schemas.microsoft.com/office/drawing/2013/main/command" xmlns:pc="http://schemas.microsoft.com/office/powerpoint/2013/main/command">
+  <pc:docChgLst>
+    <pc:chgData name="NIKHIL SAWAL" userId="c8dee9c8a82970a7" providerId="LiveId" clId="{5D13D954-F149-3944-BE6D-5630D4E0E09B}"/>
+    <pc:docChg chg="undo custSel modSld">
+      <pc:chgData name="NIKHIL SAWAL" userId="c8dee9c8a82970a7" providerId="LiveId" clId="{5D13D954-F149-3944-BE6D-5630D4E0E09B}" dt="2021-02-02T15:57:17.464" v="15" actId="164"/>
+      <pc:docMkLst>
+        <pc:docMk/>
+      </pc:docMkLst>
+      <pc:sldChg chg="addSp delSp modSp mod">
+        <pc:chgData name="NIKHIL SAWAL" userId="c8dee9c8a82970a7" providerId="LiveId" clId="{5D13D954-F149-3944-BE6D-5630D4E0E09B}" dt="2021-02-02T15:56:53.473" v="10" actId="165"/>
+        <pc:sldMkLst>
+          <pc:docMk/>
+          <pc:sldMk cId="1926175025" sldId="257"/>
+        </pc:sldMkLst>
+        <pc:spChg chg="mod topLvl">
+          <ac:chgData name="NIKHIL SAWAL" userId="c8dee9c8a82970a7" providerId="LiveId" clId="{5D13D954-F149-3944-BE6D-5630D4E0E09B}" dt="2021-02-02T15:56:53.473" v="10" actId="165"/>
+          <ac:spMkLst>
+            <pc:docMk/>
+            <pc:sldMk cId="1926175025" sldId="257"/>
+            <ac:spMk id="5" creationId="{9CF49FA6-6F28-F842-A7BB-850779772B12}"/>
+          </ac:spMkLst>
+        </pc:spChg>
+        <pc:spChg chg="mod topLvl">
+          <ac:chgData name="NIKHIL SAWAL" userId="c8dee9c8a82970a7" providerId="LiveId" clId="{5D13D954-F149-3944-BE6D-5630D4E0E09B}" dt="2021-02-02T15:56:53.473" v="10" actId="165"/>
+          <ac:spMkLst>
+            <pc:docMk/>
+            <pc:sldMk cId="1926175025" sldId="257"/>
+            <ac:spMk id="6" creationId="{1934F85D-03F1-0347-ADFE-B03A0DA65C99}"/>
+          </ac:spMkLst>
+        </pc:spChg>
+        <pc:spChg chg="mod topLvl">
+          <ac:chgData name="NIKHIL SAWAL" userId="c8dee9c8a82970a7" providerId="LiveId" clId="{5D13D954-F149-3944-BE6D-5630D4E0E09B}" dt="2021-02-02T15:56:53.473" v="10" actId="165"/>
+          <ac:spMkLst>
+            <pc:docMk/>
+            <pc:sldMk cId="1926175025" sldId="257"/>
+            <ac:spMk id="7" creationId="{4C86EF03-9205-584B-B210-B7F24CFF5A59}"/>
+          </ac:spMkLst>
+        </pc:spChg>
+        <pc:spChg chg="mod topLvl">
+          <ac:chgData name="NIKHIL SAWAL" userId="c8dee9c8a82970a7" providerId="LiveId" clId="{5D13D954-F149-3944-BE6D-5630D4E0E09B}" dt="2021-02-02T15:56:53.473" v="10" actId="165"/>
+          <ac:spMkLst>
+            <pc:docMk/>
+            <pc:sldMk cId="1926175025" sldId="257"/>
+            <ac:spMk id="8" creationId="{62485611-812B-4947-A3FD-EA2DEF0F751C}"/>
+          </ac:spMkLst>
+        </pc:spChg>
+        <pc:spChg chg="mod topLvl">
+          <ac:chgData name="NIKHIL SAWAL" userId="c8dee9c8a82970a7" providerId="LiveId" clId="{5D13D954-F149-3944-BE6D-5630D4E0E09B}" dt="2021-02-02T15:56:53.473" v="10" actId="165"/>
+          <ac:spMkLst>
+            <pc:docMk/>
+            <pc:sldMk cId="1926175025" sldId="257"/>
+            <ac:spMk id="9" creationId="{B55DC232-A203-6E46-8C66-FFE475CCDB44}"/>
+          </ac:spMkLst>
+        </pc:spChg>
+        <pc:spChg chg="mod topLvl">
+          <ac:chgData name="NIKHIL SAWAL" userId="c8dee9c8a82970a7" providerId="LiveId" clId="{5D13D954-F149-3944-BE6D-5630D4E0E09B}" dt="2021-02-02T15:56:53.473" v="10" actId="165"/>
+          <ac:spMkLst>
+            <pc:docMk/>
+            <pc:sldMk cId="1926175025" sldId="257"/>
+            <ac:spMk id="10" creationId="{464A887D-E070-A84B-B4B6-3F7983549A68}"/>
+          </ac:spMkLst>
+        </pc:spChg>
+        <pc:spChg chg="mod topLvl">
+          <ac:chgData name="NIKHIL SAWAL" userId="c8dee9c8a82970a7" providerId="LiveId" clId="{5D13D954-F149-3944-BE6D-5630D4E0E09B}" dt="2021-02-02T15:56:53.473" v="10" actId="165"/>
+          <ac:spMkLst>
+            <pc:docMk/>
+            <pc:sldMk cId="1926175025" sldId="257"/>
+            <ac:spMk id="11" creationId="{A477097B-7026-BA4B-ADB0-3ABB35E058FF}"/>
+          </ac:spMkLst>
+        </pc:spChg>
+        <pc:spChg chg="mod topLvl">
+          <ac:chgData name="NIKHIL SAWAL" userId="c8dee9c8a82970a7" providerId="LiveId" clId="{5D13D954-F149-3944-BE6D-5630D4E0E09B}" dt="2021-02-02T15:56:53.473" v="10" actId="165"/>
+          <ac:spMkLst>
+            <pc:docMk/>
+            <pc:sldMk cId="1926175025" sldId="257"/>
+            <ac:spMk id="12" creationId="{86DF0E3A-7378-874A-8A36-9FE6DCD18E10}"/>
+          </ac:spMkLst>
+        </pc:spChg>
+        <pc:spChg chg="mod topLvl">
+          <ac:chgData name="NIKHIL SAWAL" userId="c8dee9c8a82970a7" providerId="LiveId" clId="{5D13D954-F149-3944-BE6D-5630D4E0E09B}" dt="2021-02-02T15:56:53.473" v="10" actId="165"/>
+          <ac:spMkLst>
+            <pc:docMk/>
+            <pc:sldMk cId="1926175025" sldId="257"/>
+            <ac:spMk id="13" creationId="{6CF7F6FF-835C-CE49-8AAF-D4B88347BEC8}"/>
+          </ac:spMkLst>
+        </pc:spChg>
+        <pc:spChg chg="mod topLvl">
+          <ac:chgData name="NIKHIL SAWAL" userId="c8dee9c8a82970a7" providerId="LiveId" clId="{5D13D954-F149-3944-BE6D-5630D4E0E09B}" dt="2021-02-02T15:56:53.473" v="10" actId="165"/>
+          <ac:spMkLst>
+            <pc:docMk/>
+            <pc:sldMk cId="1926175025" sldId="257"/>
+            <ac:spMk id="14" creationId="{BF69B04A-CE9D-354B-8FA8-9F8F8CD10F99}"/>
+          </ac:spMkLst>
+        </pc:spChg>
+        <pc:spChg chg="mod topLvl">
+          <ac:chgData name="NIKHIL SAWAL" userId="c8dee9c8a82970a7" providerId="LiveId" clId="{5D13D954-F149-3944-BE6D-5630D4E0E09B}" dt="2021-02-02T15:56:53.473" v="10" actId="165"/>
+          <ac:spMkLst>
+            <pc:docMk/>
+            <pc:sldMk cId="1926175025" sldId="257"/>
+            <ac:spMk id="50" creationId="{52F92229-01A9-3443-8D12-1CE5BD8A7A3F}"/>
+          </ac:spMkLst>
+        </pc:spChg>
+        <pc:spChg chg="mod topLvl">
+          <ac:chgData name="NIKHIL SAWAL" userId="c8dee9c8a82970a7" providerId="LiveId" clId="{5D13D954-F149-3944-BE6D-5630D4E0E09B}" dt="2021-02-02T15:56:53.473" v="10" actId="165"/>
+          <ac:spMkLst>
+            <pc:docMk/>
+            <pc:sldMk cId="1926175025" sldId="257"/>
+            <ac:spMk id="69" creationId="{5AAAA6DD-E5E0-514E-8FEE-6BE0545C942E}"/>
+          </ac:spMkLst>
+        </pc:spChg>
+        <pc:spChg chg="mod topLvl">
+          <ac:chgData name="NIKHIL SAWAL" userId="c8dee9c8a82970a7" providerId="LiveId" clId="{5D13D954-F149-3944-BE6D-5630D4E0E09B}" dt="2021-02-02T15:56:53.473" v="10" actId="165"/>
+          <ac:spMkLst>
+            <pc:docMk/>
+            <pc:sldMk cId="1926175025" sldId="257"/>
+            <ac:spMk id="87" creationId="{290B428C-2078-1D47-A0D7-E58FA3FD693D}"/>
+          </ac:spMkLst>
+        </pc:spChg>
+        <pc:spChg chg="mod topLvl">
+          <ac:chgData name="NIKHIL SAWAL" userId="c8dee9c8a82970a7" providerId="LiveId" clId="{5D13D954-F149-3944-BE6D-5630D4E0E09B}" dt="2021-02-02T15:56:53.473" v="10" actId="165"/>
+          <ac:spMkLst>
+            <pc:docMk/>
+            <pc:sldMk cId="1926175025" sldId="257"/>
+            <ac:spMk id="104" creationId="{9B45ED95-5F34-EA49-B9ED-44D918B29AF6}"/>
+          </ac:spMkLst>
+        </pc:spChg>
+        <pc:spChg chg="mod topLvl">
+          <ac:chgData name="NIKHIL SAWAL" userId="c8dee9c8a82970a7" providerId="LiveId" clId="{5D13D954-F149-3944-BE6D-5630D4E0E09B}" dt="2021-02-02T15:56:53.473" v="10" actId="165"/>
+          <ac:spMkLst>
+            <pc:docMk/>
+            <pc:sldMk cId="1926175025" sldId="257"/>
+            <ac:spMk id="112" creationId="{E3ADC016-B89E-5D46-B934-3F63B4F3E2B1}"/>
+          </ac:spMkLst>
+        </pc:spChg>
+        <pc:spChg chg="mod topLvl">
+          <ac:chgData name="NIKHIL SAWAL" userId="c8dee9c8a82970a7" providerId="LiveId" clId="{5D13D954-F149-3944-BE6D-5630D4E0E09B}" dt="2021-02-02T15:56:53.473" v="10" actId="165"/>
+          <ac:spMkLst>
+            <pc:docMk/>
+            <pc:sldMk cId="1926175025" sldId="257"/>
+            <ac:spMk id="113" creationId="{BE5BE2E1-4A6D-CC46-908B-BA2E81F121DA}"/>
+          </ac:spMkLst>
+        </pc:spChg>
+        <pc:spChg chg="mod topLvl">
+          <ac:chgData name="NIKHIL SAWAL" userId="c8dee9c8a82970a7" providerId="LiveId" clId="{5D13D954-F149-3944-BE6D-5630D4E0E09B}" dt="2021-02-02T15:56:53.473" v="10" actId="165"/>
+          <ac:spMkLst>
+            <pc:docMk/>
+            <pc:sldMk cId="1926175025" sldId="257"/>
+            <ac:spMk id="114" creationId="{9552DBD7-4A44-F14A-91FF-1D73FE059C10}"/>
+          </ac:spMkLst>
+        </pc:spChg>
+        <pc:spChg chg="mod topLvl">
+          <ac:chgData name="NIKHIL SAWAL" userId="c8dee9c8a82970a7" providerId="LiveId" clId="{5D13D954-F149-3944-BE6D-5630D4E0E09B}" dt="2021-02-02T15:56:53.473" v="10" actId="165"/>
+          <ac:spMkLst>
+            <pc:docMk/>
+            <pc:sldMk cId="1926175025" sldId="257"/>
+            <ac:spMk id="115" creationId="{25265826-5177-FC40-89EA-8C0B40449714}"/>
+          </ac:spMkLst>
+        </pc:spChg>
+        <pc:spChg chg="mod topLvl">
+          <ac:chgData name="NIKHIL SAWAL" userId="c8dee9c8a82970a7" providerId="LiveId" clId="{5D13D954-F149-3944-BE6D-5630D4E0E09B}" dt="2021-02-02T15:56:53.473" v="10" actId="165"/>
+          <ac:spMkLst>
+            <pc:docMk/>
+            <pc:sldMk cId="1926175025" sldId="257"/>
+            <ac:spMk id="131" creationId="{BD2F9440-575F-7443-97EB-6448E33C08E9}"/>
+          </ac:spMkLst>
+        </pc:spChg>
+        <pc:spChg chg="mod topLvl">
+          <ac:chgData name="NIKHIL SAWAL" userId="c8dee9c8a82970a7" providerId="LiveId" clId="{5D13D954-F149-3944-BE6D-5630D4E0E09B}" dt="2021-02-02T15:56:53.473" v="10" actId="165"/>
+          <ac:spMkLst>
+            <pc:docMk/>
+            <pc:sldMk cId="1926175025" sldId="257"/>
+            <ac:spMk id="132" creationId="{EE873E4B-1C73-A747-A149-3B7309FEAB5A}"/>
+          </ac:spMkLst>
+        </pc:spChg>
+        <pc:spChg chg="mod topLvl">
+          <ac:chgData name="NIKHIL SAWAL" userId="c8dee9c8a82970a7" providerId="LiveId" clId="{5D13D954-F149-3944-BE6D-5630D4E0E09B}" dt="2021-02-02T15:56:53.473" v="10" actId="165"/>
+          <ac:spMkLst>
+            <pc:docMk/>
+            <pc:sldMk cId="1926175025" sldId="257"/>
+            <ac:spMk id="134" creationId="{DB02E5C0-6E93-8D4E-84F8-34ED926D3167}"/>
+          </ac:spMkLst>
+        </pc:spChg>
+        <pc:spChg chg="mod topLvl">
+          <ac:chgData name="NIKHIL SAWAL" userId="c8dee9c8a82970a7" providerId="LiveId" clId="{5D13D954-F149-3944-BE6D-5630D4E0E09B}" dt="2021-02-02T15:56:53.473" v="10" actId="165"/>
+          <ac:spMkLst>
+            <pc:docMk/>
+            <pc:sldMk cId="1926175025" sldId="257"/>
+            <ac:spMk id="135" creationId="{4C8B5FD6-C4BA-2B44-9441-A58740819530}"/>
+          </ac:spMkLst>
+        </pc:spChg>
+        <pc:grpChg chg="add del mod">
+          <ac:chgData name="NIKHIL SAWAL" userId="c8dee9c8a82970a7" providerId="LiveId" clId="{5D13D954-F149-3944-BE6D-5630D4E0E09B}" dt="2021-02-02T15:56:53.473" v="10" actId="165"/>
+          <ac:grpSpMkLst>
+            <pc:docMk/>
+            <pc:sldMk cId="1926175025" sldId="257"/>
+            <ac:grpSpMk id="2" creationId="{5C13BF6B-BDBE-7347-821A-4840C69882BC}"/>
+          </ac:grpSpMkLst>
+        </pc:grpChg>
+        <pc:picChg chg="mod topLvl">
+          <ac:chgData name="NIKHIL SAWAL" userId="c8dee9c8a82970a7" providerId="LiveId" clId="{5D13D954-F149-3944-BE6D-5630D4E0E09B}" dt="2021-02-02T15:56:53.473" v="10" actId="165"/>
+          <ac:picMkLst>
+            <pc:docMk/>
+            <pc:sldMk cId="1926175025" sldId="257"/>
+            <ac:picMk id="49" creationId="{69192D6E-6C02-7C41-A4BA-8E80EA9D9268}"/>
+          </ac:picMkLst>
+        </pc:picChg>
+        <pc:picChg chg="mod topLvl">
+          <ac:chgData name="NIKHIL SAWAL" userId="c8dee9c8a82970a7" providerId="LiveId" clId="{5D13D954-F149-3944-BE6D-5630D4E0E09B}" dt="2021-02-02T15:56:53.473" v="10" actId="165"/>
+          <ac:picMkLst>
+            <pc:docMk/>
+            <pc:sldMk cId="1926175025" sldId="257"/>
+            <ac:picMk id="58" creationId="{DDDCC2DE-5A06-154C-B7A9-52957A4CB6BA}"/>
+          </ac:picMkLst>
+        </pc:picChg>
+        <pc:picChg chg="mod topLvl">
+          <ac:chgData name="NIKHIL SAWAL" userId="c8dee9c8a82970a7" providerId="LiveId" clId="{5D13D954-F149-3944-BE6D-5630D4E0E09B}" dt="2021-02-02T15:56:53.473" v="10" actId="165"/>
+          <ac:picMkLst>
+            <pc:docMk/>
+            <pc:sldMk cId="1926175025" sldId="257"/>
+            <ac:picMk id="59" creationId="{023EBBFD-7EB2-E04E-BFD8-5C27168AC3D5}"/>
+          </ac:picMkLst>
+        </pc:picChg>
+        <pc:picChg chg="mod topLvl">
+          <ac:chgData name="NIKHIL SAWAL" userId="c8dee9c8a82970a7" providerId="LiveId" clId="{5D13D954-F149-3944-BE6D-5630D4E0E09B}" dt="2021-02-02T15:56:53.473" v="10" actId="165"/>
+          <ac:picMkLst>
+            <pc:docMk/>
+            <pc:sldMk cId="1926175025" sldId="257"/>
+            <ac:picMk id="61" creationId="{9FAC8A10-CC02-C64C-BAA4-782DC08B81F1}"/>
+          </ac:picMkLst>
+        </pc:picChg>
+        <pc:picChg chg="mod topLvl">
+          <ac:chgData name="NIKHIL SAWAL" userId="c8dee9c8a82970a7" providerId="LiveId" clId="{5D13D954-F149-3944-BE6D-5630D4E0E09B}" dt="2021-02-02T15:56:53.473" v="10" actId="165"/>
+          <ac:picMkLst>
+            <pc:docMk/>
+            <pc:sldMk cId="1926175025" sldId="257"/>
+            <ac:picMk id="62" creationId="{BF090598-F1EB-5246-AF33-CF6E3F896236}"/>
+          </ac:picMkLst>
+        </pc:picChg>
+        <pc:picChg chg="mod topLvl">
+          <ac:chgData name="NIKHIL SAWAL" userId="c8dee9c8a82970a7" providerId="LiveId" clId="{5D13D954-F149-3944-BE6D-5630D4E0E09B}" dt="2021-02-02T15:56:53.473" v="10" actId="165"/>
+          <ac:picMkLst>
+            <pc:docMk/>
+            <pc:sldMk cId="1926175025" sldId="257"/>
+            <ac:picMk id="65" creationId="{B22F363C-2A15-B340-A52C-54F3DD7032FC}"/>
+          </ac:picMkLst>
+        </pc:picChg>
+        <pc:picChg chg="mod topLvl">
+          <ac:chgData name="NIKHIL SAWAL" userId="c8dee9c8a82970a7" providerId="LiveId" clId="{5D13D954-F149-3944-BE6D-5630D4E0E09B}" dt="2021-02-02T15:56:53.473" v="10" actId="165"/>
+          <ac:picMkLst>
+            <pc:docMk/>
+            <pc:sldMk cId="1926175025" sldId="257"/>
+            <ac:picMk id="80" creationId="{76997379-CD66-264C-89A2-835592B8CA39}"/>
+          </ac:picMkLst>
+        </pc:picChg>
+        <pc:picChg chg="mod topLvl">
+          <ac:chgData name="NIKHIL SAWAL" userId="c8dee9c8a82970a7" providerId="LiveId" clId="{5D13D954-F149-3944-BE6D-5630D4E0E09B}" dt="2021-02-02T15:56:53.473" v="10" actId="165"/>
+          <ac:picMkLst>
+            <pc:docMk/>
+            <pc:sldMk cId="1926175025" sldId="257"/>
+            <ac:picMk id="95" creationId="{50F49F78-F5BD-5349-ACDD-B41354AB7CB7}"/>
+          </ac:picMkLst>
+        </pc:picChg>
+        <pc:picChg chg="mod topLvl">
+          <ac:chgData name="NIKHIL SAWAL" userId="c8dee9c8a82970a7" providerId="LiveId" clId="{5D13D954-F149-3944-BE6D-5630D4E0E09B}" dt="2021-02-02T15:56:53.473" v="10" actId="165"/>
+          <ac:picMkLst>
+            <pc:docMk/>
+            <pc:sldMk cId="1926175025" sldId="257"/>
+            <ac:picMk id="128" creationId="{4C7E34CB-71B0-A54E-99AC-68943C63EA0C}"/>
+          </ac:picMkLst>
+        </pc:picChg>
+        <pc:picChg chg="mod topLvl">
+          <ac:chgData name="NIKHIL SAWAL" userId="c8dee9c8a82970a7" providerId="LiveId" clId="{5D13D954-F149-3944-BE6D-5630D4E0E09B}" dt="2021-02-02T15:56:53.473" v="10" actId="165"/>
+          <ac:picMkLst>
+            <pc:docMk/>
+            <pc:sldMk cId="1926175025" sldId="257"/>
+            <ac:picMk id="129" creationId="{E8D959B7-C765-0348-ACEE-4E9E766FB4A8}"/>
+          </ac:picMkLst>
+        </pc:picChg>
+        <pc:picChg chg="mod topLvl">
+          <ac:chgData name="NIKHIL SAWAL" userId="c8dee9c8a82970a7" providerId="LiveId" clId="{5D13D954-F149-3944-BE6D-5630D4E0E09B}" dt="2021-02-02T15:56:53.473" v="10" actId="165"/>
+          <ac:picMkLst>
+            <pc:docMk/>
+            <pc:sldMk cId="1926175025" sldId="257"/>
+            <ac:picMk id="1036" creationId="{BA5A4558-1E41-0543-A13B-54D2F8718C38}"/>
+          </ac:picMkLst>
+        </pc:picChg>
+        <pc:picChg chg="mod topLvl">
+          <ac:chgData name="NIKHIL SAWAL" userId="c8dee9c8a82970a7" providerId="LiveId" clId="{5D13D954-F149-3944-BE6D-5630D4E0E09B}" dt="2021-02-02T15:56:53.473" v="10" actId="165"/>
+          <ac:picMkLst>
+            <pc:docMk/>
+            <pc:sldMk cId="1926175025" sldId="257"/>
+            <ac:picMk id="1038" creationId="{20629BF3-6842-3E44-9199-4D4BE1F6BFFE}"/>
+          </ac:picMkLst>
+        </pc:picChg>
+        <pc:picChg chg="mod topLvl">
+          <ac:chgData name="NIKHIL SAWAL" userId="c8dee9c8a82970a7" providerId="LiveId" clId="{5D13D954-F149-3944-BE6D-5630D4E0E09B}" dt="2021-02-02T15:56:53.473" v="10" actId="165"/>
+          <ac:picMkLst>
+            <pc:docMk/>
+            <pc:sldMk cId="1926175025" sldId="257"/>
+            <ac:picMk id="1046" creationId="{AA5DE2BF-DE66-5040-BF88-F3090B858E06}"/>
+          </ac:picMkLst>
+        </pc:picChg>
+        <pc:picChg chg="mod topLvl">
+          <ac:chgData name="NIKHIL SAWAL" userId="c8dee9c8a82970a7" providerId="LiveId" clId="{5D13D954-F149-3944-BE6D-5630D4E0E09B}" dt="2021-02-02T15:56:53.473" v="10" actId="165"/>
+          <ac:picMkLst>
+            <pc:docMk/>
+            <pc:sldMk cId="1926175025" sldId="257"/>
+            <ac:picMk id="1048" creationId="{BAA134E1-873F-4749-A41B-F7E1BE4FD09F}"/>
+          </ac:picMkLst>
+        </pc:picChg>
+        <pc:picChg chg="mod topLvl">
+          <ac:chgData name="NIKHIL SAWAL" userId="c8dee9c8a82970a7" providerId="LiveId" clId="{5D13D954-F149-3944-BE6D-5630D4E0E09B}" dt="2021-02-02T15:56:53.473" v="10" actId="165"/>
+          <ac:picMkLst>
+            <pc:docMk/>
+            <pc:sldMk cId="1926175025" sldId="257"/>
+            <ac:picMk id="1050" creationId="{9906C581-47C6-D54C-BEAD-068C76E36BD4}"/>
+          </ac:picMkLst>
+        </pc:picChg>
+        <pc:cxnChg chg="mod topLvl">
+          <ac:chgData name="NIKHIL SAWAL" userId="c8dee9c8a82970a7" providerId="LiveId" clId="{5D13D954-F149-3944-BE6D-5630D4E0E09B}" dt="2021-02-02T15:56:53.473" v="10" actId="165"/>
+          <ac:cxnSpMkLst>
+            <pc:docMk/>
+            <pc:sldMk cId="1926175025" sldId="257"/>
+            <ac:cxnSpMk id="16" creationId="{38300A46-8328-EE41-AD25-9173BC9BCA68}"/>
+          </ac:cxnSpMkLst>
+        </pc:cxnChg>
+        <pc:cxnChg chg="mod topLvl">
+          <ac:chgData name="NIKHIL SAWAL" userId="c8dee9c8a82970a7" providerId="LiveId" clId="{5D13D954-F149-3944-BE6D-5630D4E0E09B}" dt="2021-02-02T15:56:53.473" v="10" actId="165"/>
+          <ac:cxnSpMkLst>
+            <pc:docMk/>
+            <pc:sldMk cId="1926175025" sldId="257"/>
+            <ac:cxnSpMk id="24" creationId="{160118DA-612E-A241-8D53-487DAC972D68}"/>
+          </ac:cxnSpMkLst>
+        </pc:cxnChg>
+        <pc:cxnChg chg="mod topLvl">
+          <ac:chgData name="NIKHIL SAWAL" userId="c8dee9c8a82970a7" providerId="LiveId" clId="{5D13D954-F149-3944-BE6D-5630D4E0E09B}" dt="2021-02-02T15:56:53.473" v="10" actId="165"/>
+          <ac:cxnSpMkLst>
+            <pc:docMk/>
+            <pc:sldMk cId="1926175025" sldId="257"/>
+            <ac:cxnSpMk id="25" creationId="{5782B8CC-81F7-894A-BA55-DD9043000998}"/>
+          </ac:cxnSpMkLst>
+        </pc:cxnChg>
+        <pc:cxnChg chg="mod topLvl">
+          <ac:chgData name="NIKHIL SAWAL" userId="c8dee9c8a82970a7" providerId="LiveId" clId="{5D13D954-F149-3944-BE6D-5630D4E0E09B}" dt="2021-02-02T15:56:53.473" v="10" actId="165"/>
+          <ac:cxnSpMkLst>
+            <pc:docMk/>
+            <pc:sldMk cId="1926175025" sldId="257"/>
+            <ac:cxnSpMk id="26" creationId="{695DC2AF-7734-304E-B3AA-E94BB37D9FE8}"/>
+          </ac:cxnSpMkLst>
+        </pc:cxnChg>
+        <pc:cxnChg chg="mod topLvl">
+          <ac:chgData name="NIKHIL SAWAL" userId="c8dee9c8a82970a7" providerId="LiveId" clId="{5D13D954-F149-3944-BE6D-5630D4E0E09B}" dt="2021-02-02T15:56:53.473" v="10" actId="165"/>
+          <ac:cxnSpMkLst>
+            <pc:docMk/>
+            <pc:sldMk cId="1926175025" sldId="257"/>
+            <ac:cxnSpMk id="31" creationId="{23AB814B-0360-844D-AE9D-F26295A831AD}"/>
+          </ac:cxnSpMkLst>
+        </pc:cxnChg>
+        <pc:cxnChg chg="mod topLvl">
+          <ac:chgData name="NIKHIL SAWAL" userId="c8dee9c8a82970a7" providerId="LiveId" clId="{5D13D954-F149-3944-BE6D-5630D4E0E09B}" dt="2021-02-02T15:56:53.473" v="10" actId="165"/>
+          <ac:cxnSpMkLst>
+            <pc:docMk/>
+            <pc:sldMk cId="1926175025" sldId="257"/>
+            <ac:cxnSpMk id="32" creationId="{CBDD0680-AB84-B64E-AE6E-A24C4405EB4A}"/>
+          </ac:cxnSpMkLst>
+        </pc:cxnChg>
+        <pc:cxnChg chg="mod topLvl">
+          <ac:chgData name="NIKHIL SAWAL" userId="c8dee9c8a82970a7" providerId="LiveId" clId="{5D13D954-F149-3944-BE6D-5630D4E0E09B}" dt="2021-02-02T15:56:53.473" v="10" actId="165"/>
+          <ac:cxnSpMkLst>
+            <pc:docMk/>
+            <pc:sldMk cId="1926175025" sldId="257"/>
+            <ac:cxnSpMk id="33" creationId="{72D069F2-F237-A64D-9A4B-7244DCC70A73}"/>
+          </ac:cxnSpMkLst>
+        </pc:cxnChg>
+        <pc:cxnChg chg="mod topLvl">
+          <ac:chgData name="NIKHIL SAWAL" userId="c8dee9c8a82970a7" providerId="LiveId" clId="{5D13D954-F149-3944-BE6D-5630D4E0E09B}" dt="2021-02-02T15:56:53.473" v="10" actId="165"/>
+          <ac:cxnSpMkLst>
+            <pc:docMk/>
+            <pc:sldMk cId="1926175025" sldId="257"/>
+            <ac:cxnSpMk id="35" creationId="{75B44839-D07C-844D-86DB-CAF01278BD8B}"/>
+          </ac:cxnSpMkLst>
+        </pc:cxnChg>
+        <pc:cxnChg chg="mod topLvl">
+          <ac:chgData name="NIKHIL SAWAL" userId="c8dee9c8a82970a7" providerId="LiveId" clId="{5D13D954-F149-3944-BE6D-5630D4E0E09B}" dt="2021-02-02T15:56:53.473" v="10" actId="165"/>
+          <ac:cxnSpMkLst>
+            <pc:docMk/>
+            <pc:sldMk cId="1926175025" sldId="257"/>
+            <ac:cxnSpMk id="36" creationId="{C0982A3D-2433-E444-B41C-7B0A5A813AA5}"/>
+          </ac:cxnSpMkLst>
+        </pc:cxnChg>
+        <pc:cxnChg chg="mod topLvl">
+          <ac:chgData name="NIKHIL SAWAL" userId="c8dee9c8a82970a7" providerId="LiveId" clId="{5D13D954-F149-3944-BE6D-5630D4E0E09B}" dt="2021-02-02T15:56:53.473" v="10" actId="165"/>
+          <ac:cxnSpMkLst>
+            <pc:docMk/>
+            <pc:sldMk cId="1926175025" sldId="257"/>
+            <ac:cxnSpMk id="37" creationId="{9E389C97-B04D-594C-8806-BDFBCAAFB23F}"/>
+          </ac:cxnSpMkLst>
+        </pc:cxnChg>
+        <pc:cxnChg chg="mod topLvl">
+          <ac:chgData name="NIKHIL SAWAL" userId="c8dee9c8a82970a7" providerId="LiveId" clId="{5D13D954-F149-3944-BE6D-5630D4E0E09B}" dt="2021-02-02T15:56:53.473" v="10" actId="165"/>
+          <ac:cxnSpMkLst>
+            <pc:docMk/>
+            <pc:sldMk cId="1926175025" sldId="257"/>
+            <ac:cxnSpMk id="68" creationId="{E2040E15-4873-7A43-9859-5B00EADD52F4}"/>
+          </ac:cxnSpMkLst>
+        </pc:cxnChg>
+        <pc:cxnChg chg="mod topLvl">
+          <ac:chgData name="NIKHIL SAWAL" userId="c8dee9c8a82970a7" providerId="LiveId" clId="{5D13D954-F149-3944-BE6D-5630D4E0E09B}" dt="2021-02-02T15:56:53.473" v="10" actId="165"/>
+          <ac:cxnSpMkLst>
+            <pc:docMk/>
+            <pc:sldMk cId="1926175025" sldId="257"/>
+            <ac:cxnSpMk id="77" creationId="{0FBC5AC1-E4D9-BE41-A00B-9F4E586B667F}"/>
+          </ac:cxnSpMkLst>
+        </pc:cxnChg>
+        <pc:cxnChg chg="mod topLvl">
+          <ac:chgData name="NIKHIL SAWAL" userId="c8dee9c8a82970a7" providerId="LiveId" clId="{5D13D954-F149-3944-BE6D-5630D4E0E09B}" dt="2021-02-02T15:56:53.473" v="10" actId="165"/>
+          <ac:cxnSpMkLst>
+            <pc:docMk/>
+            <pc:sldMk cId="1926175025" sldId="257"/>
+            <ac:cxnSpMk id="83" creationId="{8DA3077D-6F5C-0245-A1C7-C613D3426461}"/>
+          </ac:cxnSpMkLst>
+        </pc:cxnChg>
+        <pc:cxnChg chg="mod topLvl">
+          <ac:chgData name="NIKHIL SAWAL" userId="c8dee9c8a82970a7" providerId="LiveId" clId="{5D13D954-F149-3944-BE6D-5630D4E0E09B}" dt="2021-02-02T15:56:53.473" v="10" actId="165"/>
+          <ac:cxnSpMkLst>
+            <pc:docMk/>
+            <pc:sldMk cId="1926175025" sldId="257"/>
+            <ac:cxnSpMk id="84" creationId="{75C81E7F-2950-064F-AF0D-AE3A191016A0}"/>
+          </ac:cxnSpMkLst>
+        </pc:cxnChg>
+        <pc:cxnChg chg="mod topLvl">
+          <ac:chgData name="NIKHIL SAWAL" userId="c8dee9c8a82970a7" providerId="LiveId" clId="{5D13D954-F149-3944-BE6D-5630D4E0E09B}" dt="2021-02-02T15:56:53.473" v="10" actId="165"/>
+          <ac:cxnSpMkLst>
+            <pc:docMk/>
+            <pc:sldMk cId="1926175025" sldId="257"/>
+            <ac:cxnSpMk id="85" creationId="{FD0ED3D5-D86F-0845-BA27-E018B87154E7}"/>
+          </ac:cxnSpMkLst>
+        </pc:cxnChg>
+        <pc:cxnChg chg="mod topLvl">
+          <ac:chgData name="NIKHIL SAWAL" userId="c8dee9c8a82970a7" providerId="LiveId" clId="{5D13D954-F149-3944-BE6D-5630D4E0E09B}" dt="2021-02-02T15:56:53.473" v="10" actId="165"/>
+          <ac:cxnSpMkLst>
+            <pc:docMk/>
+            <pc:sldMk cId="1926175025" sldId="257"/>
+            <ac:cxnSpMk id="86" creationId="{8283AFC2-B8DF-AF48-9797-6258198A8568}"/>
+          </ac:cxnSpMkLst>
+        </pc:cxnChg>
+        <pc:cxnChg chg="mod topLvl">
+          <ac:chgData name="NIKHIL SAWAL" userId="c8dee9c8a82970a7" providerId="LiveId" clId="{5D13D954-F149-3944-BE6D-5630D4E0E09B}" dt="2021-02-02T15:56:53.473" v="10" actId="165"/>
+          <ac:cxnSpMkLst>
+            <pc:docMk/>
+            <pc:sldMk cId="1926175025" sldId="257"/>
+            <ac:cxnSpMk id="89" creationId="{DBAD1892-412F-DC4B-B290-87F0CADDE15A}"/>
+          </ac:cxnSpMkLst>
+        </pc:cxnChg>
+        <pc:cxnChg chg="mod topLvl">
+          <ac:chgData name="NIKHIL SAWAL" userId="c8dee9c8a82970a7" providerId="LiveId" clId="{5D13D954-F149-3944-BE6D-5630D4E0E09B}" dt="2021-02-02T15:56:53.473" v="10" actId="165"/>
+          <ac:cxnSpMkLst>
+            <pc:docMk/>
+            <pc:sldMk cId="1926175025" sldId="257"/>
+            <ac:cxnSpMk id="91" creationId="{258B87C5-D2B2-FF49-8DDE-700526DD1567}"/>
+          </ac:cxnSpMkLst>
+        </pc:cxnChg>
+        <pc:cxnChg chg="mod topLvl">
+          <ac:chgData name="NIKHIL SAWAL" userId="c8dee9c8a82970a7" providerId="LiveId" clId="{5D13D954-F149-3944-BE6D-5630D4E0E09B}" dt="2021-02-02T15:56:53.473" v="10" actId="165"/>
+          <ac:cxnSpMkLst>
+            <pc:docMk/>
+            <pc:sldMk cId="1926175025" sldId="257"/>
+            <ac:cxnSpMk id="97" creationId="{DA6FC1C1-ACFB-3347-B6FF-15EBAF1FDCC4}"/>
+          </ac:cxnSpMkLst>
+        </pc:cxnChg>
+        <pc:cxnChg chg="mod topLvl">
+          <ac:chgData name="NIKHIL SAWAL" userId="c8dee9c8a82970a7" providerId="LiveId" clId="{5D13D954-F149-3944-BE6D-5630D4E0E09B}" dt="2021-02-02T15:56:53.473" v="10" actId="165"/>
+          <ac:cxnSpMkLst>
+            <pc:docMk/>
+            <pc:sldMk cId="1926175025" sldId="257"/>
+            <ac:cxnSpMk id="99" creationId="{BD1D4B56-35AC-1E49-8622-DACF278B9EAC}"/>
+          </ac:cxnSpMkLst>
+        </pc:cxnChg>
+        <pc:cxnChg chg="mod topLvl">
+          <ac:chgData name="NIKHIL SAWAL" userId="c8dee9c8a82970a7" providerId="LiveId" clId="{5D13D954-F149-3944-BE6D-5630D4E0E09B}" dt="2021-02-02T15:56:53.473" v="10" actId="165"/>
+          <ac:cxnSpMkLst>
+            <pc:docMk/>
+            <pc:sldMk cId="1926175025" sldId="257"/>
+            <ac:cxnSpMk id="101" creationId="{4F16C023-57CC-D14C-BC59-E25EA81F1BFE}"/>
+          </ac:cxnSpMkLst>
+        </pc:cxnChg>
+        <pc:cxnChg chg="mod topLvl">
+          <ac:chgData name="NIKHIL SAWAL" userId="c8dee9c8a82970a7" providerId="LiveId" clId="{5D13D954-F149-3944-BE6D-5630D4E0E09B}" dt="2021-02-02T15:56:53.473" v="10" actId="165"/>
+          <ac:cxnSpMkLst>
+            <pc:docMk/>
+            <pc:sldMk cId="1926175025" sldId="257"/>
+            <ac:cxnSpMk id="110" creationId="{66239ADA-5C97-0945-B928-F0070A4CACDE}"/>
+          </ac:cxnSpMkLst>
+        </pc:cxnChg>
+      </pc:sldChg>
+      <pc:sldChg chg="addSp delSp modSp">
+        <pc:chgData name="NIKHIL SAWAL" userId="c8dee9c8a82970a7" providerId="LiveId" clId="{5D13D954-F149-3944-BE6D-5630D4E0E09B}" dt="2021-02-02T15:57:17.464" v="15" actId="164"/>
+        <pc:sldMkLst>
+          <pc:docMk/>
+          <pc:sldMk cId="417216440" sldId="259"/>
+        </pc:sldMkLst>
+        <pc:spChg chg="add del mod">
+          <ac:chgData name="NIKHIL SAWAL" userId="c8dee9c8a82970a7" providerId="LiveId" clId="{5D13D954-F149-3944-BE6D-5630D4E0E09B}" dt="2021-02-02T15:57:04.156" v="13"/>
+          <ac:spMkLst>
+            <pc:docMk/>
+            <pc:sldMk cId="417216440" sldId="259"/>
+            <ac:spMk id="62" creationId="{FB5EC0D3-E121-9948-ABA3-285139FC3DA9}"/>
+          </ac:spMkLst>
+        </pc:spChg>
+        <pc:spChg chg="add del mod">
+          <ac:chgData name="NIKHIL SAWAL" userId="c8dee9c8a82970a7" providerId="LiveId" clId="{5D13D954-F149-3944-BE6D-5630D4E0E09B}" dt="2021-02-02T15:57:04.156" v="13"/>
+          <ac:spMkLst>
+            <pc:docMk/>
+            <pc:sldMk cId="417216440" sldId="259"/>
+            <ac:spMk id="123" creationId="{67496231-D0AB-524D-91F0-2C3AA953C181}"/>
+          </ac:spMkLst>
+        </pc:spChg>
+        <pc:spChg chg="add del mod">
+          <ac:chgData name="NIKHIL SAWAL" userId="c8dee9c8a82970a7" providerId="LiveId" clId="{5D13D954-F149-3944-BE6D-5630D4E0E09B}" dt="2021-02-02T15:57:04.156" v="13"/>
+          <ac:spMkLst>
+            <pc:docMk/>
+            <pc:sldMk cId="417216440" sldId="259"/>
+            <ac:spMk id="124" creationId="{CA78C1FD-27FD-DD46-8396-9A0739C6CCE0}"/>
+          </ac:spMkLst>
+        </pc:spChg>
+        <pc:spChg chg="add del mod">
+          <ac:chgData name="NIKHIL SAWAL" userId="c8dee9c8a82970a7" providerId="LiveId" clId="{5D13D954-F149-3944-BE6D-5630D4E0E09B}" dt="2021-02-02T15:57:04.156" v="13"/>
+          <ac:spMkLst>
+            <pc:docMk/>
+            <pc:sldMk cId="417216440" sldId="259"/>
+            <ac:spMk id="125" creationId="{EBF6FE5F-7A46-384D-808B-F3C9F68250D3}"/>
+          </ac:spMkLst>
+        </pc:spChg>
+        <pc:spChg chg="add del mod">
+          <ac:chgData name="NIKHIL SAWAL" userId="c8dee9c8a82970a7" providerId="LiveId" clId="{5D13D954-F149-3944-BE6D-5630D4E0E09B}" dt="2021-02-02T15:57:04.156" v="13"/>
+          <ac:spMkLst>
+            <pc:docMk/>
+            <pc:sldMk cId="417216440" sldId="259"/>
+            <ac:spMk id="126" creationId="{46AA232B-71F3-D142-8B53-6EB28E245BF3}"/>
+          </ac:spMkLst>
+        </pc:spChg>
+        <pc:spChg chg="add del mod">
+          <ac:chgData name="NIKHIL SAWAL" userId="c8dee9c8a82970a7" providerId="LiveId" clId="{5D13D954-F149-3944-BE6D-5630D4E0E09B}" dt="2021-02-02T15:57:04.156" v="13"/>
+          <ac:spMkLst>
+            <pc:docMk/>
+            <pc:sldMk cId="417216440" sldId="259"/>
+            <ac:spMk id="127" creationId="{ABE1C762-B3D0-264A-990E-279318AB5325}"/>
+          </ac:spMkLst>
+        </pc:spChg>
+        <pc:spChg chg="add del mod">
+          <ac:chgData name="NIKHIL SAWAL" userId="c8dee9c8a82970a7" providerId="LiveId" clId="{5D13D954-F149-3944-BE6D-5630D4E0E09B}" dt="2021-02-02T15:57:04.156" v="13"/>
+          <ac:spMkLst>
+            <pc:docMk/>
+            <pc:sldMk cId="417216440" sldId="259"/>
+            <ac:spMk id="128" creationId="{FE097FED-2AFF-0D4A-826A-E048DB89E2DC}"/>
+          </ac:spMkLst>
+        </pc:spChg>
+        <pc:spChg chg="add del mod">
+          <ac:chgData name="NIKHIL SAWAL" userId="c8dee9c8a82970a7" providerId="LiveId" clId="{5D13D954-F149-3944-BE6D-5630D4E0E09B}" dt="2021-02-02T15:57:04.156" v="13"/>
+          <ac:spMkLst>
+            <pc:docMk/>
+            <pc:sldMk cId="417216440" sldId="259"/>
+            <ac:spMk id="129" creationId="{44698CEC-6C26-BF46-A823-2F311C8E6D25}"/>
+          </ac:spMkLst>
+        </pc:spChg>
+        <pc:spChg chg="add del mod">
+          <ac:chgData name="NIKHIL SAWAL" userId="c8dee9c8a82970a7" providerId="LiveId" clId="{5D13D954-F149-3944-BE6D-5630D4E0E09B}" dt="2021-02-02T15:57:04.156" v="13"/>
+          <ac:spMkLst>
+            <pc:docMk/>
+            <pc:sldMk cId="417216440" sldId="259"/>
+            <ac:spMk id="130" creationId="{85C1D92D-03ED-454F-B44E-A6C21687355A}"/>
+          </ac:spMkLst>
+        </pc:spChg>
+        <pc:spChg chg="add del mod">
+          <ac:chgData name="NIKHIL SAWAL" userId="c8dee9c8a82970a7" providerId="LiveId" clId="{5D13D954-F149-3944-BE6D-5630D4E0E09B}" dt="2021-02-02T15:57:04.156" v="13"/>
+          <ac:spMkLst>
+            <pc:docMk/>
+            <pc:sldMk cId="417216440" sldId="259"/>
+            <ac:spMk id="131" creationId="{C479BD32-45BC-8846-B407-21204163D2BD}"/>
+          </ac:spMkLst>
+        </pc:spChg>
+        <pc:spChg chg="add del mod">
+          <ac:chgData name="NIKHIL SAWAL" userId="c8dee9c8a82970a7" providerId="LiveId" clId="{5D13D954-F149-3944-BE6D-5630D4E0E09B}" dt="2021-02-02T15:57:04.156" v="13"/>
+          <ac:spMkLst>
+            <pc:docMk/>
+            <pc:sldMk cId="417216440" sldId="259"/>
+            <ac:spMk id="149" creationId="{174D6529-D58C-B64A-B928-7750269D9329}"/>
+          </ac:spMkLst>
+        </pc:spChg>
+        <pc:spChg chg="add del mod">
+          <ac:chgData name="NIKHIL SAWAL" userId="c8dee9c8a82970a7" providerId="LiveId" clId="{5D13D954-F149-3944-BE6D-5630D4E0E09B}" dt="2021-02-02T15:57:04.156" v="13"/>
+          <ac:spMkLst>
+            <pc:docMk/>
+            <pc:sldMk cId="417216440" sldId="259"/>
+            <ac:spMk id="152" creationId="{2F306100-B502-444E-9EA8-47553A55823A}"/>
+          </ac:spMkLst>
+        </pc:spChg>
+        <pc:spChg chg="add del mod">
+          <ac:chgData name="NIKHIL SAWAL" userId="c8dee9c8a82970a7" providerId="LiveId" clId="{5D13D954-F149-3944-BE6D-5630D4E0E09B}" dt="2021-02-02T15:57:04.156" v="13"/>
+          <ac:spMkLst>
+            <pc:docMk/>
+            <pc:sldMk cId="417216440" sldId="259"/>
+            <ac:spMk id="161" creationId="{6AD149B4-AB0A-714C-9D62-19B12999CFD6}"/>
+          </ac:spMkLst>
+        </pc:spChg>
+        <pc:spChg chg="add del mod">
+          <ac:chgData name="NIKHIL SAWAL" userId="c8dee9c8a82970a7" providerId="LiveId" clId="{5D13D954-F149-3944-BE6D-5630D4E0E09B}" dt="2021-02-02T15:57:04.156" v="13"/>
+          <ac:spMkLst>
+            <pc:docMk/>
+            <pc:sldMk cId="417216440" sldId="259"/>
+            <ac:spMk id="162" creationId="{71A3D4C2-F7D6-DE43-B3F1-7AABEB81B5A4}"/>
+          </ac:spMkLst>
+        </pc:spChg>
+        <pc:spChg chg="add del mod">
+          <ac:chgData name="NIKHIL SAWAL" userId="c8dee9c8a82970a7" providerId="LiveId" clId="{5D13D954-F149-3944-BE6D-5630D4E0E09B}" dt="2021-02-02T15:57:04.156" v="13"/>
+          <ac:spMkLst>
+            <pc:docMk/>
+            <pc:sldMk cId="417216440" sldId="259"/>
+            <ac:spMk id="170" creationId="{8AFD260F-F19A-0E4F-B2A3-AA75B8642268}"/>
+          </ac:spMkLst>
+        </pc:spChg>
+        <pc:spChg chg="add del mod">
+          <ac:chgData name="NIKHIL SAWAL" userId="c8dee9c8a82970a7" providerId="LiveId" clId="{5D13D954-F149-3944-BE6D-5630D4E0E09B}" dt="2021-02-02T15:57:04.156" v="13"/>
+          <ac:spMkLst>
+            <pc:docMk/>
+            <pc:sldMk cId="417216440" sldId="259"/>
+            <ac:spMk id="171" creationId="{B0085941-7365-3946-9A93-EE5D5A63B1A7}"/>
+          </ac:spMkLst>
+        </pc:spChg>
+        <pc:spChg chg="add del mod">
+          <ac:chgData name="NIKHIL SAWAL" userId="c8dee9c8a82970a7" providerId="LiveId" clId="{5D13D954-F149-3944-BE6D-5630D4E0E09B}" dt="2021-02-02T15:57:04.156" v="13"/>
+          <ac:spMkLst>
+            <pc:docMk/>
+            <pc:sldMk cId="417216440" sldId="259"/>
+            <ac:spMk id="175" creationId="{00AD0233-2FC4-E649-8FF8-0B782680AFCC}"/>
+          </ac:spMkLst>
+        </pc:spChg>
+        <pc:spChg chg="add del mod">
+          <ac:chgData name="NIKHIL SAWAL" userId="c8dee9c8a82970a7" providerId="LiveId" clId="{5D13D954-F149-3944-BE6D-5630D4E0E09B}" dt="2021-02-02T15:57:04.156" v="13"/>
+          <ac:spMkLst>
+            <pc:docMk/>
+            <pc:sldMk cId="417216440" sldId="259"/>
+            <ac:spMk id="176" creationId="{C11824F8-0693-D240-A28D-E363F1C4763B}"/>
+          </ac:spMkLst>
+        </pc:spChg>
+        <pc:spChg chg="add del mod">
+          <ac:chgData name="NIKHIL SAWAL" userId="c8dee9c8a82970a7" providerId="LiveId" clId="{5D13D954-F149-3944-BE6D-5630D4E0E09B}" dt="2021-02-02T15:57:04.156" v="13"/>
+          <ac:spMkLst>
+            <pc:docMk/>
+            <pc:sldMk cId="417216440" sldId="259"/>
+            <ac:spMk id="177" creationId="{F1E3816F-46C9-E949-9A88-B6F8D580328C}"/>
+          </ac:spMkLst>
+        </pc:spChg>
+        <pc:spChg chg="add del mod">
+          <ac:chgData name="NIKHIL SAWAL" userId="c8dee9c8a82970a7" providerId="LiveId" clId="{5D13D954-F149-3944-BE6D-5630D4E0E09B}" dt="2021-02-02T15:57:04.156" v="13"/>
+          <ac:spMkLst>
+            <pc:docMk/>
+            <pc:sldMk cId="417216440" sldId="259"/>
+            <ac:spMk id="178" creationId="{B796F9AD-BFA4-9C44-8308-E78C3D9B1D9C}"/>
+          </ac:spMkLst>
+        </pc:spChg>
+        <pc:spChg chg="add del mod">
+          <ac:chgData name="NIKHIL SAWAL" userId="c8dee9c8a82970a7" providerId="LiveId" clId="{5D13D954-F149-3944-BE6D-5630D4E0E09B}" dt="2021-02-02T15:57:04.156" v="13"/>
+          <ac:spMkLst>
+            <pc:docMk/>
+            <pc:sldMk cId="417216440" sldId="259"/>
+            <ac:spMk id="179" creationId="{42F543AA-3C16-9D4E-AF01-0F791172D285}"/>
+          </ac:spMkLst>
+        </pc:spChg>
+        <pc:spChg chg="add del mod">
+          <ac:chgData name="NIKHIL SAWAL" userId="c8dee9c8a82970a7" providerId="LiveId" clId="{5D13D954-F149-3944-BE6D-5630D4E0E09B}" dt="2021-02-02T15:57:04.156" v="13"/>
+          <ac:spMkLst>
+            <pc:docMk/>
+            <pc:sldMk cId="417216440" sldId="259"/>
+            <ac:spMk id="180" creationId="{62E5F5CD-7539-C944-A1D8-4B5A7541D1C8}"/>
+          </ac:spMkLst>
+        </pc:spChg>
+        <pc:spChg chg="add mod">
+          <ac:chgData name="NIKHIL SAWAL" userId="c8dee9c8a82970a7" providerId="LiveId" clId="{5D13D954-F149-3944-BE6D-5630D4E0E09B}" dt="2021-02-02T15:57:17.464" v="15" actId="164"/>
+          <ac:spMkLst>
+            <pc:docMk/>
+            <pc:sldMk cId="417216440" sldId="259"/>
+            <ac:spMk id="181" creationId="{E4A2C015-E919-7646-B2B4-41AEA853A296}"/>
+          </ac:spMkLst>
+        </pc:spChg>
+        <pc:spChg chg="add mod">
+          <ac:chgData name="NIKHIL SAWAL" userId="c8dee9c8a82970a7" providerId="LiveId" clId="{5D13D954-F149-3944-BE6D-5630D4E0E09B}" dt="2021-02-02T15:57:17.464" v="15" actId="164"/>
+          <ac:spMkLst>
+            <pc:docMk/>
+            <pc:sldMk cId="417216440" sldId="259"/>
+            <ac:spMk id="182" creationId="{77691ACF-4C8C-F445-A464-DF42B41AC2BE}"/>
+          </ac:spMkLst>
+        </pc:spChg>
+        <pc:spChg chg="add mod">
+          <ac:chgData name="NIKHIL SAWAL" userId="c8dee9c8a82970a7" providerId="LiveId" clId="{5D13D954-F149-3944-BE6D-5630D4E0E09B}" dt="2021-02-02T15:57:17.464" v="15" actId="164"/>
+          <ac:spMkLst>
+            <pc:docMk/>
+            <pc:sldMk cId="417216440" sldId="259"/>
+            <ac:spMk id="183" creationId="{320C46AE-5C22-7D4C-99A9-C25EAC62FF10}"/>
+          </ac:spMkLst>
+        </pc:spChg>
+        <pc:spChg chg="add mod">
+          <ac:chgData name="NIKHIL SAWAL" userId="c8dee9c8a82970a7" providerId="LiveId" clId="{5D13D954-F149-3944-BE6D-5630D4E0E09B}" dt="2021-02-02T15:57:17.464" v="15" actId="164"/>
+          <ac:spMkLst>
+            <pc:docMk/>
+            <pc:sldMk cId="417216440" sldId="259"/>
+            <ac:spMk id="184" creationId="{479D2225-5AF9-554B-BD66-8AE0B4DA16D0}"/>
+          </ac:spMkLst>
+        </pc:spChg>
+        <pc:spChg chg="add mod">
+          <ac:chgData name="NIKHIL SAWAL" userId="c8dee9c8a82970a7" providerId="LiveId" clId="{5D13D954-F149-3944-BE6D-5630D4E0E09B}" dt="2021-02-02T15:57:17.464" v="15" actId="164"/>
+          <ac:spMkLst>
+            <pc:docMk/>
+            <pc:sldMk cId="417216440" sldId="259"/>
+            <ac:spMk id="185" creationId="{A927D706-EB14-9542-8507-A6A7E5684F38}"/>
+          </ac:spMkLst>
+        </pc:spChg>
+        <pc:spChg chg="add mod">
+          <ac:chgData name="NIKHIL SAWAL" userId="c8dee9c8a82970a7" providerId="LiveId" clId="{5D13D954-F149-3944-BE6D-5630D4E0E09B}" dt="2021-02-02T15:57:17.464" v="15" actId="164"/>
+          <ac:spMkLst>
+            <pc:docMk/>
+            <pc:sldMk cId="417216440" sldId="259"/>
+            <ac:spMk id="186" creationId="{B40DED59-88F8-5848-940A-48FEAA05F921}"/>
+          </ac:spMkLst>
+        </pc:spChg>
+        <pc:spChg chg="add mod">
+          <ac:chgData name="NIKHIL SAWAL" userId="c8dee9c8a82970a7" providerId="LiveId" clId="{5D13D954-F149-3944-BE6D-5630D4E0E09B}" dt="2021-02-02T15:57:17.464" v="15" actId="164"/>
+          <ac:spMkLst>
+            <pc:docMk/>
+            <pc:sldMk cId="417216440" sldId="259"/>
+            <ac:spMk id="187" creationId="{E120E0CA-A49B-1245-AE44-9C1828792CDB}"/>
+          </ac:spMkLst>
+        </pc:spChg>
+        <pc:spChg chg="add mod">
+          <ac:chgData name="NIKHIL SAWAL" userId="c8dee9c8a82970a7" providerId="LiveId" clId="{5D13D954-F149-3944-BE6D-5630D4E0E09B}" dt="2021-02-02T15:57:17.464" v="15" actId="164"/>
+          <ac:spMkLst>
+            <pc:docMk/>
+            <pc:sldMk cId="417216440" sldId="259"/>
+            <ac:spMk id="188" creationId="{9537080B-334F-6F46-AE5D-F97F851F4212}"/>
+          </ac:spMkLst>
+        </pc:spChg>
+        <pc:spChg chg="add mod">
+          <ac:chgData name="NIKHIL SAWAL" userId="c8dee9c8a82970a7" providerId="LiveId" clId="{5D13D954-F149-3944-BE6D-5630D4E0E09B}" dt="2021-02-02T15:57:17.464" v="15" actId="164"/>
+          <ac:spMkLst>
+            <pc:docMk/>
+            <pc:sldMk cId="417216440" sldId="259"/>
+            <ac:spMk id="189" creationId="{7F6F729B-A849-6A40-ACEC-B1EDCF2440EA}"/>
+          </ac:spMkLst>
+        </pc:spChg>
+        <pc:spChg chg="add mod">
+          <ac:chgData name="NIKHIL SAWAL" userId="c8dee9c8a82970a7" providerId="LiveId" clId="{5D13D954-F149-3944-BE6D-5630D4E0E09B}" dt="2021-02-02T15:57:17.464" v="15" actId="164"/>
+          <ac:spMkLst>
+            <pc:docMk/>
+            <pc:sldMk cId="417216440" sldId="259"/>
+            <ac:spMk id="190" creationId="{2B14490F-1D23-D041-9622-A615B251607A}"/>
+          </ac:spMkLst>
+        </pc:spChg>
+        <pc:spChg chg="add mod">
+          <ac:chgData name="NIKHIL SAWAL" userId="c8dee9c8a82970a7" providerId="LiveId" clId="{5D13D954-F149-3944-BE6D-5630D4E0E09B}" dt="2021-02-02T15:57:17.464" v="15" actId="164"/>
+          <ac:spMkLst>
+            <pc:docMk/>
+            <pc:sldMk cId="417216440" sldId="259"/>
+            <ac:spMk id="208" creationId="{F6D5A439-AA17-7B4B-BA0E-934062B56469}"/>
+          </ac:spMkLst>
+        </pc:spChg>
+        <pc:spChg chg="add mod">
+          <ac:chgData name="NIKHIL SAWAL" userId="c8dee9c8a82970a7" providerId="LiveId" clId="{5D13D954-F149-3944-BE6D-5630D4E0E09B}" dt="2021-02-02T15:57:17.464" v="15" actId="164"/>
+          <ac:spMkLst>
+            <pc:docMk/>
+            <pc:sldMk cId="417216440" sldId="259"/>
+            <ac:spMk id="211" creationId="{10E09DD0-303C-8B46-AFEA-F836B08D85A4}"/>
+          </ac:spMkLst>
+        </pc:spChg>
+        <pc:spChg chg="add mod">
+          <ac:chgData name="NIKHIL SAWAL" userId="c8dee9c8a82970a7" providerId="LiveId" clId="{5D13D954-F149-3944-BE6D-5630D4E0E09B}" dt="2021-02-02T15:57:17.464" v="15" actId="164"/>
+          <ac:spMkLst>
+            <pc:docMk/>
+            <pc:sldMk cId="417216440" sldId="259"/>
+            <ac:spMk id="220" creationId="{4F0F5F27-4FFC-E846-ACA9-6C8A6F62D539}"/>
+          </ac:spMkLst>
+        </pc:spChg>
+        <pc:spChg chg="add mod">
+          <ac:chgData name="NIKHIL SAWAL" userId="c8dee9c8a82970a7" providerId="LiveId" clId="{5D13D954-F149-3944-BE6D-5630D4E0E09B}" dt="2021-02-02T15:57:17.464" v="15" actId="164"/>
+          <ac:spMkLst>
+            <pc:docMk/>
+            <pc:sldMk cId="417216440" sldId="259"/>
+            <ac:spMk id="221" creationId="{6E2516C8-A379-5E4B-93CB-8BDF1E415F6B}"/>
+          </ac:spMkLst>
+        </pc:spChg>
+        <pc:spChg chg="add mod">
+          <ac:chgData name="NIKHIL SAWAL" userId="c8dee9c8a82970a7" providerId="LiveId" clId="{5D13D954-F149-3944-BE6D-5630D4E0E09B}" dt="2021-02-02T15:57:17.464" v="15" actId="164"/>
+          <ac:spMkLst>
+            <pc:docMk/>
+            <pc:sldMk cId="417216440" sldId="259"/>
+            <ac:spMk id="229" creationId="{D85F6446-A093-9148-B6B0-BCEADB2FEF5F}"/>
+          </ac:spMkLst>
+        </pc:spChg>
+        <pc:spChg chg="add mod">
+          <ac:chgData name="NIKHIL SAWAL" userId="c8dee9c8a82970a7" providerId="LiveId" clId="{5D13D954-F149-3944-BE6D-5630D4E0E09B}" dt="2021-02-02T15:57:17.464" v="15" actId="164"/>
+          <ac:spMkLst>
+            <pc:docMk/>
+            <pc:sldMk cId="417216440" sldId="259"/>
+            <ac:spMk id="230" creationId="{88BDEEA4-FDDA-2A4D-AD67-F25979E943C2}"/>
+          </ac:spMkLst>
+        </pc:spChg>
+        <pc:spChg chg="add mod">
+          <ac:chgData name="NIKHIL SAWAL" userId="c8dee9c8a82970a7" providerId="LiveId" clId="{5D13D954-F149-3944-BE6D-5630D4E0E09B}" dt="2021-02-02T15:57:17.464" v="15" actId="164"/>
+          <ac:spMkLst>
+            <pc:docMk/>
+            <pc:sldMk cId="417216440" sldId="259"/>
+            <ac:spMk id="234" creationId="{ED120E84-CF75-5448-8CF0-AF9B9CD95D08}"/>
+          </ac:spMkLst>
+        </pc:spChg>
+        <pc:spChg chg="add mod">
+          <ac:chgData name="NIKHIL SAWAL" userId="c8dee9c8a82970a7" providerId="LiveId" clId="{5D13D954-F149-3944-BE6D-5630D4E0E09B}" dt="2021-02-02T15:57:17.464" v="15" actId="164"/>
+          <ac:spMkLst>
+            <pc:docMk/>
+            <pc:sldMk cId="417216440" sldId="259"/>
+            <ac:spMk id="235" creationId="{46515788-7D1A-7E4D-B950-15BB99942998}"/>
+          </ac:spMkLst>
+        </pc:spChg>
+        <pc:spChg chg="add mod">
+          <ac:chgData name="NIKHIL SAWAL" userId="c8dee9c8a82970a7" providerId="LiveId" clId="{5D13D954-F149-3944-BE6D-5630D4E0E09B}" dt="2021-02-02T15:57:17.464" v="15" actId="164"/>
+          <ac:spMkLst>
+            <pc:docMk/>
+            <pc:sldMk cId="417216440" sldId="259"/>
+            <ac:spMk id="236" creationId="{8FF131E5-D025-3841-974C-BD9F9C7BCEA9}"/>
+          </ac:spMkLst>
+        </pc:spChg>
+        <pc:spChg chg="add mod">
+          <ac:chgData name="NIKHIL SAWAL" userId="c8dee9c8a82970a7" providerId="LiveId" clId="{5D13D954-F149-3944-BE6D-5630D4E0E09B}" dt="2021-02-02T15:57:17.464" v="15" actId="164"/>
+          <ac:spMkLst>
+            <pc:docMk/>
+            <pc:sldMk cId="417216440" sldId="259"/>
+            <ac:spMk id="237" creationId="{9A782FE9-B7C4-C146-A3EE-5B57649070FB}"/>
+          </ac:spMkLst>
+        </pc:spChg>
+        <pc:spChg chg="add mod">
+          <ac:chgData name="NIKHIL SAWAL" userId="c8dee9c8a82970a7" providerId="LiveId" clId="{5D13D954-F149-3944-BE6D-5630D4E0E09B}" dt="2021-02-02T15:57:17.464" v="15" actId="164"/>
+          <ac:spMkLst>
+            <pc:docMk/>
+            <pc:sldMk cId="417216440" sldId="259"/>
+            <ac:spMk id="238" creationId="{EF2E45BD-D5E3-CB46-B7DA-BF0CE32666AA}"/>
+          </ac:spMkLst>
+        </pc:spChg>
+        <pc:spChg chg="add mod">
+          <ac:chgData name="NIKHIL SAWAL" userId="c8dee9c8a82970a7" providerId="LiveId" clId="{5D13D954-F149-3944-BE6D-5630D4E0E09B}" dt="2021-02-02T15:57:17.464" v="15" actId="164"/>
+          <ac:spMkLst>
+            <pc:docMk/>
+            <pc:sldMk cId="417216440" sldId="259"/>
+            <ac:spMk id="239" creationId="{D6DBFA36-2536-C24F-AF2A-FE78002A74D6}"/>
+          </ac:spMkLst>
+        </pc:spChg>
+        <pc:grpChg chg="add mod">
+          <ac:chgData name="NIKHIL SAWAL" userId="c8dee9c8a82970a7" providerId="LiveId" clId="{5D13D954-F149-3944-BE6D-5630D4E0E09B}" dt="2021-02-02T15:57:17.464" v="15" actId="164"/>
+          <ac:grpSpMkLst>
+            <pc:docMk/>
+            <pc:sldMk cId="417216440" sldId="259"/>
+            <ac:grpSpMk id="2" creationId="{4CE464F5-AD68-694B-9BF8-53EA8519170E}"/>
+          </ac:grpSpMkLst>
+        </pc:grpChg>
+        <pc:grpChg chg="del">
+          <ac:chgData name="NIKHIL SAWAL" userId="c8dee9c8a82970a7" providerId="LiveId" clId="{5D13D954-F149-3944-BE6D-5630D4E0E09B}" dt="2021-02-02T15:56:59.143" v="11" actId="478"/>
+          <ac:grpSpMkLst>
+            <pc:docMk/>
+            <pc:sldMk cId="417216440" sldId="259"/>
+            <ac:grpSpMk id="122" creationId="{58E409D9-FED8-B94F-9786-67EA1A53C38B}"/>
+          </ac:grpSpMkLst>
+        </pc:grpChg>
+        <pc:picChg chg="add del mod">
+          <ac:chgData name="NIKHIL SAWAL" userId="c8dee9c8a82970a7" providerId="LiveId" clId="{5D13D954-F149-3944-BE6D-5630D4E0E09B}" dt="2021-02-02T15:57:04.156" v="13"/>
+          <ac:picMkLst>
+            <pc:docMk/>
+            <pc:sldMk cId="417216440" sldId="259"/>
+            <ac:picMk id="132" creationId="{E49F598F-4E9F-C54A-96FE-369AB282D52E}"/>
+          </ac:picMkLst>
+        </pc:picChg>
+        <pc:picChg chg="add del mod">
+          <ac:chgData name="NIKHIL SAWAL" userId="c8dee9c8a82970a7" providerId="LiveId" clId="{5D13D954-F149-3944-BE6D-5630D4E0E09B}" dt="2021-02-02T15:57:04.156" v="13"/>
+          <ac:picMkLst>
+            <pc:docMk/>
+            <pc:sldMk cId="417216440" sldId="259"/>
+            <ac:picMk id="143" creationId="{740B4CEE-DF7F-CC4C-9604-D467E23A38A3}"/>
+          </ac:picMkLst>
+        </pc:picChg>
+        <pc:picChg chg="add del mod">
+          <ac:chgData name="NIKHIL SAWAL" userId="c8dee9c8a82970a7" providerId="LiveId" clId="{5D13D954-F149-3944-BE6D-5630D4E0E09B}" dt="2021-02-02T15:57:04.156" v="13"/>
+          <ac:picMkLst>
+            <pc:docMk/>
+            <pc:sldMk cId="417216440" sldId="259"/>
+            <ac:picMk id="144" creationId="{9BBCEC4F-C111-2547-8FFC-E6E24B5B428B}"/>
+          </ac:picMkLst>
+        </pc:picChg>
+        <pc:picChg chg="add del mod">
+          <ac:chgData name="NIKHIL SAWAL" userId="c8dee9c8a82970a7" providerId="LiveId" clId="{5D13D954-F149-3944-BE6D-5630D4E0E09B}" dt="2021-02-02T15:57:04.156" v="13"/>
+          <ac:picMkLst>
+            <pc:docMk/>
+            <pc:sldMk cId="417216440" sldId="259"/>
+            <ac:picMk id="145" creationId="{3CA502A3-0D90-F445-80A7-E6EE15079DDF}"/>
+          </ac:picMkLst>
+        </pc:picChg>
+        <pc:picChg chg="add del mod">
+          <ac:chgData name="NIKHIL SAWAL" userId="c8dee9c8a82970a7" providerId="LiveId" clId="{5D13D954-F149-3944-BE6D-5630D4E0E09B}" dt="2021-02-02T15:57:04.156" v="13"/>
+          <ac:picMkLst>
+            <pc:docMk/>
+            <pc:sldMk cId="417216440" sldId="259"/>
+            <ac:picMk id="146" creationId="{4D97F483-5AB7-C74F-AE9D-DFF809410187}"/>
+          </ac:picMkLst>
+        </pc:picChg>
+        <pc:picChg chg="add del mod">
+          <ac:chgData name="NIKHIL SAWAL" userId="c8dee9c8a82970a7" providerId="LiveId" clId="{5D13D954-F149-3944-BE6D-5630D4E0E09B}" dt="2021-02-02T15:57:04.156" v="13"/>
+          <ac:picMkLst>
+            <pc:docMk/>
+            <pc:sldMk cId="417216440" sldId="259"/>
+            <ac:picMk id="147" creationId="{7A6EAC2D-77C3-324F-866C-86532389C3D4}"/>
+          </ac:picMkLst>
+        </pc:picChg>
+        <pc:picChg chg="add del mod">
+          <ac:chgData name="NIKHIL SAWAL" userId="c8dee9c8a82970a7" providerId="LiveId" clId="{5D13D954-F149-3944-BE6D-5630D4E0E09B}" dt="2021-02-02T15:57:04.156" v="13"/>
+          <ac:picMkLst>
+            <pc:docMk/>
+            <pc:sldMk cId="417216440" sldId="259"/>
+            <ac:picMk id="148" creationId="{84B30134-0C4A-734B-9B84-63C927C30A21}"/>
+          </ac:picMkLst>
+        </pc:picChg>
+        <pc:picChg chg="add del mod">
+          <ac:chgData name="NIKHIL SAWAL" userId="c8dee9c8a82970a7" providerId="LiveId" clId="{5D13D954-F149-3944-BE6D-5630D4E0E09B}" dt="2021-02-02T15:57:04.156" v="13"/>
+          <ac:picMkLst>
+            <pc:docMk/>
+            <pc:sldMk cId="417216440" sldId="259"/>
+            <ac:picMk id="150" creationId="{76058F51-0EF0-F04A-BA9E-A9EBB37B892D}"/>
+          </ac:picMkLst>
+        </pc:picChg>
+        <pc:picChg chg="add del mod">
+          <ac:chgData name="NIKHIL SAWAL" userId="c8dee9c8a82970a7" providerId="LiveId" clId="{5D13D954-F149-3944-BE6D-5630D4E0E09B}" dt="2021-02-02T15:57:04.156" v="13"/>
+          <ac:picMkLst>
+            <pc:docMk/>
+            <pc:sldMk cId="417216440" sldId="259"/>
+            <ac:picMk id="159" creationId="{F969E12C-AF0A-134C-A6BE-2039E62B6D1C}"/>
+          </ac:picMkLst>
+        </pc:picChg>
+        <pc:picChg chg="add del mod">
+          <ac:chgData name="NIKHIL SAWAL" userId="c8dee9c8a82970a7" providerId="LiveId" clId="{5D13D954-F149-3944-BE6D-5630D4E0E09B}" dt="2021-02-02T15:57:04.156" v="13"/>
+          <ac:picMkLst>
+            <pc:docMk/>
+            <pc:sldMk cId="417216440" sldId="259"/>
+            <ac:picMk id="160" creationId="{57079536-3F50-A241-9525-355C964BDF63}"/>
+          </ac:picMkLst>
+        </pc:picChg>
+        <pc:picChg chg="add del mod">
+          <ac:chgData name="NIKHIL SAWAL" userId="c8dee9c8a82970a7" providerId="LiveId" clId="{5D13D954-F149-3944-BE6D-5630D4E0E09B}" dt="2021-02-02T15:57:04.156" v="13"/>
+          <ac:picMkLst>
+            <pc:docMk/>
+            <pc:sldMk cId="417216440" sldId="259"/>
+            <ac:picMk id="163" creationId="{FF2EED43-235D-BD43-A030-E28981F18EC9}"/>
+          </ac:picMkLst>
+        </pc:picChg>
+        <pc:picChg chg="add del mod">
+          <ac:chgData name="NIKHIL SAWAL" userId="c8dee9c8a82970a7" providerId="LiveId" clId="{5D13D954-F149-3944-BE6D-5630D4E0E09B}" dt="2021-02-02T15:57:04.156" v="13"/>
+          <ac:picMkLst>
+            <pc:docMk/>
+            <pc:sldMk cId="417216440" sldId="259"/>
+            <ac:picMk id="164" creationId="{2EA70484-8F05-F646-AE18-F0D477BC5DCE}"/>
+          </ac:picMkLst>
+        </pc:picChg>
+        <pc:picChg chg="add del mod">
+          <ac:chgData name="NIKHIL SAWAL" userId="c8dee9c8a82970a7" providerId="LiveId" clId="{5D13D954-F149-3944-BE6D-5630D4E0E09B}" dt="2021-02-02T15:57:04.156" v="13"/>
+          <ac:picMkLst>
+            <pc:docMk/>
+            <pc:sldMk cId="417216440" sldId="259"/>
+            <ac:picMk id="172" creationId="{71F839E8-25C3-E448-A9EF-E60B2B61F3DB}"/>
+          </ac:picMkLst>
+        </pc:picChg>
+        <pc:picChg chg="add del mod">
+          <ac:chgData name="NIKHIL SAWAL" userId="c8dee9c8a82970a7" providerId="LiveId" clId="{5D13D954-F149-3944-BE6D-5630D4E0E09B}" dt="2021-02-02T15:57:04.156" v="13"/>
+          <ac:picMkLst>
+            <pc:docMk/>
+            <pc:sldMk cId="417216440" sldId="259"/>
+            <ac:picMk id="173" creationId="{FFE12A7C-CD86-C24C-AC8A-21435D43AC9A}"/>
+          </ac:picMkLst>
+        </pc:picChg>
+        <pc:picChg chg="add del mod">
+          <ac:chgData name="NIKHIL SAWAL" userId="c8dee9c8a82970a7" providerId="LiveId" clId="{5D13D954-F149-3944-BE6D-5630D4E0E09B}" dt="2021-02-02T15:57:04.156" v="13"/>
+          <ac:picMkLst>
+            <pc:docMk/>
+            <pc:sldMk cId="417216440" sldId="259"/>
+            <ac:picMk id="174" creationId="{1B4C27C1-2E93-4348-A119-782FB1D09120}"/>
+          </ac:picMkLst>
+        </pc:picChg>
+        <pc:picChg chg="add mod">
+          <ac:chgData name="NIKHIL SAWAL" userId="c8dee9c8a82970a7" providerId="LiveId" clId="{5D13D954-F149-3944-BE6D-5630D4E0E09B}" dt="2021-02-02T15:57:17.464" v="15" actId="164"/>
+          <ac:picMkLst>
+            <pc:docMk/>
+            <pc:sldMk cId="417216440" sldId="259"/>
+            <ac:picMk id="191" creationId="{6AC1564F-CA3F-BC4C-97F5-4BA1EABD04BE}"/>
+          </ac:picMkLst>
+        </pc:picChg>
+        <pc:picChg chg="add mod">
+          <ac:chgData name="NIKHIL SAWAL" userId="c8dee9c8a82970a7" providerId="LiveId" clId="{5D13D954-F149-3944-BE6D-5630D4E0E09B}" dt="2021-02-02T15:57:17.464" v="15" actId="164"/>
+          <ac:picMkLst>
+            <pc:docMk/>
+            <pc:sldMk cId="417216440" sldId="259"/>
+            <ac:picMk id="202" creationId="{0755F06D-57F3-CF4C-9863-789854BAEDE8}"/>
+          </ac:picMkLst>
+        </pc:picChg>
+        <pc:picChg chg="add mod">
+          <ac:chgData name="NIKHIL SAWAL" userId="c8dee9c8a82970a7" providerId="LiveId" clId="{5D13D954-F149-3944-BE6D-5630D4E0E09B}" dt="2021-02-02T15:57:17.464" v="15" actId="164"/>
+          <ac:picMkLst>
+            <pc:docMk/>
+            <pc:sldMk cId="417216440" sldId="259"/>
+            <ac:picMk id="203" creationId="{F54B2A8F-071B-7749-BC2B-8E71CBAAB134}"/>
+          </ac:picMkLst>
+        </pc:picChg>
+        <pc:picChg chg="add mod">
+          <ac:chgData name="NIKHIL SAWAL" userId="c8dee9c8a82970a7" providerId="LiveId" clId="{5D13D954-F149-3944-BE6D-5630D4E0E09B}" dt="2021-02-02T15:57:17.464" v="15" actId="164"/>
+          <ac:picMkLst>
+            <pc:docMk/>
+            <pc:sldMk cId="417216440" sldId="259"/>
+            <ac:picMk id="204" creationId="{1C3F7983-2FE2-CD49-A7C4-54D4DDDAD693}"/>
+          </ac:picMkLst>
+        </pc:picChg>
+        <pc:picChg chg="add mod">
+          <ac:chgData name="NIKHIL SAWAL" userId="c8dee9c8a82970a7" providerId="LiveId" clId="{5D13D954-F149-3944-BE6D-5630D4E0E09B}" dt="2021-02-02T15:57:17.464" v="15" actId="164"/>
+          <ac:picMkLst>
+            <pc:docMk/>
+            <pc:sldMk cId="417216440" sldId="259"/>
+            <ac:picMk id="205" creationId="{4B46E74A-DD25-3A4E-9529-894A1D2EEBA7}"/>
+          </ac:picMkLst>
+        </pc:picChg>
+        <pc:picChg chg="add mod">
+          <ac:chgData name="NIKHIL SAWAL" userId="c8dee9c8a82970a7" providerId="LiveId" clId="{5D13D954-F149-3944-BE6D-5630D4E0E09B}" dt="2021-02-02T15:57:17.464" v="15" actId="164"/>
+          <ac:picMkLst>
+            <pc:docMk/>
+            <pc:sldMk cId="417216440" sldId="259"/>
+            <ac:picMk id="206" creationId="{965B33C2-2400-7F42-8351-15E0614A0F05}"/>
+          </ac:picMkLst>
+        </pc:picChg>
+        <pc:picChg chg="add mod">
+          <ac:chgData name="NIKHIL SAWAL" userId="c8dee9c8a82970a7" providerId="LiveId" clId="{5D13D954-F149-3944-BE6D-5630D4E0E09B}" dt="2021-02-02T15:57:17.464" v="15" actId="164"/>
+          <ac:picMkLst>
+            <pc:docMk/>
+            <pc:sldMk cId="417216440" sldId="259"/>
+            <ac:picMk id="207" creationId="{8012B781-31A2-E442-8C8A-3814D550F0D2}"/>
+          </ac:picMkLst>
+        </pc:picChg>
+        <pc:picChg chg="add mod">
+          <ac:chgData name="NIKHIL SAWAL" userId="c8dee9c8a82970a7" providerId="LiveId" clId="{5D13D954-F149-3944-BE6D-5630D4E0E09B}" dt="2021-02-02T15:57:17.464" v="15" actId="164"/>
+          <ac:picMkLst>
+            <pc:docMk/>
+            <pc:sldMk cId="417216440" sldId="259"/>
+            <ac:picMk id="209" creationId="{EAB8B813-3C8D-8946-9142-3291546891C6}"/>
+          </ac:picMkLst>
+        </pc:picChg>
+        <pc:picChg chg="add mod">
+          <ac:chgData name="NIKHIL SAWAL" userId="c8dee9c8a82970a7" providerId="LiveId" clId="{5D13D954-F149-3944-BE6D-5630D4E0E09B}" dt="2021-02-02T15:57:17.464" v="15" actId="164"/>
+          <ac:picMkLst>
+            <pc:docMk/>
+            <pc:sldMk cId="417216440" sldId="259"/>
+            <ac:picMk id="218" creationId="{F18FE00C-984A-E248-BEDC-8449BC10915D}"/>
+          </ac:picMkLst>
+        </pc:picChg>
+        <pc:picChg chg="add mod">
+          <ac:chgData name="NIKHIL SAWAL" userId="c8dee9c8a82970a7" providerId="LiveId" clId="{5D13D954-F149-3944-BE6D-5630D4E0E09B}" dt="2021-02-02T15:57:17.464" v="15" actId="164"/>
+          <ac:picMkLst>
+            <pc:docMk/>
+            <pc:sldMk cId="417216440" sldId="259"/>
+            <ac:picMk id="219" creationId="{DEA682E0-D2A5-9042-91B3-D7C80D98077E}"/>
+          </ac:picMkLst>
+        </pc:picChg>
+        <pc:picChg chg="add mod">
+          <ac:chgData name="NIKHIL SAWAL" userId="c8dee9c8a82970a7" providerId="LiveId" clId="{5D13D954-F149-3944-BE6D-5630D4E0E09B}" dt="2021-02-02T15:57:17.464" v="15" actId="164"/>
+          <ac:picMkLst>
+            <pc:docMk/>
+            <pc:sldMk cId="417216440" sldId="259"/>
+            <ac:picMk id="222" creationId="{06A92E52-268D-AE4B-9C66-EDD1A17FA57C}"/>
+          </ac:picMkLst>
+        </pc:picChg>
+        <pc:picChg chg="add mod">
+          <ac:chgData name="NIKHIL SAWAL" userId="c8dee9c8a82970a7" providerId="LiveId" clId="{5D13D954-F149-3944-BE6D-5630D4E0E09B}" dt="2021-02-02T15:57:17.464" v="15" actId="164"/>
+          <ac:picMkLst>
+            <pc:docMk/>
+            <pc:sldMk cId="417216440" sldId="259"/>
+            <ac:picMk id="223" creationId="{18DC3E0F-7642-DC41-8AF6-A7FC510BB6A9}"/>
+          </ac:picMkLst>
+        </pc:picChg>
+        <pc:picChg chg="add mod">
+          <ac:chgData name="NIKHIL SAWAL" userId="c8dee9c8a82970a7" providerId="LiveId" clId="{5D13D954-F149-3944-BE6D-5630D4E0E09B}" dt="2021-02-02T15:57:17.464" v="15" actId="164"/>
+          <ac:picMkLst>
+            <pc:docMk/>
+            <pc:sldMk cId="417216440" sldId="259"/>
+            <ac:picMk id="231" creationId="{919EA5FA-3407-3843-9C96-A8EB3524DDCA}"/>
+          </ac:picMkLst>
+        </pc:picChg>
+        <pc:picChg chg="add mod">
+          <ac:chgData name="NIKHIL SAWAL" userId="c8dee9c8a82970a7" providerId="LiveId" clId="{5D13D954-F149-3944-BE6D-5630D4E0E09B}" dt="2021-02-02T15:57:17.464" v="15" actId="164"/>
+          <ac:picMkLst>
+            <pc:docMk/>
+            <pc:sldMk cId="417216440" sldId="259"/>
+            <ac:picMk id="232" creationId="{8B873610-E5F0-284C-BCDA-D806C8152172}"/>
+          </ac:picMkLst>
+        </pc:picChg>
+        <pc:picChg chg="add mod">
+          <ac:chgData name="NIKHIL SAWAL" userId="c8dee9c8a82970a7" providerId="LiveId" clId="{5D13D954-F149-3944-BE6D-5630D4E0E09B}" dt="2021-02-02T15:57:17.464" v="15" actId="164"/>
+          <ac:picMkLst>
+            <pc:docMk/>
+            <pc:sldMk cId="417216440" sldId="259"/>
+            <ac:picMk id="233" creationId="{28D6AEA8-A143-A746-A6A3-2E3A4BB400FE}"/>
+          </ac:picMkLst>
+        </pc:picChg>
+        <pc:cxnChg chg="add del mod">
+          <ac:chgData name="NIKHIL SAWAL" userId="c8dee9c8a82970a7" providerId="LiveId" clId="{5D13D954-F149-3944-BE6D-5630D4E0E09B}" dt="2021-02-02T15:57:04.156" v="13"/>
+          <ac:cxnSpMkLst>
+            <pc:docMk/>
+            <pc:sldMk cId="417216440" sldId="259"/>
+            <ac:cxnSpMk id="133" creationId="{659B8A0E-B3AB-8042-8520-411853A05ECA}"/>
+          </ac:cxnSpMkLst>
+        </pc:cxnChg>
+        <pc:cxnChg chg="add del mod">
+          <ac:chgData name="NIKHIL SAWAL" userId="c8dee9c8a82970a7" providerId="LiveId" clId="{5D13D954-F149-3944-BE6D-5630D4E0E09B}" dt="2021-02-02T15:57:04.156" v="13"/>
+          <ac:cxnSpMkLst>
+            <pc:docMk/>
+            <pc:sldMk cId="417216440" sldId="259"/>
+            <ac:cxnSpMk id="134" creationId="{944730F5-7852-C340-8903-CD4DC890E57A}"/>
+          </ac:cxnSpMkLst>
+        </pc:cxnChg>
+        <pc:cxnChg chg="add del mod">
+          <ac:chgData name="NIKHIL SAWAL" userId="c8dee9c8a82970a7" providerId="LiveId" clId="{5D13D954-F149-3944-BE6D-5630D4E0E09B}" dt="2021-02-02T15:57:04.156" v="13"/>
+          <ac:cxnSpMkLst>
+            <pc:docMk/>
+            <pc:sldMk cId="417216440" sldId="259"/>
+            <ac:cxnSpMk id="135" creationId="{6504CE0C-0C33-BC48-9773-78C82267583B}"/>
+          </ac:cxnSpMkLst>
+        </pc:cxnChg>
+        <pc:cxnChg chg="add del mod">
+          <ac:chgData name="NIKHIL SAWAL" userId="c8dee9c8a82970a7" providerId="LiveId" clId="{5D13D954-F149-3944-BE6D-5630D4E0E09B}" dt="2021-02-02T15:57:04.156" v="13"/>
+          <ac:cxnSpMkLst>
+            <pc:docMk/>
+            <pc:sldMk cId="417216440" sldId="259"/>
+            <ac:cxnSpMk id="136" creationId="{DD2E9E57-EB2C-634B-83F9-BCCEBB58CE9B}"/>
+          </ac:cxnSpMkLst>
+        </pc:cxnChg>
+        <pc:cxnChg chg="add del mod">
+          <ac:chgData name="NIKHIL SAWAL" userId="c8dee9c8a82970a7" providerId="LiveId" clId="{5D13D954-F149-3944-BE6D-5630D4E0E09B}" dt="2021-02-02T15:57:04.156" v="13"/>
+          <ac:cxnSpMkLst>
+            <pc:docMk/>
+            <pc:sldMk cId="417216440" sldId="259"/>
+            <ac:cxnSpMk id="137" creationId="{89237508-57E9-0F47-92B5-7BAD7388B546}"/>
+          </ac:cxnSpMkLst>
+        </pc:cxnChg>
+        <pc:cxnChg chg="add del mod">
+          <ac:chgData name="NIKHIL SAWAL" userId="c8dee9c8a82970a7" providerId="LiveId" clId="{5D13D954-F149-3944-BE6D-5630D4E0E09B}" dt="2021-02-02T15:57:04.156" v="13"/>
+          <ac:cxnSpMkLst>
+            <pc:docMk/>
+            <pc:sldMk cId="417216440" sldId="259"/>
+            <ac:cxnSpMk id="138" creationId="{0FBCC9F6-CEDE-BE4B-AF07-F217FF571A3D}"/>
+          </ac:cxnSpMkLst>
+        </pc:cxnChg>
+        <pc:cxnChg chg="add del mod">
+          <ac:chgData name="NIKHIL SAWAL" userId="c8dee9c8a82970a7" providerId="LiveId" clId="{5D13D954-F149-3944-BE6D-5630D4E0E09B}" dt="2021-02-02T15:57:04.156" v="13"/>
+          <ac:cxnSpMkLst>
+            <pc:docMk/>
+            <pc:sldMk cId="417216440" sldId="259"/>
+            <ac:cxnSpMk id="139" creationId="{C9D06E93-52E4-7140-B219-DB77DEAE5F1A}"/>
+          </ac:cxnSpMkLst>
+        </pc:cxnChg>
+        <pc:cxnChg chg="add del mod">
+          <ac:chgData name="NIKHIL SAWAL" userId="c8dee9c8a82970a7" providerId="LiveId" clId="{5D13D954-F149-3944-BE6D-5630D4E0E09B}" dt="2021-02-02T15:57:04.156" v="13"/>
+          <ac:cxnSpMkLst>
+            <pc:docMk/>
+            <pc:sldMk cId="417216440" sldId="259"/>
+            <ac:cxnSpMk id="140" creationId="{5DD7CEA8-EE2E-B94A-8D13-187C45D1E83A}"/>
+          </ac:cxnSpMkLst>
+        </pc:cxnChg>
+        <pc:cxnChg chg="add del mod">
+          <ac:chgData name="NIKHIL SAWAL" userId="c8dee9c8a82970a7" providerId="LiveId" clId="{5D13D954-F149-3944-BE6D-5630D4E0E09B}" dt="2021-02-02T15:57:04.156" v="13"/>
+          <ac:cxnSpMkLst>
+            <pc:docMk/>
+            <pc:sldMk cId="417216440" sldId="259"/>
+            <ac:cxnSpMk id="141" creationId="{DFC43179-DF6F-BB4A-860B-DF128AC873EC}"/>
+          </ac:cxnSpMkLst>
+        </pc:cxnChg>
+        <pc:cxnChg chg="add del mod">
+          <ac:chgData name="NIKHIL SAWAL" userId="c8dee9c8a82970a7" providerId="LiveId" clId="{5D13D954-F149-3944-BE6D-5630D4E0E09B}" dt="2021-02-02T15:57:04.156" v="13"/>
+          <ac:cxnSpMkLst>
+            <pc:docMk/>
+            <pc:sldMk cId="417216440" sldId="259"/>
+            <ac:cxnSpMk id="142" creationId="{3AEEB6CD-F23A-364F-9253-9F0F5CCB7DF3}"/>
+          </ac:cxnSpMkLst>
+        </pc:cxnChg>
+        <pc:cxnChg chg="add del mod">
+          <ac:chgData name="NIKHIL SAWAL" userId="c8dee9c8a82970a7" providerId="LiveId" clId="{5D13D954-F149-3944-BE6D-5630D4E0E09B}" dt="2021-02-02T15:57:04.156" v="13"/>
+          <ac:cxnSpMkLst>
+            <pc:docMk/>
+            <pc:sldMk cId="417216440" sldId="259"/>
+            <ac:cxnSpMk id="151" creationId="{828840B1-974B-E040-B2C4-1FD03A896807}"/>
+          </ac:cxnSpMkLst>
+        </pc:cxnChg>
+        <pc:cxnChg chg="add del mod">
+          <ac:chgData name="NIKHIL SAWAL" userId="c8dee9c8a82970a7" providerId="LiveId" clId="{5D13D954-F149-3944-BE6D-5630D4E0E09B}" dt="2021-02-02T15:57:04.156" v="13"/>
+          <ac:cxnSpMkLst>
+            <pc:docMk/>
+            <pc:sldMk cId="417216440" sldId="259"/>
+            <ac:cxnSpMk id="153" creationId="{88C414FB-8568-DD41-88B4-835301B34BB8}"/>
+          </ac:cxnSpMkLst>
+        </pc:cxnChg>
+        <pc:cxnChg chg="add del mod">
+          <ac:chgData name="NIKHIL SAWAL" userId="c8dee9c8a82970a7" providerId="LiveId" clId="{5D13D954-F149-3944-BE6D-5630D4E0E09B}" dt="2021-02-02T15:57:04.156" v="13"/>
+          <ac:cxnSpMkLst>
+            <pc:docMk/>
+            <pc:sldMk cId="417216440" sldId="259"/>
+            <ac:cxnSpMk id="154" creationId="{1A610B14-7EFF-9F42-85EF-51BA252447F7}"/>
+          </ac:cxnSpMkLst>
+        </pc:cxnChg>
+        <pc:cxnChg chg="add del mod">
+          <ac:chgData name="NIKHIL SAWAL" userId="c8dee9c8a82970a7" providerId="LiveId" clId="{5D13D954-F149-3944-BE6D-5630D4E0E09B}" dt="2021-02-02T15:57:04.156" v="13"/>
+          <ac:cxnSpMkLst>
+            <pc:docMk/>
+            <pc:sldMk cId="417216440" sldId="259"/>
+            <ac:cxnSpMk id="155" creationId="{087DFDC3-499C-324F-9D11-8DCCEE762C64}"/>
+          </ac:cxnSpMkLst>
+        </pc:cxnChg>
+        <pc:cxnChg chg="add del mod">
+          <ac:chgData name="NIKHIL SAWAL" userId="c8dee9c8a82970a7" providerId="LiveId" clId="{5D13D954-F149-3944-BE6D-5630D4E0E09B}" dt="2021-02-02T15:57:04.156" v="13"/>
+          <ac:cxnSpMkLst>
+            <pc:docMk/>
+            <pc:sldMk cId="417216440" sldId="259"/>
+            <ac:cxnSpMk id="156" creationId="{0CA831C0-BF1A-DE45-8549-84C210705B9D}"/>
+          </ac:cxnSpMkLst>
+        </pc:cxnChg>
+        <pc:cxnChg chg="add del mod">
+          <ac:chgData name="NIKHIL SAWAL" userId="c8dee9c8a82970a7" providerId="LiveId" clId="{5D13D954-F149-3944-BE6D-5630D4E0E09B}" dt="2021-02-02T15:57:04.156" v="13"/>
+          <ac:cxnSpMkLst>
+            <pc:docMk/>
+            <pc:sldMk cId="417216440" sldId="259"/>
+            <ac:cxnSpMk id="157" creationId="{35EEFDD5-E6B1-6F45-9846-69688A663404}"/>
+          </ac:cxnSpMkLst>
+        </pc:cxnChg>
+        <pc:cxnChg chg="add del mod">
+          <ac:chgData name="NIKHIL SAWAL" userId="c8dee9c8a82970a7" providerId="LiveId" clId="{5D13D954-F149-3944-BE6D-5630D4E0E09B}" dt="2021-02-02T15:57:04.156" v="13"/>
+          <ac:cxnSpMkLst>
+            <pc:docMk/>
+            <pc:sldMk cId="417216440" sldId="259"/>
+            <ac:cxnSpMk id="158" creationId="{D8B2288F-3533-CD45-B29D-D13390C91B09}"/>
+          </ac:cxnSpMkLst>
+        </pc:cxnChg>
+        <pc:cxnChg chg="add del mod">
+          <ac:chgData name="NIKHIL SAWAL" userId="c8dee9c8a82970a7" providerId="LiveId" clId="{5D13D954-F149-3944-BE6D-5630D4E0E09B}" dt="2021-02-02T15:57:04.156" v="13"/>
+          <ac:cxnSpMkLst>
+            <pc:docMk/>
+            <pc:sldMk cId="417216440" sldId="259"/>
+            <ac:cxnSpMk id="165" creationId="{C7B055C3-AAB2-7944-99B5-17980B2D7C84}"/>
+          </ac:cxnSpMkLst>
+        </pc:cxnChg>
+        <pc:cxnChg chg="add del mod">
+          <ac:chgData name="NIKHIL SAWAL" userId="c8dee9c8a82970a7" providerId="LiveId" clId="{5D13D954-F149-3944-BE6D-5630D4E0E09B}" dt="2021-02-02T15:57:04.156" v="13"/>
+          <ac:cxnSpMkLst>
+            <pc:docMk/>
+            <pc:sldMk cId="417216440" sldId="259"/>
+            <ac:cxnSpMk id="166" creationId="{693B2C51-5823-E44E-8AF6-30E314713BA8}"/>
+          </ac:cxnSpMkLst>
+        </pc:cxnChg>
+        <pc:cxnChg chg="add del mod">
+          <ac:chgData name="NIKHIL SAWAL" userId="c8dee9c8a82970a7" providerId="LiveId" clId="{5D13D954-F149-3944-BE6D-5630D4E0E09B}" dt="2021-02-02T15:57:04.156" v="13"/>
+          <ac:cxnSpMkLst>
+            <pc:docMk/>
+            <pc:sldMk cId="417216440" sldId="259"/>
+            <ac:cxnSpMk id="167" creationId="{46DC3B13-EBEE-1B4E-B515-06D1ABEFC1A9}"/>
+          </ac:cxnSpMkLst>
+        </pc:cxnChg>
+        <pc:cxnChg chg="add del mod">
+          <ac:chgData name="NIKHIL SAWAL" userId="c8dee9c8a82970a7" providerId="LiveId" clId="{5D13D954-F149-3944-BE6D-5630D4E0E09B}" dt="2021-02-02T15:57:04.156" v="13"/>
+          <ac:cxnSpMkLst>
+            <pc:docMk/>
+            <pc:sldMk cId="417216440" sldId="259"/>
+            <ac:cxnSpMk id="168" creationId="{F19EBF1A-542B-D14F-99FC-6109D8E63C87}"/>
+          </ac:cxnSpMkLst>
+        </pc:cxnChg>
+        <pc:cxnChg chg="add del mod">
+          <ac:chgData name="NIKHIL SAWAL" userId="c8dee9c8a82970a7" providerId="LiveId" clId="{5D13D954-F149-3944-BE6D-5630D4E0E09B}" dt="2021-02-02T15:57:04.156" v="13"/>
+          <ac:cxnSpMkLst>
+            <pc:docMk/>
+            <pc:sldMk cId="417216440" sldId="259"/>
+            <ac:cxnSpMk id="169" creationId="{4FC81774-C6B1-1A42-A7E7-BAE651464999}"/>
+          </ac:cxnSpMkLst>
+        </pc:cxnChg>
+        <pc:cxnChg chg="add mod">
+          <ac:chgData name="NIKHIL SAWAL" userId="c8dee9c8a82970a7" providerId="LiveId" clId="{5D13D954-F149-3944-BE6D-5630D4E0E09B}" dt="2021-02-02T15:57:17.464" v="15" actId="164"/>
+          <ac:cxnSpMkLst>
+            <pc:docMk/>
+            <pc:sldMk cId="417216440" sldId="259"/>
+            <ac:cxnSpMk id="192" creationId="{0054FF1A-2EEB-424C-8818-24FD7DEAE141}"/>
+          </ac:cxnSpMkLst>
+        </pc:cxnChg>
+        <pc:cxnChg chg="add mod">
+          <ac:chgData name="NIKHIL SAWAL" userId="c8dee9c8a82970a7" providerId="LiveId" clId="{5D13D954-F149-3944-BE6D-5630D4E0E09B}" dt="2021-02-02T15:57:17.464" v="15" actId="164"/>
+          <ac:cxnSpMkLst>
+            <pc:docMk/>
+            <pc:sldMk cId="417216440" sldId="259"/>
+            <ac:cxnSpMk id="193" creationId="{E197D26F-6EA6-4940-99B9-5CBB88508729}"/>
+          </ac:cxnSpMkLst>
+        </pc:cxnChg>
+        <pc:cxnChg chg="add mod">
+          <ac:chgData name="NIKHIL SAWAL" userId="c8dee9c8a82970a7" providerId="LiveId" clId="{5D13D954-F149-3944-BE6D-5630D4E0E09B}" dt="2021-02-02T15:57:17.464" v="15" actId="164"/>
+          <ac:cxnSpMkLst>
+            <pc:docMk/>
+            <pc:sldMk cId="417216440" sldId="259"/>
+            <ac:cxnSpMk id="194" creationId="{07079CA2-6B16-CB40-8D44-B869A98D2C9D}"/>
+          </ac:cxnSpMkLst>
+        </pc:cxnChg>
+        <pc:cxnChg chg="add mod">
+          <ac:chgData name="NIKHIL SAWAL" userId="c8dee9c8a82970a7" providerId="LiveId" clId="{5D13D954-F149-3944-BE6D-5630D4E0E09B}" dt="2021-02-02T15:57:17.464" v="15" actId="164"/>
+          <ac:cxnSpMkLst>
+            <pc:docMk/>
+            <pc:sldMk cId="417216440" sldId="259"/>
+            <ac:cxnSpMk id="195" creationId="{C71B4863-7709-CB45-B3A3-25050C6A794D}"/>
+          </ac:cxnSpMkLst>
+        </pc:cxnChg>
+        <pc:cxnChg chg="add mod">
+          <ac:chgData name="NIKHIL SAWAL" userId="c8dee9c8a82970a7" providerId="LiveId" clId="{5D13D954-F149-3944-BE6D-5630D4E0E09B}" dt="2021-02-02T15:57:17.464" v="15" actId="164"/>
+          <ac:cxnSpMkLst>
+            <pc:docMk/>
+            <pc:sldMk cId="417216440" sldId="259"/>
+            <ac:cxnSpMk id="196" creationId="{903CBA20-4D17-5249-BD90-79437B6CAB3B}"/>
+          </ac:cxnSpMkLst>
+        </pc:cxnChg>
+        <pc:cxnChg chg="add mod">
+          <ac:chgData name="NIKHIL SAWAL" userId="c8dee9c8a82970a7" providerId="LiveId" clId="{5D13D954-F149-3944-BE6D-5630D4E0E09B}" dt="2021-02-02T15:57:17.464" v="15" actId="164"/>
+          <ac:cxnSpMkLst>
+            <pc:docMk/>
+            <pc:sldMk cId="417216440" sldId="259"/>
+            <ac:cxnSpMk id="197" creationId="{841E2324-07A5-CC43-9B41-84E72AEA65F8}"/>
+          </ac:cxnSpMkLst>
+        </pc:cxnChg>
+        <pc:cxnChg chg="add mod">
+          <ac:chgData name="NIKHIL SAWAL" userId="c8dee9c8a82970a7" providerId="LiveId" clId="{5D13D954-F149-3944-BE6D-5630D4E0E09B}" dt="2021-02-02T15:57:17.464" v="15" actId="164"/>
+          <ac:cxnSpMkLst>
+            <pc:docMk/>
+            <pc:sldMk cId="417216440" sldId="259"/>
+            <ac:cxnSpMk id="198" creationId="{7A945F3E-C0D7-0D4E-84C0-A221DFA864E8}"/>
+          </ac:cxnSpMkLst>
+        </pc:cxnChg>
+        <pc:cxnChg chg="add mod">
+          <ac:chgData name="NIKHIL SAWAL" userId="c8dee9c8a82970a7" providerId="LiveId" clId="{5D13D954-F149-3944-BE6D-5630D4E0E09B}" dt="2021-02-02T15:57:17.464" v="15" actId="164"/>
+          <ac:cxnSpMkLst>
+            <pc:docMk/>
+            <pc:sldMk cId="417216440" sldId="259"/>
+            <ac:cxnSpMk id="199" creationId="{6AFA3B7E-B92A-2D4F-81B6-C9DC86ADF56D}"/>
+          </ac:cxnSpMkLst>
+        </pc:cxnChg>
+        <pc:cxnChg chg="add mod">
+          <ac:chgData name="NIKHIL SAWAL" userId="c8dee9c8a82970a7" providerId="LiveId" clId="{5D13D954-F149-3944-BE6D-5630D4E0E09B}" dt="2021-02-02T15:57:17.464" v="15" actId="164"/>
+          <ac:cxnSpMkLst>
+            <pc:docMk/>
+            <pc:sldMk cId="417216440" sldId="259"/>
+            <ac:cxnSpMk id="200" creationId="{61C23AAF-487B-AE44-8BCA-80523CD7EE99}"/>
+          </ac:cxnSpMkLst>
+        </pc:cxnChg>
+        <pc:cxnChg chg="add mod">
+          <ac:chgData name="NIKHIL SAWAL" userId="c8dee9c8a82970a7" providerId="LiveId" clId="{5D13D954-F149-3944-BE6D-5630D4E0E09B}" dt="2021-02-02T15:57:17.464" v="15" actId="164"/>
+          <ac:cxnSpMkLst>
+            <pc:docMk/>
+            <pc:sldMk cId="417216440" sldId="259"/>
+            <ac:cxnSpMk id="201" creationId="{6CE432DC-AF84-B845-858C-EF3689D3F594}"/>
+          </ac:cxnSpMkLst>
+        </pc:cxnChg>
+        <pc:cxnChg chg="add mod">
+          <ac:chgData name="NIKHIL SAWAL" userId="c8dee9c8a82970a7" providerId="LiveId" clId="{5D13D954-F149-3944-BE6D-5630D4E0E09B}" dt="2021-02-02T15:57:17.464" v="15" actId="164"/>
+          <ac:cxnSpMkLst>
+            <pc:docMk/>
+            <pc:sldMk cId="417216440" sldId="259"/>
+            <ac:cxnSpMk id="210" creationId="{67984614-7F61-8A4B-9DDB-304ED4145978}"/>
+          </ac:cxnSpMkLst>
+        </pc:cxnChg>
+        <pc:cxnChg chg="add mod">
+          <ac:chgData name="NIKHIL SAWAL" userId="c8dee9c8a82970a7" providerId="LiveId" clId="{5D13D954-F149-3944-BE6D-5630D4E0E09B}" dt="2021-02-02T15:57:17.464" v="15" actId="164"/>
+          <ac:cxnSpMkLst>
+            <pc:docMk/>
+            <pc:sldMk cId="417216440" sldId="259"/>
+            <ac:cxnSpMk id="212" creationId="{63A940E1-FC34-474D-9291-C8D5BB47D125}"/>
+          </ac:cxnSpMkLst>
+        </pc:cxnChg>
+        <pc:cxnChg chg="add mod">
+          <ac:chgData name="NIKHIL SAWAL" userId="c8dee9c8a82970a7" providerId="LiveId" clId="{5D13D954-F149-3944-BE6D-5630D4E0E09B}" dt="2021-02-02T15:57:17.464" v="15" actId="164"/>
+          <ac:cxnSpMkLst>
+            <pc:docMk/>
+            <pc:sldMk cId="417216440" sldId="259"/>
+            <ac:cxnSpMk id="213" creationId="{21BB348B-E637-5441-A5AC-4AA2D5B46DF8}"/>
+          </ac:cxnSpMkLst>
+        </pc:cxnChg>
+        <pc:cxnChg chg="add mod">
+          <ac:chgData name="NIKHIL SAWAL" userId="c8dee9c8a82970a7" providerId="LiveId" clId="{5D13D954-F149-3944-BE6D-5630D4E0E09B}" dt="2021-02-02T15:57:17.464" v="15" actId="164"/>
+          <ac:cxnSpMkLst>
+            <pc:docMk/>
+            <pc:sldMk cId="417216440" sldId="259"/>
+            <ac:cxnSpMk id="214" creationId="{B08E5B62-30B6-1243-BCC0-587F6C94108B}"/>
+          </ac:cxnSpMkLst>
+        </pc:cxnChg>
+        <pc:cxnChg chg="add mod">
+          <ac:chgData name="NIKHIL SAWAL" userId="c8dee9c8a82970a7" providerId="LiveId" clId="{5D13D954-F149-3944-BE6D-5630D4E0E09B}" dt="2021-02-02T15:57:17.464" v="15" actId="164"/>
+          <ac:cxnSpMkLst>
+            <pc:docMk/>
+            <pc:sldMk cId="417216440" sldId="259"/>
+            <ac:cxnSpMk id="215" creationId="{40D64AC0-D591-EF45-B449-869DFADDB4AF}"/>
+          </ac:cxnSpMkLst>
+        </pc:cxnChg>
+        <pc:cxnChg chg="add mod">
+          <ac:chgData name="NIKHIL SAWAL" userId="c8dee9c8a82970a7" providerId="LiveId" clId="{5D13D954-F149-3944-BE6D-5630D4E0E09B}" dt="2021-02-02T15:57:17.464" v="15" actId="164"/>
+          <ac:cxnSpMkLst>
+            <pc:docMk/>
+            <pc:sldMk cId="417216440" sldId="259"/>
+            <ac:cxnSpMk id="216" creationId="{B08FA935-6BB3-5542-B022-FF28E5C04987}"/>
+          </ac:cxnSpMkLst>
+        </pc:cxnChg>
+        <pc:cxnChg chg="add mod">
+          <ac:chgData name="NIKHIL SAWAL" userId="c8dee9c8a82970a7" providerId="LiveId" clId="{5D13D954-F149-3944-BE6D-5630D4E0E09B}" dt="2021-02-02T15:57:17.464" v="15" actId="164"/>
+          <ac:cxnSpMkLst>
+            <pc:docMk/>
+            <pc:sldMk cId="417216440" sldId="259"/>
+            <ac:cxnSpMk id="217" creationId="{B4A5AF68-03DD-EB4C-AEF9-783BE24EE4B7}"/>
+          </ac:cxnSpMkLst>
+        </pc:cxnChg>
+        <pc:cxnChg chg="add mod">
+          <ac:chgData name="NIKHIL SAWAL" userId="c8dee9c8a82970a7" providerId="LiveId" clId="{5D13D954-F149-3944-BE6D-5630D4E0E09B}" dt="2021-02-02T15:57:17.464" v="15" actId="164"/>
+          <ac:cxnSpMkLst>
+            <pc:docMk/>
+            <pc:sldMk cId="417216440" sldId="259"/>
+            <ac:cxnSpMk id="224" creationId="{5677D6E5-0A10-DA45-A027-0643BF5565A5}"/>
+          </ac:cxnSpMkLst>
+        </pc:cxnChg>
+        <pc:cxnChg chg="add mod">
+          <ac:chgData name="NIKHIL SAWAL" userId="c8dee9c8a82970a7" providerId="LiveId" clId="{5D13D954-F149-3944-BE6D-5630D4E0E09B}" dt="2021-02-02T15:57:17.464" v="15" actId="164"/>
+          <ac:cxnSpMkLst>
+            <pc:docMk/>
+            <pc:sldMk cId="417216440" sldId="259"/>
+            <ac:cxnSpMk id="225" creationId="{85C30A6D-8E7C-7F4C-A084-659F39DB2C1A}"/>
+          </ac:cxnSpMkLst>
+        </pc:cxnChg>
+        <pc:cxnChg chg="add mod">
+          <ac:chgData name="NIKHIL SAWAL" userId="c8dee9c8a82970a7" providerId="LiveId" clId="{5D13D954-F149-3944-BE6D-5630D4E0E09B}" dt="2021-02-02T15:57:17.464" v="15" actId="164"/>
+          <ac:cxnSpMkLst>
+            <pc:docMk/>
+            <pc:sldMk cId="417216440" sldId="259"/>
+            <ac:cxnSpMk id="226" creationId="{E804EE1F-3990-D044-AE66-22C3B5163490}"/>
+          </ac:cxnSpMkLst>
+        </pc:cxnChg>
+        <pc:cxnChg chg="add mod">
+          <ac:chgData name="NIKHIL SAWAL" userId="c8dee9c8a82970a7" providerId="LiveId" clId="{5D13D954-F149-3944-BE6D-5630D4E0E09B}" dt="2021-02-02T15:57:17.464" v="15" actId="164"/>
+          <ac:cxnSpMkLst>
+            <pc:docMk/>
+            <pc:sldMk cId="417216440" sldId="259"/>
+            <ac:cxnSpMk id="227" creationId="{E32BA9F8-C742-AA4B-8906-8C3A1D57E096}"/>
+          </ac:cxnSpMkLst>
+        </pc:cxnChg>
+        <pc:cxnChg chg="add mod">
+          <ac:chgData name="NIKHIL SAWAL" userId="c8dee9c8a82970a7" providerId="LiveId" clId="{5D13D954-F149-3944-BE6D-5630D4E0E09B}" dt="2021-02-02T15:57:17.464" v="15" actId="164"/>
+          <ac:cxnSpMkLst>
+            <pc:docMk/>
+            <pc:sldMk cId="417216440" sldId="259"/>
+            <ac:cxnSpMk id="228" creationId="{D6D7CAF5-2BE4-7B41-8776-1B18B035FCDC}"/>
+          </ac:cxnSpMkLst>
+        </pc:cxnChg>
+      </pc:sldChg>
+    </pc:docChg>
+  </pc:docChgLst>
+</pc:chgInfo>
 </file>
 
 <file path=ppt/slideLayouts/slideLayout1.xml><?xml version="1.0" encoding="utf-8"?>
@@ -3455,7 +4928,7 @@
             <a:r>
               <a:rPr lang="en-US" sz="1400" dirty="0">
                 <a:solidFill>
-                  <a:schemeClr val="bg1"/>
+                  <a:srgbClr val="FF0000"/>
                 </a:solidFill>
               </a:rPr>
               <a:t>companyProfile.py</a:t>
@@ -3506,7 +4979,7 @@
             <a:r>
               <a:rPr lang="en-US" sz="1400" dirty="0">
                 <a:solidFill>
-                  <a:schemeClr val="bg1"/>
+                  <a:srgbClr val="FF0000"/>
                 </a:solidFill>
               </a:rPr>
               <a:t>stockPrice.py</a:t>
@@ -3557,7 +5030,7 @@
             <a:r>
               <a:rPr lang="en-US" sz="1400" dirty="0">
                 <a:solidFill>
-                  <a:schemeClr val="bg1"/>
+                  <a:srgbClr val="FF0000"/>
                 </a:solidFill>
               </a:rPr>
               <a:t>marketIndex.py</a:t>
@@ -3607,7 +5080,7 @@
             <a:pPr algn="ctr"/>
             <a:endParaRPr lang="en-US" sz="1400" dirty="0">
               <a:solidFill>
-                <a:schemeClr val="bg1"/>
+                <a:srgbClr val="FF0000"/>
               </a:solidFill>
             </a:endParaRPr>
           </a:p>
@@ -3616,7 +5089,7 @@
             <a:r>
               <a:rPr lang="en-US" sz="1400" dirty="0">
                 <a:solidFill>
-                  <a:schemeClr val="bg1"/>
+                  <a:srgbClr val="FF0000"/>
                 </a:solidFill>
               </a:rPr>
               <a:t>company_profile.jl</a:t>
@@ -3666,7 +5139,7 @@
             <a:pPr algn="ctr"/>
             <a:endParaRPr lang="en-US" sz="1400" dirty="0">
               <a:solidFill>
-                <a:schemeClr val="bg1"/>
+                <a:srgbClr val="FF0000"/>
               </a:solidFill>
             </a:endParaRPr>
           </a:p>
@@ -3675,7 +5148,7 @@
             <a:r>
               <a:rPr lang="en-US" sz="1400" dirty="0">
                 <a:solidFill>
-                  <a:schemeClr val="bg1"/>
+                  <a:srgbClr val="FF0000"/>
                 </a:solidFill>
               </a:rPr>
               <a:t>stock_prices.jl</a:t>
@@ -3725,7 +5198,7 @@
             <a:pPr algn="ctr"/>
             <a:endParaRPr lang="en-US" sz="1400" dirty="0">
               <a:solidFill>
-                <a:schemeClr val="bg1"/>
+                <a:srgbClr val="FF0000"/>
               </a:solidFill>
             </a:endParaRPr>
           </a:p>
@@ -3734,7 +5207,7 @@
             <a:r>
               <a:rPr lang="en-US" sz="1400" dirty="0">
                 <a:solidFill>
-                  <a:schemeClr val="bg1"/>
+                  <a:srgbClr val="FF0000"/>
                 </a:solidFill>
               </a:rPr>
               <a:t>index.jl</a:t>
@@ -3785,7 +5258,7 @@
             <a:r>
               <a:rPr lang="en-US" sz="1400" dirty="0">
                 <a:solidFill>
-                  <a:schemeClr val="bg1"/>
+                  <a:srgbClr val="FF0000"/>
                 </a:solidFill>
               </a:rPr>
               <a:t>company_profile</a:t>
@@ -3836,7 +5309,7 @@
             <a:r>
               <a:rPr lang="en-US" sz="1400" dirty="0">
                 <a:solidFill>
-                  <a:schemeClr val="bg1"/>
+                  <a:srgbClr val="FF0000"/>
                 </a:solidFill>
               </a:rPr>
               <a:t>stock_price</a:t>
@@ -3887,7 +5360,7 @@
             <a:r>
               <a:rPr lang="en-US" sz="1400" dirty="0">
                 <a:solidFill>
-                  <a:schemeClr val="bg1"/>
+                  <a:srgbClr val="FF0000"/>
                 </a:solidFill>
               </a:rPr>
               <a:t>market_index</a:t>
@@ -3938,7 +5411,7 @@
             <a:r>
               <a:rPr lang="en-US" dirty="0">
                 <a:solidFill>
-                  <a:schemeClr val="bg1"/>
+                  <a:srgbClr val="FF0000"/>
                 </a:solidFill>
               </a:rPr>
               <a:t>Yahoo Finance</a:t>
@@ -4709,7 +6182,7 @@
             <a:r>
               <a:rPr lang="en-US" sz="1400" dirty="0">
                 <a:solidFill>
-                  <a:schemeClr val="bg1"/>
+                  <a:srgbClr val="FF0000"/>
                 </a:solidFill>
               </a:rPr>
               <a:t>pg_data_insert.py</a:t>
@@ -4851,7 +6324,7 @@
             <a:r>
               <a:rPr lang="en-US" sz="1400" dirty="0">
                 <a:solidFill>
-                  <a:schemeClr val="bg1"/>
+                  <a:srgbClr val="FF0000"/>
                 </a:solidFill>
               </a:rPr>
               <a:t>pg_create_db.py</a:t>
@@ -5224,7 +6697,10 @@
           </a:solidFill>
           <a:ln w="25400">
             <a:solidFill>
-              <a:srgbClr val="7030A0"/>
+              <a:schemeClr val="accent6">
+                <a:lumMod val="60000"/>
+                <a:lumOff val="40000"/>
+              </a:schemeClr>
             </a:solidFill>
             <a:prstDash val="dash"/>
           </a:ln>
@@ -5250,7 +6726,7 @@
             <a:pPr algn="ctr"/>
             <a:endParaRPr lang="en-US" dirty="0">
               <a:solidFill>
-                <a:schemeClr val="bg1"/>
+                <a:srgbClr val="FF0000"/>
               </a:solidFill>
             </a:endParaRPr>
           </a:p>
@@ -5309,7 +6785,7 @@
             <a:pPr algn="ctr"/>
             <a:endParaRPr lang="en-US" dirty="0">
               <a:solidFill>
-                <a:schemeClr val="bg1"/>
+                <a:srgbClr val="FF0000"/>
               </a:solidFill>
             </a:endParaRPr>
           </a:p>
@@ -5638,7 +7114,7 @@
         </p:nvSpPr>
         <p:spPr>
           <a:xfrm>
-            <a:off x="9220602" y="920332"/>
+            <a:off x="9220602" y="1000637"/>
             <a:ext cx="1255470" cy="369323"/>
           </a:xfrm>
           <a:prstGeom prst="rect">
@@ -5655,7 +7131,7 @@
             <a:r>
               <a:rPr lang="en-US" dirty="0">
                 <a:solidFill>
-                  <a:schemeClr val="bg1"/>
+                  <a:srgbClr val="FF0000"/>
                 </a:solidFill>
               </a:rPr>
               <a:t>track_proj</a:t>
@@ -5694,7 +7170,7 @@
             <a:r>
               <a:rPr lang="en-US" dirty="0">
                 <a:solidFill>
-                  <a:schemeClr val="bg1"/>
+                  <a:srgbClr val="FF0000"/>
                 </a:solidFill>
               </a:rPr>
               <a:t>Slack </a:t>
@@ -5704,7 +7180,7 @@
             <a:r>
               <a:rPr lang="en-US" dirty="0">
                 <a:solidFill>
-                  <a:schemeClr val="bg1"/>
+                  <a:srgbClr val="FF0000"/>
                 </a:solidFill>
               </a:rPr>
               <a:t>notifications</a:t>
@@ -5873,7 +7349,67 @@
           <a:prstGeom prst="leftBrace">
             <a:avLst/>
           </a:prstGeom>
-          <a:ln w="19050"/>
+          <a:solidFill>
+            <a:schemeClr val="bg1"/>
+          </a:solidFill>
+          <a:ln w="19050">
+            <a:solidFill>
+              <a:srgbClr val="FF0000"/>
+            </a:solidFill>
+          </a:ln>
+        </p:spPr>
+        <p:style>
+          <a:lnRef idx="1">
+            <a:schemeClr val="dk1"/>
+          </a:lnRef>
+          <a:fillRef idx="0">
+            <a:schemeClr val="dk1"/>
+          </a:fillRef>
+          <a:effectRef idx="0">
+            <a:schemeClr val="dk1"/>
+          </a:effectRef>
+          <a:fontRef idx="minor">
+            <a:schemeClr val="tx1"/>
+          </a:fontRef>
+        </p:style>
+        <p:txBody>
+          <a:bodyPr rtlCol="0" anchor="ctr"/>
+          <a:lstStyle/>
+          <a:p>
+            <a:pPr algn="ctr"/>
+            <a:endParaRPr lang="en-US" dirty="0">
+              <a:solidFill>
+                <a:srgbClr val="FF0000"/>
+              </a:solidFill>
+            </a:endParaRPr>
+          </a:p>
+        </p:txBody>
+      </p:sp>
+      <p:sp>
+        <p:nvSpPr>
+          <p:cNvPr id="131" name="Left Brace 130">
+            <a:extLst>
+              <a:ext uri="{FF2B5EF4-FFF2-40B4-BE49-F238E27FC236}">
+                <a16:creationId xmlns:a16="http://schemas.microsoft.com/office/drawing/2014/main" id="{BD2F9440-575F-7443-97EB-6448E33C08E9}"/>
+              </a:ext>
+            </a:extLst>
+          </p:cNvPr>
+          <p:cNvSpPr/>
+          <p:nvPr/>
+        </p:nvSpPr>
+        <p:spPr>
+          <a:xfrm>
+            <a:off x="1510256" y="4439567"/>
+            <a:ext cx="207170" cy="771244"/>
+          </a:xfrm>
+          <a:prstGeom prst="leftBrace">
+            <a:avLst/>
+          </a:prstGeom>
+          <a:ln w="19050">
+            <a:solidFill>
+              <a:srgbClr val="FF0000"/>
+            </a:solidFill>
+          </a:ln>
         </p:spPr>
         <p:style>
           <a:lnRef idx="1">
@@ -5896,7 +7432,7 @@
             <a:pPr algn="ctr"/>
             <a:endParaRPr lang="en-US">
               <a:solidFill>
-                <a:schemeClr val="bg1"/>
+                <a:srgbClr val="FF0000"/>
               </a:solidFill>
             </a:endParaRPr>
           </a:p>
@@ -5904,10 +7440,10 @@
       </p:sp>
       <p:sp>
         <p:nvSpPr>
-          <p:cNvPr id="131" name="Left Brace 130">
+          <p:cNvPr id="132" name="Left Brace 131">
             <a:extLst>
               <a:ext uri="{FF2B5EF4-FFF2-40B4-BE49-F238E27FC236}">
-                <a16:creationId xmlns:a16="http://schemas.microsoft.com/office/drawing/2014/main" id="{BD2F9440-575F-7443-97EB-6448E33C08E9}"/>
+                <a16:creationId xmlns:a16="http://schemas.microsoft.com/office/drawing/2014/main" id="{EE873E4B-1C73-A747-A149-3B7309FEAB5A}"/>
               </a:ext>
             </a:extLst>
           </p:cNvPr>
@@ -5916,13 +7452,17 @@
         </p:nvSpPr>
         <p:spPr>
           <a:xfrm>
-            <a:off x="1510256" y="4439567"/>
-            <a:ext cx="207170" cy="771244"/>
+            <a:off x="1721360" y="4430607"/>
+            <a:ext cx="224479" cy="2227618"/>
           </a:xfrm>
           <a:prstGeom prst="leftBrace">
             <a:avLst/>
           </a:prstGeom>
-          <a:ln w="19050"/>
+          <a:ln w="19050">
+            <a:solidFill>
+              <a:srgbClr val="FF0000"/>
+            </a:solidFill>
+          </a:ln>
         </p:spPr>
         <p:style>
           <a:lnRef idx="1">
@@ -5945,56 +7485,7 @@
             <a:pPr algn="ctr"/>
             <a:endParaRPr lang="en-US">
               <a:solidFill>
-                <a:schemeClr val="bg1"/>
-              </a:solidFill>
-            </a:endParaRPr>
-          </a:p>
-        </p:txBody>
-      </p:sp>
-      <p:sp>
-        <p:nvSpPr>
-          <p:cNvPr id="132" name="Left Brace 131">
-            <a:extLst>
-              <a:ext uri="{FF2B5EF4-FFF2-40B4-BE49-F238E27FC236}">
-                <a16:creationId xmlns:a16="http://schemas.microsoft.com/office/drawing/2014/main" id="{EE873E4B-1C73-A747-A149-3B7309FEAB5A}"/>
-              </a:ext>
-            </a:extLst>
-          </p:cNvPr>
-          <p:cNvSpPr/>
-          <p:nvPr/>
-        </p:nvSpPr>
-        <p:spPr>
-          <a:xfrm>
-            <a:off x="1721360" y="4430607"/>
-            <a:ext cx="224479" cy="2227618"/>
-          </a:xfrm>
-          <a:prstGeom prst="leftBrace">
-            <a:avLst/>
-          </a:prstGeom>
-          <a:ln w="19050"/>
-        </p:spPr>
-        <p:style>
-          <a:lnRef idx="1">
-            <a:schemeClr val="dk1"/>
-          </a:lnRef>
-          <a:fillRef idx="0">
-            <a:schemeClr val="dk1"/>
-          </a:fillRef>
-          <a:effectRef idx="0">
-            <a:schemeClr val="dk1"/>
-          </a:effectRef>
-          <a:fontRef idx="minor">
-            <a:schemeClr val="tx1"/>
-          </a:fontRef>
-        </p:style>
-        <p:txBody>
-          <a:bodyPr rtlCol="0" anchor="ctr"/>
-          <a:lstStyle/>
-          <a:p>
-            <a:pPr algn="ctr"/>
-            <a:endParaRPr lang="en-US">
-              <a:solidFill>
-                <a:schemeClr val="bg1"/>
+                <a:srgbClr val="FF0000"/>
               </a:solidFill>
             </a:endParaRPr>
           </a:p>
@@ -6031,7 +7522,7 @@
             <a:r>
               <a:rPr lang="en-US" dirty="0">
                 <a:solidFill>
-                  <a:schemeClr val="bg1"/>
+                  <a:srgbClr val="FF0000"/>
                 </a:solidFill>
               </a:rPr>
               <a:t>Extract</a:t>
@@ -6070,7 +7561,7 @@
             <a:r>
               <a:rPr lang="en-US" dirty="0">
                 <a:solidFill>
-                  <a:schemeClr val="bg1"/>
+                  <a:srgbClr val="FF0000"/>
                 </a:solidFill>
               </a:rPr>
               <a:t>Transform</a:t>
@@ -6109,7 +7600,7 @@
             <a:r>
               <a:rPr lang="en-US" dirty="0">
                 <a:solidFill>
-                  <a:schemeClr val="bg1"/>
+                  <a:srgbClr val="FF0000"/>
                 </a:solidFill>
               </a:rPr>
               <a:t>Load</a:t>
@@ -8801,10 +10292,10 @@
       </p:grpSpPr>
       <p:grpSp>
         <p:nvGrpSpPr>
-          <p:cNvPr id="122" name="Group 121">
+          <p:cNvPr id="2" name="Group 1">
             <a:extLst>
               <a:ext uri="{FF2B5EF4-FFF2-40B4-BE49-F238E27FC236}">
-                <a16:creationId xmlns:a16="http://schemas.microsoft.com/office/drawing/2014/main" id="{58E409D9-FED8-B94F-9786-67EA1A53C38B}"/>
+                <a16:creationId xmlns:a16="http://schemas.microsoft.com/office/drawing/2014/main" id="{4CE464F5-AD68-694B-9BF8-53EA8519170E}"/>
               </a:ext>
             </a:extLst>
           </p:cNvPr>
@@ -8821,10 +10312,10 @@
         </p:grpSpPr>
         <p:sp>
           <p:nvSpPr>
-            <p:cNvPr id="63" name="Rectangle 62">
+            <p:cNvPr id="181" name="Rectangle 180">
               <a:extLst>
                 <a:ext uri="{FF2B5EF4-FFF2-40B4-BE49-F238E27FC236}">
-                  <a16:creationId xmlns:a16="http://schemas.microsoft.com/office/drawing/2014/main" id="{B6EF2BD3-571A-4648-8CA6-B3225C5BEF68}"/>
+                  <a16:creationId xmlns:a16="http://schemas.microsoft.com/office/drawing/2014/main" id="{E4A2C015-E919-7646-B2B4-41AEA853A296}"/>
                 </a:ext>
               </a:extLst>
             </p:cNvPr>
@@ -8862,7 +10353,7 @@
               <a:r>
                 <a:rPr lang="en-US" sz="1400" dirty="0">
                   <a:solidFill>
-                    <a:schemeClr val="bg1"/>
+                    <a:srgbClr val="FF0000"/>
                   </a:solidFill>
                 </a:rPr>
                 <a:t>companyProfile.py</a:t>
@@ -8872,10 +10363,10 @@
         </p:sp>
         <p:sp>
           <p:nvSpPr>
-            <p:cNvPr id="64" name="Rectangle 63">
+            <p:cNvPr id="182" name="Rectangle 181">
               <a:extLst>
                 <a:ext uri="{FF2B5EF4-FFF2-40B4-BE49-F238E27FC236}">
-                  <a16:creationId xmlns:a16="http://schemas.microsoft.com/office/drawing/2014/main" id="{FBD124B2-EAF4-834A-B9D2-2C282147A369}"/>
+                  <a16:creationId xmlns:a16="http://schemas.microsoft.com/office/drawing/2014/main" id="{77691ACF-4C8C-F445-A464-DF42B41AC2BE}"/>
                 </a:ext>
               </a:extLst>
             </p:cNvPr>
@@ -8913,7 +10404,7 @@
               <a:r>
                 <a:rPr lang="en-US" sz="1400" dirty="0">
                   <a:solidFill>
-                    <a:schemeClr val="bg1"/>
+                    <a:srgbClr val="FF0000"/>
                   </a:solidFill>
                 </a:rPr>
                 <a:t>stockPrice.py</a:t>
@@ -8923,10 +10414,10 @@
         </p:sp>
         <p:sp>
           <p:nvSpPr>
-            <p:cNvPr id="65" name="Rectangle 64">
+            <p:cNvPr id="183" name="Rectangle 182">
               <a:extLst>
                 <a:ext uri="{FF2B5EF4-FFF2-40B4-BE49-F238E27FC236}">
-                  <a16:creationId xmlns:a16="http://schemas.microsoft.com/office/drawing/2014/main" id="{2FE3BC97-724A-C748-A89D-1BA66202BC59}"/>
+                  <a16:creationId xmlns:a16="http://schemas.microsoft.com/office/drawing/2014/main" id="{320C46AE-5C22-7D4C-99A9-C25EAC62FF10}"/>
                 </a:ext>
               </a:extLst>
             </p:cNvPr>
@@ -8964,7 +10455,7 @@
               <a:r>
                 <a:rPr lang="en-US" sz="1400" dirty="0">
                   <a:solidFill>
-                    <a:schemeClr val="bg1"/>
+                    <a:srgbClr val="FF0000"/>
                   </a:solidFill>
                 </a:rPr>
                 <a:t>marketIndex.py</a:t>
@@ -8974,10 +10465,10 @@
         </p:sp>
         <p:sp>
           <p:nvSpPr>
-            <p:cNvPr id="66" name="Rectangle 65">
+            <p:cNvPr id="184" name="Rectangle 183">
               <a:extLst>
                 <a:ext uri="{FF2B5EF4-FFF2-40B4-BE49-F238E27FC236}">
-                  <a16:creationId xmlns:a16="http://schemas.microsoft.com/office/drawing/2014/main" id="{DCD4516C-7D0A-F74B-A04B-DA7E1615223C}"/>
+                  <a16:creationId xmlns:a16="http://schemas.microsoft.com/office/drawing/2014/main" id="{479D2225-5AF9-554B-BD66-8AE0B4DA16D0}"/>
                 </a:ext>
               </a:extLst>
             </p:cNvPr>
@@ -9014,7 +10505,7 @@
               <a:pPr algn="ctr"/>
               <a:endParaRPr lang="en-US" sz="1400" dirty="0">
                 <a:solidFill>
-                  <a:schemeClr val="bg1"/>
+                  <a:srgbClr val="FF0000"/>
                 </a:solidFill>
               </a:endParaRPr>
             </a:p>
@@ -9023,7 +10514,7 @@
               <a:r>
                 <a:rPr lang="en-US" sz="1400" dirty="0">
                   <a:solidFill>
-                    <a:schemeClr val="bg1"/>
+                    <a:srgbClr val="FF0000"/>
                   </a:solidFill>
                 </a:rPr>
                 <a:t>company_profile.jl</a:t>
@@ -9033,10 +10524,10 @@
         </p:sp>
         <p:sp>
           <p:nvSpPr>
-            <p:cNvPr id="67" name="Rectangle 66">
+            <p:cNvPr id="185" name="Rectangle 184">
               <a:extLst>
                 <a:ext uri="{FF2B5EF4-FFF2-40B4-BE49-F238E27FC236}">
-                  <a16:creationId xmlns:a16="http://schemas.microsoft.com/office/drawing/2014/main" id="{7A72A700-4103-0B4E-BB6E-D04F9397C2CB}"/>
+                  <a16:creationId xmlns:a16="http://schemas.microsoft.com/office/drawing/2014/main" id="{A927D706-EB14-9542-8507-A6A7E5684F38}"/>
                 </a:ext>
               </a:extLst>
             </p:cNvPr>
@@ -9073,7 +10564,7 @@
               <a:pPr algn="ctr"/>
               <a:endParaRPr lang="en-US" sz="1400" dirty="0">
                 <a:solidFill>
-                  <a:schemeClr val="bg1"/>
+                  <a:srgbClr val="FF0000"/>
                 </a:solidFill>
               </a:endParaRPr>
             </a:p>
@@ -9082,7 +10573,7 @@
               <a:r>
                 <a:rPr lang="en-US" sz="1400" dirty="0">
                   <a:solidFill>
-                    <a:schemeClr val="bg1"/>
+                    <a:srgbClr val="FF0000"/>
                   </a:solidFill>
                 </a:rPr>
                 <a:t>stock_prices.jl</a:t>
@@ -9092,10 +10583,10 @@
         </p:sp>
         <p:sp>
           <p:nvSpPr>
-            <p:cNvPr id="68" name="Rectangle 67">
+            <p:cNvPr id="186" name="Rectangle 185">
               <a:extLst>
                 <a:ext uri="{FF2B5EF4-FFF2-40B4-BE49-F238E27FC236}">
-                  <a16:creationId xmlns:a16="http://schemas.microsoft.com/office/drawing/2014/main" id="{2D779C54-E041-A244-9FC9-24401B78268E}"/>
+                  <a16:creationId xmlns:a16="http://schemas.microsoft.com/office/drawing/2014/main" id="{B40DED59-88F8-5848-940A-48FEAA05F921}"/>
                 </a:ext>
               </a:extLst>
             </p:cNvPr>
@@ -9132,7 +10623,7 @@
               <a:pPr algn="ctr"/>
               <a:endParaRPr lang="en-US" sz="1400" dirty="0">
                 <a:solidFill>
-                  <a:schemeClr val="bg1"/>
+                  <a:srgbClr val="FF0000"/>
                 </a:solidFill>
               </a:endParaRPr>
             </a:p>
@@ -9141,7 +10632,7 @@
               <a:r>
                 <a:rPr lang="en-US" sz="1400" dirty="0">
                   <a:solidFill>
-                    <a:schemeClr val="bg1"/>
+                    <a:srgbClr val="FF0000"/>
                   </a:solidFill>
                 </a:rPr>
                 <a:t>index.jl</a:t>
@@ -9151,10 +10642,10 @@
         </p:sp>
         <p:sp>
           <p:nvSpPr>
-            <p:cNvPr id="69" name="Rectangle 68">
+            <p:cNvPr id="187" name="Rectangle 186">
               <a:extLst>
                 <a:ext uri="{FF2B5EF4-FFF2-40B4-BE49-F238E27FC236}">
-                  <a16:creationId xmlns:a16="http://schemas.microsoft.com/office/drawing/2014/main" id="{F2083136-BE09-9F46-B6CD-0F5A18BDF718}"/>
+                  <a16:creationId xmlns:a16="http://schemas.microsoft.com/office/drawing/2014/main" id="{E120E0CA-A49B-1245-AE44-9C1828792CDB}"/>
                 </a:ext>
               </a:extLst>
             </p:cNvPr>
@@ -9192,7 +10683,7 @@
               <a:r>
                 <a:rPr lang="en-US" sz="1400" dirty="0">
                   <a:solidFill>
-                    <a:schemeClr val="bg1"/>
+                    <a:srgbClr val="FF0000"/>
                   </a:solidFill>
                 </a:rPr>
                 <a:t>company_profile</a:t>
@@ -9202,10 +10693,10 @@
         </p:sp>
         <p:sp>
           <p:nvSpPr>
-            <p:cNvPr id="70" name="Rectangle 69">
+            <p:cNvPr id="188" name="Rectangle 187">
               <a:extLst>
                 <a:ext uri="{FF2B5EF4-FFF2-40B4-BE49-F238E27FC236}">
-                  <a16:creationId xmlns:a16="http://schemas.microsoft.com/office/drawing/2014/main" id="{1938B790-E987-6941-8F68-CDA66E5B2F7F}"/>
+                  <a16:creationId xmlns:a16="http://schemas.microsoft.com/office/drawing/2014/main" id="{9537080B-334F-6F46-AE5D-F97F851F4212}"/>
                 </a:ext>
               </a:extLst>
             </p:cNvPr>
@@ -9243,7 +10734,7 @@
               <a:r>
                 <a:rPr lang="en-US" sz="1400" dirty="0">
                   <a:solidFill>
-                    <a:schemeClr val="bg1"/>
+                    <a:srgbClr val="FF0000"/>
                   </a:solidFill>
                 </a:rPr>
                 <a:t>stock_price</a:t>
@@ -9253,10 +10744,10 @@
         </p:sp>
         <p:sp>
           <p:nvSpPr>
-            <p:cNvPr id="71" name="Rectangle 70">
+            <p:cNvPr id="189" name="Rectangle 188">
               <a:extLst>
                 <a:ext uri="{FF2B5EF4-FFF2-40B4-BE49-F238E27FC236}">
-                  <a16:creationId xmlns:a16="http://schemas.microsoft.com/office/drawing/2014/main" id="{2F6DC937-98A4-3843-B4B3-7C3FE57F32DD}"/>
+                  <a16:creationId xmlns:a16="http://schemas.microsoft.com/office/drawing/2014/main" id="{7F6F729B-A849-6A40-ACEC-B1EDCF2440EA}"/>
                 </a:ext>
               </a:extLst>
             </p:cNvPr>
@@ -9294,7 +10785,7 @@
               <a:r>
                 <a:rPr lang="en-US" sz="1400" dirty="0">
                   <a:solidFill>
-                    <a:schemeClr val="bg1"/>
+                    <a:srgbClr val="FF0000"/>
                   </a:solidFill>
                 </a:rPr>
                 <a:t>market_index</a:t>
@@ -9304,10 +10795,10 @@
         </p:sp>
         <p:sp>
           <p:nvSpPr>
-            <p:cNvPr id="72" name="Rectangle 71">
+            <p:cNvPr id="190" name="Rectangle 189">
               <a:extLst>
                 <a:ext uri="{FF2B5EF4-FFF2-40B4-BE49-F238E27FC236}">
-                  <a16:creationId xmlns:a16="http://schemas.microsoft.com/office/drawing/2014/main" id="{0482E909-3E8B-1945-A2C3-56ACB08D9E10}"/>
+                  <a16:creationId xmlns:a16="http://schemas.microsoft.com/office/drawing/2014/main" id="{2B14490F-1D23-D041-9622-A615B251607A}"/>
                 </a:ext>
               </a:extLst>
             </p:cNvPr>
@@ -9345,7 +10836,7 @@
               <a:r>
                 <a:rPr lang="en-US" dirty="0">
                   <a:solidFill>
-                    <a:schemeClr val="bg1"/>
+                    <a:srgbClr val="FF0000"/>
                   </a:solidFill>
                 </a:rPr>
                 <a:t>Yahoo Finance</a:t>
@@ -9355,10 +10846,10 @@
         </p:sp>
         <p:pic>
           <p:nvPicPr>
-            <p:cNvPr id="73" name="Picture 12">
+            <p:cNvPr id="191" name="Picture 12">
               <a:extLst>
                 <a:ext uri="{FF2B5EF4-FFF2-40B4-BE49-F238E27FC236}">
-                  <a16:creationId xmlns:a16="http://schemas.microsoft.com/office/drawing/2014/main" id="{2D8A3FCB-D889-7A4E-9AA0-16B9B7E5CB57}"/>
+                  <a16:creationId xmlns:a16="http://schemas.microsoft.com/office/drawing/2014/main" id="{6AC1564F-CA3F-BC4C-97F5-4BA1EABD04BE}"/>
                 </a:ext>
               </a:extLst>
             </p:cNvPr>
@@ -9402,16 +10893,16 @@
         </p:pic>
         <p:cxnSp>
           <p:nvCxnSpPr>
-            <p:cNvPr id="74" name="Straight Arrow Connector 73">
+            <p:cNvPr id="192" name="Straight Arrow Connector 191">
               <a:extLst>
                 <a:ext uri="{FF2B5EF4-FFF2-40B4-BE49-F238E27FC236}">
-                  <a16:creationId xmlns:a16="http://schemas.microsoft.com/office/drawing/2014/main" id="{9DAE06C9-2B93-8A42-BB68-A90E1EB7A496}"/>
+                  <a16:creationId xmlns:a16="http://schemas.microsoft.com/office/drawing/2014/main" id="{0054FF1A-2EEB-424C-8818-24FD7DEAE141}"/>
                 </a:ext>
               </a:extLst>
             </p:cNvPr>
             <p:cNvCxnSpPr>
               <a:cxnSpLocks/>
-              <a:endCxn id="63" idx="0"/>
+              <a:endCxn id="181" idx="0"/>
             </p:cNvCxnSpPr>
             <p:nvPr/>
           </p:nvCxnSpPr>
@@ -9447,17 +10938,17 @@
         </p:cxnSp>
         <p:cxnSp>
           <p:nvCxnSpPr>
-            <p:cNvPr id="75" name="Straight Arrow Connector 74">
+            <p:cNvPr id="193" name="Straight Arrow Connector 192">
               <a:extLst>
                 <a:ext uri="{FF2B5EF4-FFF2-40B4-BE49-F238E27FC236}">
-                  <a16:creationId xmlns:a16="http://schemas.microsoft.com/office/drawing/2014/main" id="{EF08CD40-8198-A140-A7F2-DAB8EBAC0823}"/>
+                  <a16:creationId xmlns:a16="http://schemas.microsoft.com/office/drawing/2014/main" id="{E197D26F-6EA6-4940-99B9-5CBB88508729}"/>
                 </a:ext>
               </a:extLst>
             </p:cNvPr>
             <p:cNvCxnSpPr>
               <a:cxnSpLocks/>
-              <a:stCxn id="72" idx="2"/>
-              <a:endCxn id="64" idx="0"/>
+              <a:stCxn id="190" idx="2"/>
+              <a:endCxn id="182" idx="0"/>
             </p:cNvCxnSpPr>
             <p:nvPr/>
           </p:nvCxnSpPr>
@@ -9493,16 +10984,16 @@
         </p:cxnSp>
         <p:cxnSp>
           <p:nvCxnSpPr>
-            <p:cNvPr id="76" name="Straight Arrow Connector 75">
+            <p:cNvPr id="194" name="Straight Arrow Connector 193">
               <a:extLst>
                 <a:ext uri="{FF2B5EF4-FFF2-40B4-BE49-F238E27FC236}">
-                  <a16:creationId xmlns:a16="http://schemas.microsoft.com/office/drawing/2014/main" id="{30A087F7-189C-AC4F-811C-A52FDD0C6EA1}"/>
+                  <a16:creationId xmlns:a16="http://schemas.microsoft.com/office/drawing/2014/main" id="{07079CA2-6B16-CB40-8D44-B869A98D2C9D}"/>
                 </a:ext>
               </a:extLst>
             </p:cNvPr>
             <p:cNvCxnSpPr>
               <a:cxnSpLocks/>
-              <a:endCxn id="65" idx="0"/>
+              <a:endCxn id="183" idx="0"/>
             </p:cNvCxnSpPr>
             <p:nvPr/>
           </p:nvCxnSpPr>
@@ -9538,16 +11029,16 @@
         </p:cxnSp>
         <p:cxnSp>
           <p:nvCxnSpPr>
-            <p:cNvPr id="77" name="Straight Arrow Connector 76">
+            <p:cNvPr id="195" name="Straight Arrow Connector 194">
               <a:extLst>
                 <a:ext uri="{FF2B5EF4-FFF2-40B4-BE49-F238E27FC236}">
-                  <a16:creationId xmlns:a16="http://schemas.microsoft.com/office/drawing/2014/main" id="{7E26D8CC-DA27-744F-8959-72041D92E21B}"/>
+                  <a16:creationId xmlns:a16="http://schemas.microsoft.com/office/drawing/2014/main" id="{C71B4863-7709-CB45-B3A3-25050C6A794D}"/>
                 </a:ext>
               </a:extLst>
             </p:cNvPr>
             <p:cNvCxnSpPr>
               <a:cxnSpLocks/>
-              <a:endCxn id="66" idx="0"/>
+              <a:endCxn id="184" idx="0"/>
             </p:cNvCxnSpPr>
             <p:nvPr/>
           </p:nvCxnSpPr>
@@ -9583,10 +11074,10 @@
         </p:cxnSp>
         <p:cxnSp>
           <p:nvCxnSpPr>
-            <p:cNvPr id="78" name="Straight Arrow Connector 77">
+            <p:cNvPr id="196" name="Straight Arrow Connector 195">
               <a:extLst>
                 <a:ext uri="{FF2B5EF4-FFF2-40B4-BE49-F238E27FC236}">
-                  <a16:creationId xmlns:a16="http://schemas.microsoft.com/office/drawing/2014/main" id="{5DEB36CC-A532-D647-94DF-4FD066DBF52D}"/>
+                  <a16:creationId xmlns:a16="http://schemas.microsoft.com/office/drawing/2014/main" id="{903CBA20-4D17-5249-BD90-79437B6CAB3B}"/>
                 </a:ext>
               </a:extLst>
             </p:cNvPr>
@@ -9627,10 +11118,10 @@
         </p:cxnSp>
         <p:cxnSp>
           <p:nvCxnSpPr>
-            <p:cNvPr id="79" name="Straight Arrow Connector 78">
+            <p:cNvPr id="197" name="Straight Arrow Connector 196">
               <a:extLst>
                 <a:ext uri="{FF2B5EF4-FFF2-40B4-BE49-F238E27FC236}">
-                  <a16:creationId xmlns:a16="http://schemas.microsoft.com/office/drawing/2014/main" id="{A03DF398-09D0-BC4D-9F6C-735F36810028}"/>
+                  <a16:creationId xmlns:a16="http://schemas.microsoft.com/office/drawing/2014/main" id="{841E2324-07A5-CC43-9B41-84E72AEA65F8}"/>
                 </a:ext>
               </a:extLst>
             </p:cNvPr>
@@ -9671,10 +11162,10 @@
         </p:cxnSp>
         <p:cxnSp>
           <p:nvCxnSpPr>
-            <p:cNvPr id="80" name="Straight Arrow Connector 79">
+            <p:cNvPr id="198" name="Straight Arrow Connector 197">
               <a:extLst>
                 <a:ext uri="{FF2B5EF4-FFF2-40B4-BE49-F238E27FC236}">
-                  <a16:creationId xmlns:a16="http://schemas.microsoft.com/office/drawing/2014/main" id="{A8CFF5B5-5124-1441-9202-0EB2EB15B705}"/>
+                  <a16:creationId xmlns:a16="http://schemas.microsoft.com/office/drawing/2014/main" id="{7A945F3E-C0D7-0D4E-84C0-A221DFA864E8}"/>
                 </a:ext>
               </a:extLst>
             </p:cNvPr>
@@ -9715,10 +11206,10 @@
         </p:cxnSp>
         <p:cxnSp>
           <p:nvCxnSpPr>
-            <p:cNvPr id="81" name="Straight Arrow Connector 80">
+            <p:cNvPr id="199" name="Straight Arrow Connector 198">
               <a:extLst>
                 <a:ext uri="{FF2B5EF4-FFF2-40B4-BE49-F238E27FC236}">
-                  <a16:creationId xmlns:a16="http://schemas.microsoft.com/office/drawing/2014/main" id="{2C34984C-850A-9545-BB66-046D93AB0F98}"/>
+                  <a16:creationId xmlns:a16="http://schemas.microsoft.com/office/drawing/2014/main" id="{6AFA3B7E-B92A-2D4F-81B6-C9DC86ADF56D}"/>
                 </a:ext>
               </a:extLst>
             </p:cNvPr>
@@ -9759,10 +11250,10 @@
         </p:cxnSp>
         <p:cxnSp>
           <p:nvCxnSpPr>
-            <p:cNvPr id="82" name="Straight Arrow Connector 81">
+            <p:cNvPr id="200" name="Straight Arrow Connector 199">
               <a:extLst>
                 <a:ext uri="{FF2B5EF4-FFF2-40B4-BE49-F238E27FC236}">
-                  <a16:creationId xmlns:a16="http://schemas.microsoft.com/office/drawing/2014/main" id="{FD71E97A-5FB7-6D45-B36C-919D33F01D45}"/>
+                  <a16:creationId xmlns:a16="http://schemas.microsoft.com/office/drawing/2014/main" id="{61C23AAF-487B-AE44-8BCA-80523CD7EE99}"/>
                 </a:ext>
               </a:extLst>
             </p:cNvPr>
@@ -9803,10 +11294,10 @@
         </p:cxnSp>
         <p:cxnSp>
           <p:nvCxnSpPr>
-            <p:cNvPr id="83" name="Straight Connector 82">
+            <p:cNvPr id="201" name="Straight Connector 200">
               <a:extLst>
                 <a:ext uri="{FF2B5EF4-FFF2-40B4-BE49-F238E27FC236}">
-                  <a16:creationId xmlns:a16="http://schemas.microsoft.com/office/drawing/2014/main" id="{023911A3-B473-534A-AA8D-E355C5BE136D}"/>
+                  <a16:creationId xmlns:a16="http://schemas.microsoft.com/office/drawing/2014/main" id="{6CE432DC-AF84-B845-858C-EF3689D3F594}"/>
                 </a:ext>
               </a:extLst>
             </p:cNvPr>
@@ -9844,10 +11335,10 @@
         </p:cxnSp>
         <p:pic>
           <p:nvPicPr>
-            <p:cNvPr id="84" name="Picture 14">
+            <p:cNvPr id="202" name="Picture 14">
               <a:extLst>
                 <a:ext uri="{FF2B5EF4-FFF2-40B4-BE49-F238E27FC236}">
-                  <a16:creationId xmlns:a16="http://schemas.microsoft.com/office/drawing/2014/main" id="{5992A4CA-FCD1-3E4C-AC1B-825017B983C3}"/>
+                  <a16:creationId xmlns:a16="http://schemas.microsoft.com/office/drawing/2014/main" id="{0755F06D-57F3-CF4C-9863-789854BAEDE8}"/>
                 </a:ext>
               </a:extLst>
             </p:cNvPr>
@@ -9891,10 +11382,10 @@
         </p:pic>
         <p:pic>
           <p:nvPicPr>
-            <p:cNvPr id="85" name="Picture 14">
+            <p:cNvPr id="203" name="Picture 14">
               <a:extLst>
                 <a:ext uri="{FF2B5EF4-FFF2-40B4-BE49-F238E27FC236}">
-                  <a16:creationId xmlns:a16="http://schemas.microsoft.com/office/drawing/2014/main" id="{1E28153F-8688-014B-A91D-2E165975766C}"/>
+                  <a16:creationId xmlns:a16="http://schemas.microsoft.com/office/drawing/2014/main" id="{F54B2A8F-071B-7749-BC2B-8E71CBAAB134}"/>
                 </a:ext>
               </a:extLst>
             </p:cNvPr>
@@ -9938,10 +11429,10 @@
         </p:pic>
         <p:pic>
           <p:nvPicPr>
-            <p:cNvPr id="86" name="Picture 14">
+            <p:cNvPr id="204" name="Picture 14">
               <a:extLst>
                 <a:ext uri="{FF2B5EF4-FFF2-40B4-BE49-F238E27FC236}">
-                  <a16:creationId xmlns:a16="http://schemas.microsoft.com/office/drawing/2014/main" id="{2AC94A0E-E132-5143-BB87-AC28C49EE921}"/>
+                  <a16:creationId xmlns:a16="http://schemas.microsoft.com/office/drawing/2014/main" id="{1C3F7983-2FE2-CD49-A7C4-54D4DDDAD693}"/>
                 </a:ext>
               </a:extLst>
             </p:cNvPr>
@@ -9985,10 +11476,10 @@
         </p:pic>
         <p:pic>
           <p:nvPicPr>
-            <p:cNvPr id="87" name="Picture 86">
+            <p:cNvPr id="205" name="Picture 204">
               <a:extLst>
                 <a:ext uri="{FF2B5EF4-FFF2-40B4-BE49-F238E27FC236}">
-                  <a16:creationId xmlns:a16="http://schemas.microsoft.com/office/drawing/2014/main" id="{2DE23584-720A-D94C-9644-FE5FE92E15D4}"/>
+                  <a16:creationId xmlns:a16="http://schemas.microsoft.com/office/drawing/2014/main" id="{4B46E74A-DD25-3A4E-9529-894A1D2EEBA7}"/>
                 </a:ext>
               </a:extLst>
             </p:cNvPr>
@@ -10015,10 +11506,10 @@
         </p:pic>
         <p:pic>
           <p:nvPicPr>
-            <p:cNvPr id="88" name="Picture 87">
+            <p:cNvPr id="206" name="Picture 205">
               <a:extLst>
                 <a:ext uri="{FF2B5EF4-FFF2-40B4-BE49-F238E27FC236}">
-                  <a16:creationId xmlns:a16="http://schemas.microsoft.com/office/drawing/2014/main" id="{43840F5B-D8D6-754F-AC51-E0DC1C2CF15D}"/>
+                  <a16:creationId xmlns:a16="http://schemas.microsoft.com/office/drawing/2014/main" id="{965B33C2-2400-7F42-8351-15E0614A0F05}"/>
                 </a:ext>
               </a:extLst>
             </p:cNvPr>
@@ -10045,10 +11536,10 @@
         </p:pic>
         <p:pic>
           <p:nvPicPr>
-            <p:cNvPr id="89" name="Picture 88">
+            <p:cNvPr id="207" name="Picture 206">
               <a:extLst>
                 <a:ext uri="{FF2B5EF4-FFF2-40B4-BE49-F238E27FC236}">
-                  <a16:creationId xmlns:a16="http://schemas.microsoft.com/office/drawing/2014/main" id="{A3ADD8AD-4E90-194B-908B-15BA7C96E914}"/>
+                  <a16:creationId xmlns:a16="http://schemas.microsoft.com/office/drawing/2014/main" id="{8012B781-31A2-E442-8C8A-3814D550F0D2}"/>
                 </a:ext>
               </a:extLst>
             </p:cNvPr>
@@ -10075,10 +11566,10 @@
         </p:pic>
         <p:sp>
           <p:nvSpPr>
-            <p:cNvPr id="90" name="Rectangle 89">
+            <p:cNvPr id="208" name="Rectangle 207">
               <a:extLst>
                 <a:ext uri="{FF2B5EF4-FFF2-40B4-BE49-F238E27FC236}">
-                  <a16:creationId xmlns:a16="http://schemas.microsoft.com/office/drawing/2014/main" id="{7224D6A0-2511-0C42-B51E-B110E8CC3960}"/>
+                  <a16:creationId xmlns:a16="http://schemas.microsoft.com/office/drawing/2014/main" id="{F6D5A439-AA17-7B4B-BA0E-934062B56469}"/>
                 </a:ext>
               </a:extLst>
             </p:cNvPr>
@@ -10116,7 +11607,7 @@
               <a:r>
                 <a:rPr lang="en-US" sz="1400" dirty="0">
                   <a:solidFill>
-                    <a:schemeClr val="bg1"/>
+                    <a:srgbClr val="FF0000"/>
                   </a:solidFill>
                 </a:rPr>
                 <a:t>pg_data_insert.py</a:t>
@@ -10126,10 +11617,10 @@
         </p:sp>
         <p:pic>
           <p:nvPicPr>
-            <p:cNvPr id="91" name="Picture 14">
+            <p:cNvPr id="209" name="Picture 14">
               <a:extLst>
                 <a:ext uri="{FF2B5EF4-FFF2-40B4-BE49-F238E27FC236}">
-                  <a16:creationId xmlns:a16="http://schemas.microsoft.com/office/drawing/2014/main" id="{E650B2FC-C6C0-204A-8623-3C3D39C94B28}"/>
+                  <a16:creationId xmlns:a16="http://schemas.microsoft.com/office/drawing/2014/main" id="{EAB8B813-3C8D-8946-9142-3291546891C6}"/>
                 </a:ext>
               </a:extLst>
             </p:cNvPr>
@@ -10173,15 +11664,15 @@
         </p:pic>
         <p:cxnSp>
           <p:nvCxnSpPr>
-            <p:cNvPr id="92" name="Straight Arrow Connector 91">
+            <p:cNvPr id="210" name="Straight Arrow Connector 209">
               <a:extLst>
                 <a:ext uri="{FF2B5EF4-FFF2-40B4-BE49-F238E27FC236}">
-                  <a16:creationId xmlns:a16="http://schemas.microsoft.com/office/drawing/2014/main" id="{090D284B-C0E7-3E48-8571-AAF268E5E817}"/>
+                  <a16:creationId xmlns:a16="http://schemas.microsoft.com/office/drawing/2014/main" id="{67984614-7F61-8A4B-9DDB-304ED4145978}"/>
                 </a:ext>
               </a:extLst>
             </p:cNvPr>
             <p:cNvCxnSpPr>
-              <a:endCxn id="90" idx="0"/>
+              <a:endCxn id="208" idx="0"/>
             </p:cNvCxnSpPr>
             <p:nvPr/>
           </p:nvCxnSpPr>
@@ -10217,10 +11708,10 @@
         </p:cxnSp>
         <p:sp>
           <p:nvSpPr>
-            <p:cNvPr id="93" name="Rectangle 92">
+            <p:cNvPr id="211" name="Rectangle 210">
               <a:extLst>
                 <a:ext uri="{FF2B5EF4-FFF2-40B4-BE49-F238E27FC236}">
-                  <a16:creationId xmlns:a16="http://schemas.microsoft.com/office/drawing/2014/main" id="{8E19BE12-F2F9-4448-94C5-9FE27E6E5F56}"/>
+                  <a16:creationId xmlns:a16="http://schemas.microsoft.com/office/drawing/2014/main" id="{10E09DD0-303C-8B46-AFEA-F836B08D85A4}"/>
                 </a:ext>
               </a:extLst>
             </p:cNvPr>
@@ -10258,7 +11749,7 @@
               <a:r>
                 <a:rPr lang="en-US" sz="1400" dirty="0">
                   <a:solidFill>
-                    <a:schemeClr val="bg1"/>
+                    <a:srgbClr val="FF0000"/>
                   </a:solidFill>
                 </a:rPr>
                 <a:t>pg_create_db.py</a:t>
@@ -10268,10 +11759,10 @@
         </p:sp>
         <p:cxnSp>
           <p:nvCxnSpPr>
-            <p:cNvPr id="94" name="Straight Arrow Connector 93">
+            <p:cNvPr id="212" name="Straight Arrow Connector 211">
               <a:extLst>
                 <a:ext uri="{FF2B5EF4-FFF2-40B4-BE49-F238E27FC236}">
-                  <a16:creationId xmlns:a16="http://schemas.microsoft.com/office/drawing/2014/main" id="{E20688E9-E126-E340-B763-B370EDFB3E24}"/>
+                  <a16:creationId xmlns:a16="http://schemas.microsoft.com/office/drawing/2014/main" id="{63A940E1-FC34-474D-9291-C8D5BB47D125}"/>
                 </a:ext>
               </a:extLst>
             </p:cNvPr>
@@ -10312,10 +11803,10 @@
         </p:cxnSp>
         <p:cxnSp>
           <p:nvCxnSpPr>
-            <p:cNvPr id="95" name="Straight Arrow Connector 94">
+            <p:cNvPr id="213" name="Straight Arrow Connector 212">
               <a:extLst>
                 <a:ext uri="{FF2B5EF4-FFF2-40B4-BE49-F238E27FC236}">
-                  <a16:creationId xmlns:a16="http://schemas.microsoft.com/office/drawing/2014/main" id="{D97A03F5-3049-4A43-8D0E-9C4AB73BEC85}"/>
+                  <a16:creationId xmlns:a16="http://schemas.microsoft.com/office/drawing/2014/main" id="{21BB348B-E637-5441-A5AC-4AA2D5B46DF8}"/>
                 </a:ext>
               </a:extLst>
             </p:cNvPr>
@@ -10356,16 +11847,16 @@
         </p:cxnSp>
         <p:cxnSp>
           <p:nvCxnSpPr>
-            <p:cNvPr id="96" name="Straight Arrow Connector 95">
+            <p:cNvPr id="214" name="Straight Arrow Connector 213">
               <a:extLst>
                 <a:ext uri="{FF2B5EF4-FFF2-40B4-BE49-F238E27FC236}">
-                  <a16:creationId xmlns:a16="http://schemas.microsoft.com/office/drawing/2014/main" id="{706ED4E7-058E-3846-AB9E-D1231850D961}"/>
+                  <a16:creationId xmlns:a16="http://schemas.microsoft.com/office/drawing/2014/main" id="{B08E5B62-30B6-1243-BCC0-587F6C94108B}"/>
                 </a:ext>
               </a:extLst>
             </p:cNvPr>
             <p:cNvCxnSpPr>
               <a:cxnSpLocks/>
-              <a:endCxn id="71" idx="0"/>
+              <a:endCxn id="189" idx="0"/>
             </p:cNvCxnSpPr>
             <p:nvPr/>
           </p:nvCxnSpPr>
@@ -10401,10 +11892,10 @@
         </p:cxnSp>
         <p:cxnSp>
           <p:nvCxnSpPr>
-            <p:cNvPr id="97" name="Straight Connector 96">
+            <p:cNvPr id="215" name="Straight Connector 214">
               <a:extLst>
                 <a:ext uri="{FF2B5EF4-FFF2-40B4-BE49-F238E27FC236}">
-                  <a16:creationId xmlns:a16="http://schemas.microsoft.com/office/drawing/2014/main" id="{CC982680-5811-D248-8797-A385D3B9E8D9}"/>
+                  <a16:creationId xmlns:a16="http://schemas.microsoft.com/office/drawing/2014/main" id="{40D64AC0-D591-EF45-B449-869DFADDB4AF}"/>
                 </a:ext>
               </a:extLst>
             </p:cNvPr>
@@ -10442,10 +11933,10 @@
         </p:cxnSp>
         <p:cxnSp>
           <p:nvCxnSpPr>
-            <p:cNvPr id="98" name="Straight Arrow Connector 97">
+            <p:cNvPr id="216" name="Straight Arrow Connector 215">
               <a:extLst>
                 <a:ext uri="{FF2B5EF4-FFF2-40B4-BE49-F238E27FC236}">
-                  <a16:creationId xmlns:a16="http://schemas.microsoft.com/office/drawing/2014/main" id="{393FCE85-F64C-114E-9305-D3992B135A2F}"/>
+                  <a16:creationId xmlns:a16="http://schemas.microsoft.com/office/drawing/2014/main" id="{B08FA935-6BB3-5542-B022-FF28E5C04987}"/>
                 </a:ext>
               </a:extLst>
             </p:cNvPr>
@@ -10484,16 +11975,16 @@
         </p:cxnSp>
         <p:cxnSp>
           <p:nvCxnSpPr>
-            <p:cNvPr id="99" name="Straight Arrow Connector 98">
+            <p:cNvPr id="217" name="Straight Arrow Connector 216">
               <a:extLst>
                 <a:ext uri="{FF2B5EF4-FFF2-40B4-BE49-F238E27FC236}">
-                  <a16:creationId xmlns:a16="http://schemas.microsoft.com/office/drawing/2014/main" id="{30A15A10-A959-A74C-842B-5EC9A8D5FC5D}"/>
+                  <a16:creationId xmlns:a16="http://schemas.microsoft.com/office/drawing/2014/main" id="{B4A5AF68-03DD-EB4C-AEF9-783BE24EE4B7}"/>
                 </a:ext>
               </a:extLst>
             </p:cNvPr>
             <p:cNvCxnSpPr>
               <a:cxnSpLocks/>
-              <a:stCxn id="93" idx="2"/>
+              <a:stCxn id="211" idx="2"/>
             </p:cNvCxnSpPr>
             <p:nvPr/>
           </p:nvCxnSpPr>
@@ -10529,10 +12020,10 @@
         </p:cxnSp>
         <p:pic>
           <p:nvPicPr>
-            <p:cNvPr id="100" name="Picture 14">
+            <p:cNvPr id="218" name="Picture 14">
               <a:extLst>
                 <a:ext uri="{FF2B5EF4-FFF2-40B4-BE49-F238E27FC236}">
-                  <a16:creationId xmlns:a16="http://schemas.microsoft.com/office/drawing/2014/main" id="{BC6F426E-B32A-BE45-9EFA-2285AC7C130C}"/>
+                  <a16:creationId xmlns:a16="http://schemas.microsoft.com/office/drawing/2014/main" id="{F18FE00C-984A-E248-BEDC-8449BC10915D}"/>
                 </a:ext>
               </a:extLst>
             </p:cNvPr>
@@ -10576,10 +12067,10 @@
         </p:pic>
         <p:pic>
           <p:nvPicPr>
-            <p:cNvPr id="101" name="Picture 100">
+            <p:cNvPr id="219" name="Picture 218">
               <a:extLst>
                 <a:ext uri="{FF2B5EF4-FFF2-40B4-BE49-F238E27FC236}">
-                  <a16:creationId xmlns:a16="http://schemas.microsoft.com/office/drawing/2014/main" id="{72317348-203C-8B4A-A5AC-AA4F704F04F0}"/>
+                  <a16:creationId xmlns:a16="http://schemas.microsoft.com/office/drawing/2014/main" id="{DEA682E0-D2A5-9042-91B3-D7C80D98077E}"/>
                 </a:ext>
               </a:extLst>
             </p:cNvPr>
@@ -10606,10 +12097,10 @@
         </p:pic>
         <p:sp>
           <p:nvSpPr>
-            <p:cNvPr id="102" name="Rectangle 101">
+            <p:cNvPr id="220" name="Rectangle 219">
               <a:extLst>
                 <a:ext uri="{FF2B5EF4-FFF2-40B4-BE49-F238E27FC236}">
-                  <a16:creationId xmlns:a16="http://schemas.microsoft.com/office/drawing/2014/main" id="{2E9CA341-02FE-224D-AE1D-2B847725961C}"/>
+                  <a16:creationId xmlns:a16="http://schemas.microsoft.com/office/drawing/2014/main" id="{4F0F5F27-4FFC-E846-ACA9-6C8A6F62D539}"/>
                 </a:ext>
               </a:extLst>
             </p:cNvPr>
@@ -10631,7 +12122,10 @@
             </a:solidFill>
             <a:ln w="25400">
               <a:solidFill>
-                <a:srgbClr val="7030A0"/>
+                <a:schemeClr val="accent6">
+                  <a:lumMod val="60000"/>
+                  <a:lumOff val="40000"/>
+                </a:schemeClr>
               </a:solidFill>
               <a:prstDash val="dash"/>
             </a:ln>
@@ -10657,7 +12151,7 @@
               <a:pPr algn="ctr"/>
               <a:endParaRPr lang="en-US" dirty="0">
                 <a:solidFill>
-                  <a:schemeClr val="bg1"/>
+                  <a:srgbClr val="FF0000"/>
                 </a:solidFill>
               </a:endParaRPr>
             </a:p>
@@ -10665,10 +12159,10 @@
         </p:sp>
         <p:sp>
           <p:nvSpPr>
-            <p:cNvPr id="103" name="Rectangle 102">
+            <p:cNvPr id="221" name="Rectangle 220">
               <a:extLst>
                 <a:ext uri="{FF2B5EF4-FFF2-40B4-BE49-F238E27FC236}">
-                  <a16:creationId xmlns:a16="http://schemas.microsoft.com/office/drawing/2014/main" id="{54B26AB5-E240-2446-928D-C345CFE0BAF8}"/>
+                  <a16:creationId xmlns:a16="http://schemas.microsoft.com/office/drawing/2014/main" id="{6E2516C8-A379-5E4B-93CB-8BDF1E415F6B}"/>
                 </a:ext>
               </a:extLst>
             </p:cNvPr>
@@ -10716,7 +12210,7 @@
               <a:pPr algn="ctr"/>
               <a:endParaRPr lang="en-US" dirty="0">
                 <a:solidFill>
-                  <a:schemeClr val="bg1"/>
+                  <a:srgbClr val="FF0000"/>
                 </a:solidFill>
               </a:endParaRPr>
             </a:p>
@@ -10724,10 +12218,10 @@
         </p:sp>
         <p:pic>
           <p:nvPicPr>
-            <p:cNvPr id="104" name="Picture 22" descr="Image for post">
+            <p:cNvPr id="222" name="Picture 22" descr="Image for post">
               <a:extLst>
                 <a:ext uri="{FF2B5EF4-FFF2-40B4-BE49-F238E27FC236}">
-                  <a16:creationId xmlns:a16="http://schemas.microsoft.com/office/drawing/2014/main" id="{9417A8B0-3D41-6141-9A45-C5A8CBC07A3D}"/>
+                  <a16:creationId xmlns:a16="http://schemas.microsoft.com/office/drawing/2014/main" id="{06A92E52-268D-AE4B-9C66-EDD1A17FA57C}"/>
                 </a:ext>
               </a:extLst>
             </p:cNvPr>
@@ -10771,10 +12265,10 @@
         </p:pic>
         <p:pic>
           <p:nvPicPr>
-            <p:cNvPr id="105" name="Picture 24" descr="The new Slack logo: Best, worst and funniest reactions to a B2B rebrand -  B2B News Network">
+            <p:cNvPr id="223" name="Picture 24" descr="The new Slack logo: Best, worst and funniest reactions to a B2B rebrand -  B2B News Network">
               <a:extLst>
                 <a:ext uri="{FF2B5EF4-FFF2-40B4-BE49-F238E27FC236}">
-                  <a16:creationId xmlns:a16="http://schemas.microsoft.com/office/drawing/2014/main" id="{3607A1EE-D0EA-F148-B8C1-5056BCB63AAC}"/>
+                  <a16:creationId xmlns:a16="http://schemas.microsoft.com/office/drawing/2014/main" id="{18DC3E0F-7642-DC41-8AF6-A7FC510BB6A9}"/>
                 </a:ext>
               </a:extLst>
             </p:cNvPr>
@@ -10818,10 +12312,10 @@
         </p:pic>
         <p:cxnSp>
           <p:nvCxnSpPr>
-            <p:cNvPr id="106" name="Straight Arrow Connector 105">
+            <p:cNvPr id="224" name="Straight Arrow Connector 223">
               <a:extLst>
                 <a:ext uri="{FF2B5EF4-FFF2-40B4-BE49-F238E27FC236}">
-                  <a16:creationId xmlns:a16="http://schemas.microsoft.com/office/drawing/2014/main" id="{02E30CC5-46D1-D74B-9DC8-7A6FDBEC6F2D}"/>
+                  <a16:creationId xmlns:a16="http://schemas.microsoft.com/office/drawing/2014/main" id="{5677D6E5-0A10-DA45-A027-0643BF5565A5}"/>
                 </a:ext>
               </a:extLst>
             </p:cNvPr>
@@ -10860,10 +12354,10 @@
         </p:cxnSp>
         <p:cxnSp>
           <p:nvCxnSpPr>
-            <p:cNvPr id="107" name="Straight Arrow Connector 106">
+            <p:cNvPr id="225" name="Straight Arrow Connector 224">
               <a:extLst>
                 <a:ext uri="{FF2B5EF4-FFF2-40B4-BE49-F238E27FC236}">
-                  <a16:creationId xmlns:a16="http://schemas.microsoft.com/office/drawing/2014/main" id="{FA4E62E8-727A-1844-AB0E-80ACEC741E8A}"/>
+                  <a16:creationId xmlns:a16="http://schemas.microsoft.com/office/drawing/2014/main" id="{85C30A6D-8E7C-7F4C-A084-659F39DB2C1A}"/>
                 </a:ext>
               </a:extLst>
             </p:cNvPr>
@@ -10904,10 +12398,10 @@
         </p:cxnSp>
         <p:cxnSp>
           <p:nvCxnSpPr>
-            <p:cNvPr id="108" name="Straight Connector 107">
+            <p:cNvPr id="226" name="Straight Connector 225">
               <a:extLst>
                 <a:ext uri="{FF2B5EF4-FFF2-40B4-BE49-F238E27FC236}">
-                  <a16:creationId xmlns:a16="http://schemas.microsoft.com/office/drawing/2014/main" id="{EE495460-3029-7B4C-BFC5-C23FB6D9934F}"/>
+                  <a16:creationId xmlns:a16="http://schemas.microsoft.com/office/drawing/2014/main" id="{E804EE1F-3990-D044-AE66-22C3B5163490}"/>
                 </a:ext>
               </a:extLst>
             </p:cNvPr>
@@ -10945,10 +12439,10 @@
         </p:cxnSp>
         <p:cxnSp>
           <p:nvCxnSpPr>
-            <p:cNvPr id="109" name="Straight Connector 108">
+            <p:cNvPr id="227" name="Straight Connector 226">
               <a:extLst>
                 <a:ext uri="{FF2B5EF4-FFF2-40B4-BE49-F238E27FC236}">
-                  <a16:creationId xmlns:a16="http://schemas.microsoft.com/office/drawing/2014/main" id="{E10DA6D8-15E0-D94D-962D-D036F177FF53}"/>
+                  <a16:creationId xmlns:a16="http://schemas.microsoft.com/office/drawing/2014/main" id="{E32BA9F8-C742-AA4B-8906-8C3A1D57E096}"/>
                 </a:ext>
               </a:extLst>
             </p:cNvPr>
@@ -10988,16 +12482,16 @@
         </p:cxnSp>
         <p:cxnSp>
           <p:nvCxnSpPr>
-            <p:cNvPr id="110" name="Straight Arrow Connector 109">
+            <p:cNvPr id="228" name="Straight Arrow Connector 227">
               <a:extLst>
                 <a:ext uri="{FF2B5EF4-FFF2-40B4-BE49-F238E27FC236}">
-                  <a16:creationId xmlns:a16="http://schemas.microsoft.com/office/drawing/2014/main" id="{1FFADDB4-EFB8-9B42-B8AE-BA60846FF4EA}"/>
+                  <a16:creationId xmlns:a16="http://schemas.microsoft.com/office/drawing/2014/main" id="{D6D7CAF5-2BE4-7B41-8776-1B18B035FCDC}"/>
                 </a:ext>
               </a:extLst>
             </p:cNvPr>
             <p:cNvCxnSpPr>
               <a:cxnSpLocks/>
-              <a:endCxn id="105" idx="2"/>
+              <a:endCxn id="223" idx="2"/>
             </p:cNvCxnSpPr>
             <p:nvPr/>
           </p:nvCxnSpPr>
@@ -11033,10 +12527,10 @@
         </p:cxnSp>
         <p:sp>
           <p:nvSpPr>
-            <p:cNvPr id="111" name="TextBox 110">
+            <p:cNvPr id="229" name="TextBox 228">
               <a:extLst>
                 <a:ext uri="{FF2B5EF4-FFF2-40B4-BE49-F238E27FC236}">
-                  <a16:creationId xmlns:a16="http://schemas.microsoft.com/office/drawing/2014/main" id="{CCF7109B-4565-054B-AA83-0D6A921F0401}"/>
+                  <a16:creationId xmlns:a16="http://schemas.microsoft.com/office/drawing/2014/main" id="{D85F6446-A093-9148-B6B0-BCEADB2FEF5F}"/>
                 </a:ext>
               </a:extLst>
             </p:cNvPr>
@@ -11045,7 +12539,7 @@
           </p:nvSpPr>
           <p:spPr>
             <a:xfrm>
-              <a:off x="9220602" y="920332"/>
+              <a:off x="9220602" y="1000637"/>
               <a:ext cx="1255470" cy="369323"/>
             </a:xfrm>
             <a:prstGeom prst="rect">
@@ -11062,7 +12556,7 @@
               <a:r>
                 <a:rPr lang="en-US" dirty="0">
                   <a:solidFill>
-                    <a:schemeClr val="bg1"/>
+                    <a:srgbClr val="FF0000"/>
                   </a:solidFill>
                 </a:rPr>
                 <a:t>track_proj</a:t>
@@ -11072,10 +12566,10 @@
         </p:sp>
         <p:sp>
           <p:nvSpPr>
-            <p:cNvPr id="112" name="TextBox 111">
+            <p:cNvPr id="230" name="TextBox 229">
               <a:extLst>
                 <a:ext uri="{FF2B5EF4-FFF2-40B4-BE49-F238E27FC236}">
-                  <a16:creationId xmlns:a16="http://schemas.microsoft.com/office/drawing/2014/main" id="{C709F213-F268-E74C-86C4-C24F5D04E106}"/>
+                  <a16:creationId xmlns:a16="http://schemas.microsoft.com/office/drawing/2014/main" id="{88BDEEA4-FDDA-2A4D-AD67-F25979E943C2}"/>
                 </a:ext>
               </a:extLst>
             </p:cNvPr>
@@ -11101,7 +12595,7 @@
               <a:r>
                 <a:rPr lang="en-US" dirty="0">
                   <a:solidFill>
-                    <a:schemeClr val="bg1"/>
+                    <a:srgbClr val="FF0000"/>
                   </a:solidFill>
                 </a:rPr>
                 <a:t>Slack </a:t>
@@ -11111,7 +12605,7 @@
               <a:r>
                 <a:rPr lang="en-US" dirty="0">
                   <a:solidFill>
-                    <a:schemeClr val="bg1"/>
+                    <a:srgbClr val="FF0000"/>
                   </a:solidFill>
                 </a:rPr>
                 <a:t>notifications</a:t>
@@ -11121,10 +12615,10 @@
         </p:sp>
         <p:pic>
           <p:nvPicPr>
-            <p:cNvPr id="113" name="Picture 26" descr="scrapy-big-logo">
+            <p:cNvPr id="231" name="Picture 26" descr="scrapy-big-logo">
               <a:extLst>
                 <a:ext uri="{FF2B5EF4-FFF2-40B4-BE49-F238E27FC236}">
-                  <a16:creationId xmlns:a16="http://schemas.microsoft.com/office/drawing/2014/main" id="{8612EC53-2FF4-8548-BE17-1D95CBAB3397}"/>
+                  <a16:creationId xmlns:a16="http://schemas.microsoft.com/office/drawing/2014/main" id="{919EA5FA-3407-3843-9C96-A8EB3524DDCA}"/>
                 </a:ext>
               </a:extLst>
             </p:cNvPr>
@@ -11168,10 +12662,10 @@
         </p:pic>
         <p:pic>
           <p:nvPicPr>
-            <p:cNvPr id="114" name="Picture 26" descr="scrapy-big-logo">
+            <p:cNvPr id="232" name="Picture 26" descr="scrapy-big-logo">
               <a:extLst>
                 <a:ext uri="{FF2B5EF4-FFF2-40B4-BE49-F238E27FC236}">
-                  <a16:creationId xmlns:a16="http://schemas.microsoft.com/office/drawing/2014/main" id="{49A62F95-8739-F849-B905-CDAF70C3C699}"/>
+                  <a16:creationId xmlns:a16="http://schemas.microsoft.com/office/drawing/2014/main" id="{8B873610-E5F0-284C-BCDA-D806C8152172}"/>
                 </a:ext>
               </a:extLst>
             </p:cNvPr>
@@ -11215,10 +12709,10 @@
         </p:pic>
         <p:pic>
           <p:nvPicPr>
-            <p:cNvPr id="115" name="Picture 26" descr="scrapy-big-logo">
+            <p:cNvPr id="233" name="Picture 26" descr="scrapy-big-logo">
               <a:extLst>
                 <a:ext uri="{FF2B5EF4-FFF2-40B4-BE49-F238E27FC236}">
-                  <a16:creationId xmlns:a16="http://schemas.microsoft.com/office/drawing/2014/main" id="{620D4AE4-3283-664D-B704-523D05A98B8B}"/>
+                  <a16:creationId xmlns:a16="http://schemas.microsoft.com/office/drawing/2014/main" id="{28D6AEA8-A143-A746-A6A3-2E3A4BB400FE}"/>
                 </a:ext>
               </a:extLst>
             </p:cNvPr>
@@ -11262,10 +12756,10 @@
         </p:pic>
         <p:sp>
           <p:nvSpPr>
-            <p:cNvPr id="116" name="Left Brace 115">
+            <p:cNvPr id="234" name="Left Brace 233">
               <a:extLst>
                 <a:ext uri="{FF2B5EF4-FFF2-40B4-BE49-F238E27FC236}">
-                  <a16:creationId xmlns:a16="http://schemas.microsoft.com/office/drawing/2014/main" id="{4EBAA9A7-A366-5F41-8320-89DBCE443891}"/>
+                  <a16:creationId xmlns:a16="http://schemas.microsoft.com/office/drawing/2014/main" id="{ED120E84-CF75-5448-8CF0-AF9B9CD95D08}"/>
                 </a:ext>
               </a:extLst>
             </p:cNvPr>
@@ -11280,7 +12774,67 @@
             <a:prstGeom prst="leftBrace">
               <a:avLst/>
             </a:prstGeom>
-            <a:ln w="19050"/>
+            <a:solidFill>
+              <a:schemeClr val="bg1"/>
+            </a:solidFill>
+            <a:ln w="19050">
+              <a:solidFill>
+                <a:srgbClr val="FF0000"/>
+              </a:solidFill>
+            </a:ln>
+          </p:spPr>
+          <p:style>
+            <a:lnRef idx="1">
+              <a:schemeClr val="dk1"/>
+            </a:lnRef>
+            <a:fillRef idx="0">
+              <a:schemeClr val="dk1"/>
+            </a:fillRef>
+            <a:effectRef idx="0">
+              <a:schemeClr val="dk1"/>
+            </a:effectRef>
+            <a:fontRef idx="minor">
+              <a:schemeClr val="tx1"/>
+            </a:fontRef>
+          </p:style>
+          <p:txBody>
+            <a:bodyPr rtlCol="0" anchor="ctr"/>
+            <a:lstStyle/>
+            <a:p>
+              <a:pPr algn="ctr"/>
+              <a:endParaRPr lang="en-US" dirty="0">
+                <a:solidFill>
+                  <a:srgbClr val="FF0000"/>
+                </a:solidFill>
+              </a:endParaRPr>
+            </a:p>
+          </p:txBody>
+        </p:sp>
+        <p:sp>
+          <p:nvSpPr>
+            <p:cNvPr id="235" name="Left Brace 234">
+              <a:extLst>
+                <a:ext uri="{FF2B5EF4-FFF2-40B4-BE49-F238E27FC236}">
+                  <a16:creationId xmlns:a16="http://schemas.microsoft.com/office/drawing/2014/main" id="{46515788-7D1A-7E4D-B950-15BB99942998}"/>
+                </a:ext>
+              </a:extLst>
+            </p:cNvPr>
+            <p:cNvSpPr/>
+            <p:nvPr/>
+          </p:nvSpPr>
+          <p:spPr>
+            <a:xfrm>
+              <a:off x="1510256" y="4439567"/>
+              <a:ext cx="207170" cy="771244"/>
+            </a:xfrm>
+            <a:prstGeom prst="leftBrace">
+              <a:avLst/>
+            </a:prstGeom>
+            <a:ln w="19050">
+              <a:solidFill>
+                <a:srgbClr val="FF0000"/>
+              </a:solidFill>
+            </a:ln>
           </p:spPr>
           <p:style>
             <a:lnRef idx="1">
@@ -11303,7 +12857,7 @@
               <a:pPr algn="ctr"/>
               <a:endParaRPr lang="en-US">
                 <a:solidFill>
-                  <a:schemeClr val="bg1"/>
+                  <a:srgbClr val="FF0000"/>
                 </a:solidFill>
               </a:endParaRPr>
             </a:p>
@@ -11311,10 +12865,10 @@
         </p:sp>
         <p:sp>
           <p:nvSpPr>
-            <p:cNvPr id="117" name="Left Brace 116">
+            <p:cNvPr id="236" name="Left Brace 235">
               <a:extLst>
                 <a:ext uri="{FF2B5EF4-FFF2-40B4-BE49-F238E27FC236}">
-                  <a16:creationId xmlns:a16="http://schemas.microsoft.com/office/drawing/2014/main" id="{6F6C1B84-F6AE-3A43-ABE6-324211693C3C}"/>
+                  <a16:creationId xmlns:a16="http://schemas.microsoft.com/office/drawing/2014/main" id="{8FF131E5-D025-3841-974C-BD9F9C7BCEA9}"/>
                 </a:ext>
               </a:extLst>
             </p:cNvPr>
@@ -11323,13 +12877,17 @@
           </p:nvSpPr>
           <p:spPr>
             <a:xfrm>
-              <a:off x="1510256" y="4439567"/>
-              <a:ext cx="207170" cy="771244"/>
+              <a:off x="1721360" y="4430607"/>
+              <a:ext cx="224479" cy="2227618"/>
             </a:xfrm>
             <a:prstGeom prst="leftBrace">
               <a:avLst/>
             </a:prstGeom>
-            <a:ln w="19050"/>
+            <a:ln w="19050">
+              <a:solidFill>
+                <a:srgbClr val="FF0000"/>
+              </a:solidFill>
+            </a:ln>
           </p:spPr>
           <p:style>
             <a:lnRef idx="1">
@@ -11352,7 +12910,7 @@
               <a:pPr algn="ctr"/>
               <a:endParaRPr lang="en-US">
                 <a:solidFill>
-                  <a:schemeClr val="bg1"/>
+                  <a:srgbClr val="FF0000"/>
                 </a:solidFill>
               </a:endParaRPr>
             </a:p>
@@ -11360,59 +12918,10 @@
         </p:sp>
         <p:sp>
           <p:nvSpPr>
-            <p:cNvPr id="118" name="Left Brace 117">
+            <p:cNvPr id="237" name="TextBox 236">
               <a:extLst>
                 <a:ext uri="{FF2B5EF4-FFF2-40B4-BE49-F238E27FC236}">
-                  <a16:creationId xmlns:a16="http://schemas.microsoft.com/office/drawing/2014/main" id="{A295CE1A-E218-754B-87BC-2F7C3FF55527}"/>
-                </a:ext>
-              </a:extLst>
-            </p:cNvPr>
-            <p:cNvSpPr/>
-            <p:nvPr/>
-          </p:nvSpPr>
-          <p:spPr>
-            <a:xfrm>
-              <a:off x="1721360" y="4430607"/>
-              <a:ext cx="224479" cy="2227618"/>
-            </a:xfrm>
-            <a:prstGeom prst="leftBrace">
-              <a:avLst/>
-            </a:prstGeom>
-            <a:ln w="19050"/>
-          </p:spPr>
-          <p:style>
-            <a:lnRef idx="1">
-              <a:schemeClr val="dk1"/>
-            </a:lnRef>
-            <a:fillRef idx="0">
-              <a:schemeClr val="dk1"/>
-            </a:fillRef>
-            <a:effectRef idx="0">
-              <a:schemeClr val="dk1"/>
-            </a:effectRef>
-            <a:fontRef idx="minor">
-              <a:schemeClr val="tx1"/>
-            </a:fontRef>
-          </p:style>
-          <p:txBody>
-            <a:bodyPr rtlCol="0" anchor="ctr"/>
-            <a:lstStyle/>
-            <a:p>
-              <a:pPr algn="ctr"/>
-              <a:endParaRPr lang="en-US">
-                <a:solidFill>
-                  <a:schemeClr val="bg1"/>
-                </a:solidFill>
-              </a:endParaRPr>
-            </a:p>
-          </p:txBody>
-        </p:sp>
-        <p:sp>
-          <p:nvSpPr>
-            <p:cNvPr id="119" name="TextBox 118">
-              <a:extLst>
-                <a:ext uri="{FF2B5EF4-FFF2-40B4-BE49-F238E27FC236}">
-                  <a16:creationId xmlns:a16="http://schemas.microsoft.com/office/drawing/2014/main" id="{2A3E2CDD-17EC-2341-843C-5D6F4A9C1A1A}"/>
+                  <a16:creationId xmlns:a16="http://schemas.microsoft.com/office/drawing/2014/main" id="{9A782FE9-B7C4-C146-A3EE-5B57649070FB}"/>
                 </a:ext>
               </a:extLst>
             </p:cNvPr>
@@ -11438,7 +12947,7 @@
               <a:r>
                 <a:rPr lang="en-US" dirty="0">
                   <a:solidFill>
-                    <a:schemeClr val="bg1"/>
+                    <a:srgbClr val="FF0000"/>
                   </a:solidFill>
                 </a:rPr>
                 <a:t>Extract</a:t>
@@ -11448,10 +12957,10 @@
         </p:sp>
         <p:sp>
           <p:nvSpPr>
-            <p:cNvPr id="120" name="TextBox 119">
+            <p:cNvPr id="238" name="TextBox 237">
               <a:extLst>
                 <a:ext uri="{FF2B5EF4-FFF2-40B4-BE49-F238E27FC236}">
-                  <a16:creationId xmlns:a16="http://schemas.microsoft.com/office/drawing/2014/main" id="{16CA8382-6FDA-2446-87D6-ACC644E12D80}"/>
+                  <a16:creationId xmlns:a16="http://schemas.microsoft.com/office/drawing/2014/main" id="{EF2E45BD-D5E3-CB46-B7DA-BF0CE32666AA}"/>
                 </a:ext>
               </a:extLst>
             </p:cNvPr>
@@ -11477,7 +12986,7 @@
               <a:r>
                 <a:rPr lang="en-US" dirty="0">
                   <a:solidFill>
-                    <a:schemeClr val="bg1"/>
+                    <a:srgbClr val="FF0000"/>
                   </a:solidFill>
                 </a:rPr>
                 <a:t>Transform</a:t>
@@ -11487,10 +12996,10 @@
         </p:sp>
         <p:sp>
           <p:nvSpPr>
-            <p:cNvPr id="121" name="TextBox 120">
+            <p:cNvPr id="239" name="TextBox 238">
               <a:extLst>
                 <a:ext uri="{FF2B5EF4-FFF2-40B4-BE49-F238E27FC236}">
-                  <a16:creationId xmlns:a16="http://schemas.microsoft.com/office/drawing/2014/main" id="{CDBC4C1B-4473-A04A-A27F-1139416F06F0}"/>
+                  <a16:creationId xmlns:a16="http://schemas.microsoft.com/office/drawing/2014/main" id="{D6DBFA36-2536-C24F-AF2A-FE78002A74D6}"/>
                 </a:ext>
               </a:extLst>
             </p:cNvPr>
@@ -11516,7 +13025,7 @@
               <a:r>
                 <a:rPr lang="en-US" dirty="0">
                   <a:solidFill>
-                    <a:schemeClr val="bg1"/>
+                    <a:srgbClr val="FF0000"/>
                   </a:solidFill>
                 </a:rPr>
                 <a:t>Load</a:t>

</xml_diff>

<commit_message>
Modifies project architecture chart and saves modifications to a .png file
</commit_message>
<xml_diff>
--- a/misc_files/project_slides.pptx
+++ b/misc_files/project_slides.pptx
@@ -9,7 +9,8 @@
     <p:sldId id="257" r:id="rId3"/>
     <p:sldId id="258" r:id="rId4"/>
     <p:sldId id="259" r:id="rId5"/>
-    <p:sldId id="260" r:id="rId6"/>
+    <p:sldId id="261" r:id="rId6"/>
+    <p:sldId id="260" r:id="rId7"/>
   </p:sldIdLst>
   <p:sldSz cx="12192000" cy="6858000"/>
   <p:notesSz cx="6858000" cy="9144000"/>
@@ -119,7 +120,7 @@
 <file path=ppt/revisionInfo.xml><?xml version="1.0" encoding="utf-8"?>
 <p1510:revInfo xmlns:a="http://schemas.openxmlformats.org/drawingml/2006/main" xmlns:r="http://schemas.openxmlformats.org/officeDocument/2006/relationships" xmlns:p1510="http://schemas.microsoft.com/office/powerpoint/2015/10/main">
   <p1510:revLst>
-    <p1510:client id="{5D13D954-F149-3944-BE6D-5630D4E0E09B}" v="42" dt="2021-02-03T04:41:00.787"/>
+    <p1510:client id="{5D13D954-F149-3944-BE6D-5630D4E0E09B}" v="46" dt="2021-03-02T16:53:23.131"/>
   </p1510:revLst>
 </p1510:revInfo>
 </file>
@@ -129,18 +130,18 @@
   <pc:docChgLst>
     <pc:chgData name="NIKHIL SAWAL" userId="c8dee9c8a82970a7" providerId="LiveId" clId="{5D13D954-F149-3944-BE6D-5630D4E0E09B}"/>
     <pc:docChg chg="undo custSel addSld modSld">
-      <pc:chgData name="NIKHIL SAWAL" userId="c8dee9c8a82970a7" providerId="LiveId" clId="{5D13D954-F149-3944-BE6D-5630D4E0E09B}" dt="2021-02-03T04:41:00.787" v="301" actId="1076"/>
+      <pc:chgData name="NIKHIL SAWAL" userId="c8dee9c8a82970a7" providerId="LiveId" clId="{5D13D954-F149-3944-BE6D-5630D4E0E09B}" dt="2021-03-02T16:53:23.131" v="340" actId="165"/>
       <pc:docMkLst>
         <pc:docMk/>
       </pc:docMkLst>
       <pc:sldChg chg="addSp delSp modSp mod">
-        <pc:chgData name="NIKHIL SAWAL" userId="c8dee9c8a82970a7" providerId="LiveId" clId="{5D13D954-F149-3944-BE6D-5630D4E0E09B}" dt="2021-02-03T04:40:48.445" v="299" actId="1076"/>
+        <pc:chgData name="NIKHIL SAWAL" userId="c8dee9c8a82970a7" providerId="LiveId" clId="{5D13D954-F149-3944-BE6D-5630D4E0E09B}" dt="2021-03-02T16:53:23.131" v="340" actId="165"/>
         <pc:sldMkLst>
           <pc:docMk/>
           <pc:sldMk cId="1926175025" sldId="257"/>
         </pc:sldMkLst>
         <pc:spChg chg="mod topLvl">
-          <ac:chgData name="NIKHIL SAWAL" userId="c8dee9c8a82970a7" providerId="LiveId" clId="{5D13D954-F149-3944-BE6D-5630D4E0E09B}" dt="2021-02-02T15:56:53.473" v="10" actId="165"/>
+          <ac:chgData name="NIKHIL SAWAL" userId="c8dee9c8a82970a7" providerId="LiveId" clId="{5D13D954-F149-3944-BE6D-5630D4E0E09B}" dt="2021-03-02T16:53:23.131" v="340" actId="165"/>
           <ac:spMkLst>
             <pc:docMk/>
             <pc:sldMk cId="1926175025" sldId="257"/>
@@ -148,7 +149,7 @@
           </ac:spMkLst>
         </pc:spChg>
         <pc:spChg chg="mod topLvl">
-          <ac:chgData name="NIKHIL SAWAL" userId="c8dee9c8a82970a7" providerId="LiveId" clId="{5D13D954-F149-3944-BE6D-5630D4E0E09B}" dt="2021-02-02T15:56:53.473" v="10" actId="165"/>
+          <ac:chgData name="NIKHIL SAWAL" userId="c8dee9c8a82970a7" providerId="LiveId" clId="{5D13D954-F149-3944-BE6D-5630D4E0E09B}" dt="2021-03-02T16:53:23.131" v="340" actId="165"/>
           <ac:spMkLst>
             <pc:docMk/>
             <pc:sldMk cId="1926175025" sldId="257"/>
@@ -156,7 +157,7 @@
           </ac:spMkLst>
         </pc:spChg>
         <pc:spChg chg="mod topLvl">
-          <ac:chgData name="NIKHIL SAWAL" userId="c8dee9c8a82970a7" providerId="LiveId" clId="{5D13D954-F149-3944-BE6D-5630D4E0E09B}" dt="2021-02-02T15:56:53.473" v="10" actId="165"/>
+          <ac:chgData name="NIKHIL SAWAL" userId="c8dee9c8a82970a7" providerId="LiveId" clId="{5D13D954-F149-3944-BE6D-5630D4E0E09B}" dt="2021-03-02T16:53:23.131" v="340" actId="165"/>
           <ac:spMkLst>
             <pc:docMk/>
             <pc:sldMk cId="1926175025" sldId="257"/>
@@ -164,7 +165,7 @@
           </ac:spMkLst>
         </pc:spChg>
         <pc:spChg chg="mod topLvl">
-          <ac:chgData name="NIKHIL SAWAL" userId="c8dee9c8a82970a7" providerId="LiveId" clId="{5D13D954-F149-3944-BE6D-5630D4E0E09B}" dt="2021-02-02T15:56:53.473" v="10" actId="165"/>
+          <ac:chgData name="NIKHIL SAWAL" userId="c8dee9c8a82970a7" providerId="LiveId" clId="{5D13D954-F149-3944-BE6D-5630D4E0E09B}" dt="2021-03-02T16:53:23.131" v="340" actId="165"/>
           <ac:spMkLst>
             <pc:docMk/>
             <pc:sldMk cId="1926175025" sldId="257"/>
@@ -172,7 +173,7 @@
           </ac:spMkLst>
         </pc:spChg>
         <pc:spChg chg="mod topLvl">
-          <ac:chgData name="NIKHIL SAWAL" userId="c8dee9c8a82970a7" providerId="LiveId" clId="{5D13D954-F149-3944-BE6D-5630D4E0E09B}" dt="2021-02-02T15:56:53.473" v="10" actId="165"/>
+          <ac:chgData name="NIKHIL SAWAL" userId="c8dee9c8a82970a7" providerId="LiveId" clId="{5D13D954-F149-3944-BE6D-5630D4E0E09B}" dt="2021-03-02T16:53:23.131" v="340" actId="165"/>
           <ac:spMkLst>
             <pc:docMk/>
             <pc:sldMk cId="1926175025" sldId="257"/>
@@ -180,7 +181,7 @@
           </ac:spMkLst>
         </pc:spChg>
         <pc:spChg chg="mod topLvl">
-          <ac:chgData name="NIKHIL SAWAL" userId="c8dee9c8a82970a7" providerId="LiveId" clId="{5D13D954-F149-3944-BE6D-5630D4E0E09B}" dt="2021-02-02T15:56:53.473" v="10" actId="165"/>
+          <ac:chgData name="NIKHIL SAWAL" userId="c8dee9c8a82970a7" providerId="LiveId" clId="{5D13D954-F149-3944-BE6D-5630D4E0E09B}" dt="2021-03-02T16:53:23.131" v="340" actId="165"/>
           <ac:spMkLst>
             <pc:docMk/>
             <pc:sldMk cId="1926175025" sldId="257"/>
@@ -188,7 +189,7 @@
           </ac:spMkLst>
         </pc:spChg>
         <pc:spChg chg="mod topLvl">
-          <ac:chgData name="NIKHIL SAWAL" userId="c8dee9c8a82970a7" providerId="LiveId" clId="{5D13D954-F149-3944-BE6D-5630D4E0E09B}" dt="2021-02-02T15:56:53.473" v="10" actId="165"/>
+          <ac:chgData name="NIKHIL SAWAL" userId="c8dee9c8a82970a7" providerId="LiveId" clId="{5D13D954-F149-3944-BE6D-5630D4E0E09B}" dt="2021-03-02T16:53:23.131" v="340" actId="165"/>
           <ac:spMkLst>
             <pc:docMk/>
             <pc:sldMk cId="1926175025" sldId="257"/>
@@ -196,7 +197,7 @@
           </ac:spMkLst>
         </pc:spChg>
         <pc:spChg chg="mod topLvl">
-          <ac:chgData name="NIKHIL SAWAL" userId="c8dee9c8a82970a7" providerId="LiveId" clId="{5D13D954-F149-3944-BE6D-5630D4E0E09B}" dt="2021-02-02T15:56:53.473" v="10" actId="165"/>
+          <ac:chgData name="NIKHIL SAWAL" userId="c8dee9c8a82970a7" providerId="LiveId" clId="{5D13D954-F149-3944-BE6D-5630D4E0E09B}" dt="2021-03-02T16:53:23.131" v="340" actId="165"/>
           <ac:spMkLst>
             <pc:docMk/>
             <pc:sldMk cId="1926175025" sldId="257"/>
@@ -204,7 +205,7 @@
           </ac:spMkLst>
         </pc:spChg>
         <pc:spChg chg="mod topLvl">
-          <ac:chgData name="NIKHIL SAWAL" userId="c8dee9c8a82970a7" providerId="LiveId" clId="{5D13D954-F149-3944-BE6D-5630D4E0E09B}" dt="2021-02-02T15:56:53.473" v="10" actId="165"/>
+          <ac:chgData name="NIKHIL SAWAL" userId="c8dee9c8a82970a7" providerId="LiveId" clId="{5D13D954-F149-3944-BE6D-5630D4E0E09B}" dt="2021-03-02T16:53:23.131" v="340" actId="165"/>
           <ac:spMkLst>
             <pc:docMk/>
             <pc:sldMk cId="1926175025" sldId="257"/>
@@ -212,7 +213,7 @@
           </ac:spMkLst>
         </pc:spChg>
         <pc:spChg chg="mod topLvl">
-          <ac:chgData name="NIKHIL SAWAL" userId="c8dee9c8a82970a7" providerId="LiveId" clId="{5D13D954-F149-3944-BE6D-5630D4E0E09B}" dt="2021-02-02T15:56:53.473" v="10" actId="165"/>
+          <ac:chgData name="NIKHIL SAWAL" userId="c8dee9c8a82970a7" providerId="LiveId" clId="{5D13D954-F149-3944-BE6D-5630D4E0E09B}" dt="2021-03-02T16:53:23.131" v="340" actId="165"/>
           <ac:spMkLst>
             <pc:docMk/>
             <pc:sldMk cId="1926175025" sldId="257"/>
@@ -220,15 +221,15 @@
           </ac:spMkLst>
         </pc:spChg>
         <pc:spChg chg="mod topLvl">
-          <ac:chgData name="NIKHIL SAWAL" userId="c8dee9c8a82970a7" providerId="LiveId" clId="{5D13D954-F149-3944-BE6D-5630D4E0E09B}" dt="2021-02-02T15:56:53.473" v="10" actId="165"/>
+          <ac:chgData name="NIKHIL SAWAL" userId="c8dee9c8a82970a7" providerId="LiveId" clId="{5D13D954-F149-3944-BE6D-5630D4E0E09B}" dt="2021-03-02T16:53:23.131" v="340" actId="165"/>
           <ac:spMkLst>
             <pc:docMk/>
             <pc:sldMk cId="1926175025" sldId="257"/>
             <ac:spMk id="50" creationId="{52F92229-01A9-3443-8D12-1CE5BD8A7A3F}"/>
           </ac:spMkLst>
         </pc:spChg>
-        <pc:spChg chg="add mod">
-          <ac:chgData name="NIKHIL SAWAL" userId="c8dee9c8a82970a7" providerId="LiveId" clId="{5D13D954-F149-3944-BE6D-5630D4E0E09B}" dt="2021-02-02T16:04:59.382" v="30" actId="14100"/>
+        <pc:spChg chg="add mod topLvl">
+          <ac:chgData name="NIKHIL SAWAL" userId="c8dee9c8a82970a7" providerId="LiveId" clId="{5D13D954-F149-3944-BE6D-5630D4E0E09B}" dt="2021-03-02T16:53:23.131" v="340" actId="165"/>
           <ac:spMkLst>
             <pc:docMk/>
             <pc:sldMk cId="1926175025" sldId="257"/>
@@ -236,7 +237,7 @@
           </ac:spMkLst>
         </pc:spChg>
         <pc:spChg chg="mod topLvl">
-          <ac:chgData name="NIKHIL SAWAL" userId="c8dee9c8a82970a7" providerId="LiveId" clId="{5D13D954-F149-3944-BE6D-5630D4E0E09B}" dt="2021-02-02T15:56:53.473" v="10" actId="165"/>
+          <ac:chgData name="NIKHIL SAWAL" userId="c8dee9c8a82970a7" providerId="LiveId" clId="{5D13D954-F149-3944-BE6D-5630D4E0E09B}" dt="2021-03-02T16:53:23.131" v="340" actId="165"/>
           <ac:spMkLst>
             <pc:docMk/>
             <pc:sldMk cId="1926175025" sldId="257"/>
@@ -244,7 +245,7 @@
           </ac:spMkLst>
         </pc:spChg>
         <pc:spChg chg="mod topLvl">
-          <ac:chgData name="NIKHIL SAWAL" userId="c8dee9c8a82970a7" providerId="LiveId" clId="{5D13D954-F149-3944-BE6D-5630D4E0E09B}" dt="2021-02-02T15:56:53.473" v="10" actId="165"/>
+          <ac:chgData name="NIKHIL SAWAL" userId="c8dee9c8a82970a7" providerId="LiveId" clId="{5D13D954-F149-3944-BE6D-5630D4E0E09B}" dt="2021-03-02T16:53:23.131" v="340" actId="165"/>
           <ac:spMkLst>
             <pc:docMk/>
             <pc:sldMk cId="1926175025" sldId="257"/>
@@ -252,15 +253,15 @@
           </ac:spMkLst>
         </pc:spChg>
         <pc:spChg chg="mod topLvl">
-          <ac:chgData name="NIKHIL SAWAL" userId="c8dee9c8a82970a7" providerId="LiveId" clId="{5D13D954-F149-3944-BE6D-5630D4E0E09B}" dt="2021-02-03T04:40:48.445" v="299" actId="1076"/>
+          <ac:chgData name="NIKHIL SAWAL" userId="c8dee9c8a82970a7" providerId="LiveId" clId="{5D13D954-F149-3944-BE6D-5630D4E0E09B}" dt="2021-03-02T16:53:23.131" v="340" actId="165"/>
           <ac:spMkLst>
             <pc:docMk/>
             <pc:sldMk cId="1926175025" sldId="257"/>
             <ac:spMk id="104" creationId="{9B45ED95-5F34-EA49-B9ED-44D918B29AF6}"/>
           </ac:spMkLst>
         </pc:spChg>
-        <pc:spChg chg="mod topLvl">
-          <ac:chgData name="NIKHIL SAWAL" userId="c8dee9c8a82970a7" providerId="LiveId" clId="{5D13D954-F149-3944-BE6D-5630D4E0E09B}" dt="2021-02-02T15:56:53.473" v="10" actId="165"/>
+        <pc:spChg chg="del mod topLvl">
+          <ac:chgData name="NIKHIL SAWAL" userId="c8dee9c8a82970a7" providerId="LiveId" clId="{5D13D954-F149-3944-BE6D-5630D4E0E09B}" dt="2021-03-02T16:51:57.709" v="334" actId="478"/>
           <ac:spMkLst>
             <pc:docMk/>
             <pc:sldMk cId="1926175025" sldId="257"/>
@@ -268,7 +269,7 @@
           </ac:spMkLst>
         </pc:spChg>
         <pc:spChg chg="mod topLvl">
-          <ac:chgData name="NIKHIL SAWAL" userId="c8dee9c8a82970a7" providerId="LiveId" clId="{5D13D954-F149-3944-BE6D-5630D4E0E09B}" dt="2021-02-02T15:56:53.473" v="10" actId="165"/>
+          <ac:chgData name="NIKHIL SAWAL" userId="c8dee9c8a82970a7" providerId="LiveId" clId="{5D13D954-F149-3944-BE6D-5630D4E0E09B}" dt="2021-03-02T16:53:23.131" v="340" actId="165"/>
           <ac:spMkLst>
             <pc:docMk/>
             <pc:sldMk cId="1926175025" sldId="257"/>
@@ -284,7 +285,7 @@
           </ac:spMkLst>
         </pc:spChg>
         <pc:spChg chg="mod topLvl">
-          <ac:chgData name="NIKHIL SAWAL" userId="c8dee9c8a82970a7" providerId="LiveId" clId="{5D13D954-F149-3944-BE6D-5630D4E0E09B}" dt="2021-02-02T15:56:53.473" v="10" actId="165"/>
+          <ac:chgData name="NIKHIL SAWAL" userId="c8dee9c8a82970a7" providerId="LiveId" clId="{5D13D954-F149-3944-BE6D-5630D4E0E09B}" dt="2021-03-02T16:53:23.131" v="340" actId="165"/>
           <ac:spMkLst>
             <pc:docMk/>
             <pc:sldMk cId="1926175025" sldId="257"/>
@@ -292,7 +293,7 @@
           </ac:spMkLst>
         </pc:spChg>
         <pc:spChg chg="mod topLvl">
-          <ac:chgData name="NIKHIL SAWAL" userId="c8dee9c8a82970a7" providerId="LiveId" clId="{5D13D954-F149-3944-BE6D-5630D4E0E09B}" dt="2021-02-02T15:56:53.473" v="10" actId="165"/>
+          <ac:chgData name="NIKHIL SAWAL" userId="c8dee9c8a82970a7" providerId="LiveId" clId="{5D13D954-F149-3944-BE6D-5630D4E0E09B}" dt="2021-03-02T16:53:23.131" v="340" actId="165"/>
           <ac:spMkLst>
             <pc:docMk/>
             <pc:sldMk cId="1926175025" sldId="257"/>
@@ -300,7 +301,7 @@
           </ac:spMkLst>
         </pc:spChg>
         <pc:spChg chg="mod topLvl">
-          <ac:chgData name="NIKHIL SAWAL" userId="c8dee9c8a82970a7" providerId="LiveId" clId="{5D13D954-F149-3944-BE6D-5630D4E0E09B}" dt="2021-02-02T15:56:53.473" v="10" actId="165"/>
+          <ac:chgData name="NIKHIL SAWAL" userId="c8dee9c8a82970a7" providerId="LiveId" clId="{5D13D954-F149-3944-BE6D-5630D4E0E09B}" dt="2021-03-02T16:53:23.131" v="340" actId="165"/>
           <ac:spMkLst>
             <pc:docMk/>
             <pc:sldMk cId="1926175025" sldId="257"/>
@@ -308,7 +309,7 @@
           </ac:spMkLst>
         </pc:spChg>
         <pc:spChg chg="mod topLvl">
-          <ac:chgData name="NIKHIL SAWAL" userId="c8dee9c8a82970a7" providerId="LiveId" clId="{5D13D954-F149-3944-BE6D-5630D4E0E09B}" dt="2021-02-02T15:56:53.473" v="10" actId="165"/>
+          <ac:chgData name="NIKHIL SAWAL" userId="c8dee9c8a82970a7" providerId="LiveId" clId="{5D13D954-F149-3944-BE6D-5630D4E0E09B}" dt="2021-03-02T16:53:23.131" v="340" actId="165"/>
           <ac:spMkLst>
             <pc:docMk/>
             <pc:sldMk cId="1926175025" sldId="257"/>
@@ -316,7 +317,7 @@
           </ac:spMkLst>
         </pc:spChg>
         <pc:spChg chg="mod topLvl">
-          <ac:chgData name="NIKHIL SAWAL" userId="c8dee9c8a82970a7" providerId="LiveId" clId="{5D13D954-F149-3944-BE6D-5630D4E0E09B}" dt="2021-02-02T15:56:53.473" v="10" actId="165"/>
+          <ac:chgData name="NIKHIL SAWAL" userId="c8dee9c8a82970a7" providerId="LiveId" clId="{5D13D954-F149-3944-BE6D-5630D4E0E09B}" dt="2021-03-02T16:53:23.131" v="340" actId="165"/>
           <ac:spMkLst>
             <pc:docMk/>
             <pc:sldMk cId="1926175025" sldId="257"/>
@@ -324,6 +325,14 @@
           </ac:spMkLst>
         </pc:spChg>
         <pc:grpChg chg="add del mod">
+          <ac:chgData name="NIKHIL SAWAL" userId="c8dee9c8a82970a7" providerId="LiveId" clId="{5D13D954-F149-3944-BE6D-5630D4E0E09B}" dt="2021-03-02T16:53:23.131" v="340" actId="165"/>
+          <ac:grpSpMkLst>
+            <pc:docMk/>
+            <pc:sldMk cId="1926175025" sldId="257"/>
+            <ac:grpSpMk id="2" creationId="{523569A3-E4E4-804A-81F1-26519CF7A050}"/>
+          </ac:grpSpMkLst>
+        </pc:grpChg>
+        <pc:grpChg chg="add del mod">
           <ac:chgData name="NIKHIL SAWAL" userId="c8dee9c8a82970a7" providerId="LiveId" clId="{5D13D954-F149-3944-BE6D-5630D4E0E09B}" dt="2021-02-02T15:56:53.473" v="10" actId="165"/>
           <ac:grpSpMkLst>
             <pc:docMk/>
@@ -332,7 +341,7 @@
           </ac:grpSpMkLst>
         </pc:grpChg>
         <pc:picChg chg="mod topLvl">
-          <ac:chgData name="NIKHIL SAWAL" userId="c8dee9c8a82970a7" providerId="LiveId" clId="{5D13D954-F149-3944-BE6D-5630D4E0E09B}" dt="2021-02-02T15:56:53.473" v="10" actId="165"/>
+          <ac:chgData name="NIKHIL SAWAL" userId="c8dee9c8a82970a7" providerId="LiveId" clId="{5D13D954-F149-3944-BE6D-5630D4E0E09B}" dt="2021-03-02T16:53:23.131" v="340" actId="165"/>
           <ac:picMkLst>
             <pc:docMk/>
             <pc:sldMk cId="1926175025" sldId="257"/>
@@ -340,7 +349,7 @@
           </ac:picMkLst>
         </pc:picChg>
         <pc:picChg chg="mod topLvl">
-          <ac:chgData name="NIKHIL SAWAL" userId="c8dee9c8a82970a7" providerId="LiveId" clId="{5D13D954-F149-3944-BE6D-5630D4E0E09B}" dt="2021-02-02T15:56:53.473" v="10" actId="165"/>
+          <ac:chgData name="NIKHIL SAWAL" userId="c8dee9c8a82970a7" providerId="LiveId" clId="{5D13D954-F149-3944-BE6D-5630D4E0E09B}" dt="2021-03-02T16:53:23.131" v="340" actId="165"/>
           <ac:picMkLst>
             <pc:docMk/>
             <pc:sldMk cId="1926175025" sldId="257"/>
@@ -348,7 +357,7 @@
           </ac:picMkLst>
         </pc:picChg>
         <pc:picChg chg="mod topLvl">
-          <ac:chgData name="NIKHIL SAWAL" userId="c8dee9c8a82970a7" providerId="LiveId" clId="{5D13D954-F149-3944-BE6D-5630D4E0E09B}" dt="2021-02-02T15:56:53.473" v="10" actId="165"/>
+          <ac:chgData name="NIKHIL SAWAL" userId="c8dee9c8a82970a7" providerId="LiveId" clId="{5D13D954-F149-3944-BE6D-5630D4E0E09B}" dt="2021-03-02T16:53:23.131" v="340" actId="165"/>
           <ac:picMkLst>
             <pc:docMk/>
             <pc:sldMk cId="1926175025" sldId="257"/>
@@ -356,7 +365,7 @@
           </ac:picMkLst>
         </pc:picChg>
         <pc:picChg chg="mod topLvl">
-          <ac:chgData name="NIKHIL SAWAL" userId="c8dee9c8a82970a7" providerId="LiveId" clId="{5D13D954-F149-3944-BE6D-5630D4E0E09B}" dt="2021-02-02T15:56:53.473" v="10" actId="165"/>
+          <ac:chgData name="NIKHIL SAWAL" userId="c8dee9c8a82970a7" providerId="LiveId" clId="{5D13D954-F149-3944-BE6D-5630D4E0E09B}" dt="2021-03-02T16:53:23.131" v="340" actId="165"/>
           <ac:picMkLst>
             <pc:docMk/>
             <pc:sldMk cId="1926175025" sldId="257"/>
@@ -364,7 +373,7 @@
           </ac:picMkLst>
         </pc:picChg>
         <pc:picChg chg="mod topLvl">
-          <ac:chgData name="NIKHIL SAWAL" userId="c8dee9c8a82970a7" providerId="LiveId" clId="{5D13D954-F149-3944-BE6D-5630D4E0E09B}" dt="2021-02-02T15:56:53.473" v="10" actId="165"/>
+          <ac:chgData name="NIKHIL SAWAL" userId="c8dee9c8a82970a7" providerId="LiveId" clId="{5D13D954-F149-3944-BE6D-5630D4E0E09B}" dt="2021-03-02T16:53:23.131" v="340" actId="165"/>
           <ac:picMkLst>
             <pc:docMk/>
             <pc:sldMk cId="1926175025" sldId="257"/>
@@ -372,7 +381,7 @@
           </ac:picMkLst>
         </pc:picChg>
         <pc:picChg chg="mod topLvl">
-          <ac:chgData name="NIKHIL SAWAL" userId="c8dee9c8a82970a7" providerId="LiveId" clId="{5D13D954-F149-3944-BE6D-5630D4E0E09B}" dt="2021-02-02T15:56:53.473" v="10" actId="165"/>
+          <ac:chgData name="NIKHIL SAWAL" userId="c8dee9c8a82970a7" providerId="LiveId" clId="{5D13D954-F149-3944-BE6D-5630D4E0E09B}" dt="2021-03-02T16:53:23.131" v="340" actId="165"/>
           <ac:picMkLst>
             <pc:docMk/>
             <pc:sldMk cId="1926175025" sldId="257"/>
@@ -380,7 +389,7 @@
           </ac:picMkLst>
         </pc:picChg>
         <pc:picChg chg="mod topLvl">
-          <ac:chgData name="NIKHIL SAWAL" userId="c8dee9c8a82970a7" providerId="LiveId" clId="{5D13D954-F149-3944-BE6D-5630D4E0E09B}" dt="2021-02-02T15:56:53.473" v="10" actId="165"/>
+          <ac:chgData name="NIKHIL SAWAL" userId="c8dee9c8a82970a7" providerId="LiveId" clId="{5D13D954-F149-3944-BE6D-5630D4E0E09B}" dt="2021-03-02T16:53:23.131" v="340" actId="165"/>
           <ac:picMkLst>
             <pc:docMk/>
             <pc:sldMk cId="1926175025" sldId="257"/>
@@ -388,7 +397,7 @@
           </ac:picMkLst>
         </pc:picChg>
         <pc:picChg chg="mod topLvl">
-          <ac:chgData name="NIKHIL SAWAL" userId="c8dee9c8a82970a7" providerId="LiveId" clId="{5D13D954-F149-3944-BE6D-5630D4E0E09B}" dt="2021-02-02T15:56:53.473" v="10" actId="165"/>
+          <ac:chgData name="NIKHIL SAWAL" userId="c8dee9c8a82970a7" providerId="LiveId" clId="{5D13D954-F149-3944-BE6D-5630D4E0E09B}" dt="2021-03-02T16:53:23.131" v="340" actId="165"/>
           <ac:picMkLst>
             <pc:docMk/>
             <pc:sldMk cId="1926175025" sldId="257"/>
@@ -396,7 +405,7 @@
           </ac:picMkLst>
         </pc:picChg>
         <pc:picChg chg="mod topLvl">
-          <ac:chgData name="NIKHIL SAWAL" userId="c8dee9c8a82970a7" providerId="LiveId" clId="{5D13D954-F149-3944-BE6D-5630D4E0E09B}" dt="2021-02-02T15:56:53.473" v="10" actId="165"/>
+          <ac:chgData name="NIKHIL SAWAL" userId="c8dee9c8a82970a7" providerId="LiveId" clId="{5D13D954-F149-3944-BE6D-5630D4E0E09B}" dt="2021-03-02T16:53:23.131" v="340" actId="165"/>
           <ac:picMkLst>
             <pc:docMk/>
             <pc:sldMk cId="1926175025" sldId="257"/>
@@ -404,7 +413,7 @@
           </ac:picMkLst>
         </pc:picChg>
         <pc:picChg chg="mod topLvl">
-          <ac:chgData name="NIKHIL SAWAL" userId="c8dee9c8a82970a7" providerId="LiveId" clId="{5D13D954-F149-3944-BE6D-5630D4E0E09B}" dt="2021-02-02T15:56:53.473" v="10" actId="165"/>
+          <ac:chgData name="NIKHIL SAWAL" userId="c8dee9c8a82970a7" providerId="LiveId" clId="{5D13D954-F149-3944-BE6D-5630D4E0E09B}" dt="2021-03-02T16:53:23.131" v="340" actId="165"/>
           <ac:picMkLst>
             <pc:docMk/>
             <pc:sldMk cId="1926175025" sldId="257"/>
@@ -412,7 +421,7 @@
           </ac:picMkLst>
         </pc:picChg>
         <pc:picChg chg="mod topLvl">
-          <ac:chgData name="NIKHIL SAWAL" userId="c8dee9c8a82970a7" providerId="LiveId" clId="{5D13D954-F149-3944-BE6D-5630D4E0E09B}" dt="2021-02-02T15:56:53.473" v="10" actId="165"/>
+          <ac:chgData name="NIKHIL SAWAL" userId="c8dee9c8a82970a7" providerId="LiveId" clId="{5D13D954-F149-3944-BE6D-5630D4E0E09B}" dt="2021-03-02T16:53:23.131" v="340" actId="165"/>
           <ac:picMkLst>
             <pc:docMk/>
             <pc:sldMk cId="1926175025" sldId="257"/>
@@ -420,7 +429,7 @@
           </ac:picMkLst>
         </pc:picChg>
         <pc:picChg chg="mod topLvl">
-          <ac:chgData name="NIKHIL SAWAL" userId="c8dee9c8a82970a7" providerId="LiveId" clId="{5D13D954-F149-3944-BE6D-5630D4E0E09B}" dt="2021-02-02T15:56:53.473" v="10" actId="165"/>
+          <ac:chgData name="NIKHIL SAWAL" userId="c8dee9c8a82970a7" providerId="LiveId" clId="{5D13D954-F149-3944-BE6D-5630D4E0E09B}" dt="2021-03-02T16:53:23.131" v="340" actId="165"/>
           <ac:picMkLst>
             <pc:docMk/>
             <pc:sldMk cId="1926175025" sldId="257"/>
@@ -428,7 +437,7 @@
           </ac:picMkLst>
         </pc:picChg>
         <pc:picChg chg="mod topLvl">
-          <ac:chgData name="NIKHIL SAWAL" userId="c8dee9c8a82970a7" providerId="LiveId" clId="{5D13D954-F149-3944-BE6D-5630D4E0E09B}" dt="2021-02-02T15:56:53.473" v="10" actId="165"/>
+          <ac:chgData name="NIKHIL SAWAL" userId="c8dee9c8a82970a7" providerId="LiveId" clId="{5D13D954-F149-3944-BE6D-5630D4E0E09B}" dt="2021-03-02T16:53:23.131" v="340" actId="165"/>
           <ac:picMkLst>
             <pc:docMk/>
             <pc:sldMk cId="1926175025" sldId="257"/>
@@ -436,7 +445,7 @@
           </ac:picMkLst>
         </pc:picChg>
         <pc:picChg chg="mod topLvl">
-          <ac:chgData name="NIKHIL SAWAL" userId="c8dee9c8a82970a7" providerId="LiveId" clId="{5D13D954-F149-3944-BE6D-5630D4E0E09B}" dt="2021-02-02T15:56:53.473" v="10" actId="165"/>
+          <ac:chgData name="NIKHIL SAWAL" userId="c8dee9c8a82970a7" providerId="LiveId" clId="{5D13D954-F149-3944-BE6D-5630D4E0E09B}" dt="2021-03-02T16:53:23.131" v="340" actId="165"/>
           <ac:picMkLst>
             <pc:docMk/>
             <pc:sldMk cId="1926175025" sldId="257"/>
@@ -444,7 +453,7 @@
           </ac:picMkLst>
         </pc:picChg>
         <pc:picChg chg="mod topLvl">
-          <ac:chgData name="NIKHIL SAWAL" userId="c8dee9c8a82970a7" providerId="LiveId" clId="{5D13D954-F149-3944-BE6D-5630D4E0E09B}" dt="2021-02-02T15:56:53.473" v="10" actId="165"/>
+          <ac:chgData name="NIKHIL SAWAL" userId="c8dee9c8a82970a7" providerId="LiveId" clId="{5D13D954-F149-3944-BE6D-5630D4E0E09B}" dt="2021-03-02T16:53:23.131" v="340" actId="165"/>
           <ac:picMkLst>
             <pc:docMk/>
             <pc:sldMk cId="1926175025" sldId="257"/>
@@ -452,7 +461,7 @@
           </ac:picMkLst>
         </pc:picChg>
         <pc:cxnChg chg="mod topLvl">
-          <ac:chgData name="NIKHIL SAWAL" userId="c8dee9c8a82970a7" providerId="LiveId" clId="{5D13D954-F149-3944-BE6D-5630D4E0E09B}" dt="2021-02-02T15:56:53.473" v="10" actId="165"/>
+          <ac:chgData name="NIKHIL SAWAL" userId="c8dee9c8a82970a7" providerId="LiveId" clId="{5D13D954-F149-3944-BE6D-5630D4E0E09B}" dt="2021-03-02T16:53:23.131" v="340" actId="165"/>
           <ac:cxnSpMkLst>
             <pc:docMk/>
             <pc:sldMk cId="1926175025" sldId="257"/>
@@ -460,7 +469,7 @@
           </ac:cxnSpMkLst>
         </pc:cxnChg>
         <pc:cxnChg chg="mod topLvl">
-          <ac:chgData name="NIKHIL SAWAL" userId="c8dee9c8a82970a7" providerId="LiveId" clId="{5D13D954-F149-3944-BE6D-5630D4E0E09B}" dt="2021-02-02T15:56:53.473" v="10" actId="165"/>
+          <ac:chgData name="NIKHIL SAWAL" userId="c8dee9c8a82970a7" providerId="LiveId" clId="{5D13D954-F149-3944-BE6D-5630D4E0E09B}" dt="2021-03-02T16:53:23.131" v="340" actId="165"/>
           <ac:cxnSpMkLst>
             <pc:docMk/>
             <pc:sldMk cId="1926175025" sldId="257"/>
@@ -468,7 +477,7 @@
           </ac:cxnSpMkLst>
         </pc:cxnChg>
         <pc:cxnChg chg="mod topLvl">
-          <ac:chgData name="NIKHIL SAWAL" userId="c8dee9c8a82970a7" providerId="LiveId" clId="{5D13D954-F149-3944-BE6D-5630D4E0E09B}" dt="2021-02-02T15:56:53.473" v="10" actId="165"/>
+          <ac:chgData name="NIKHIL SAWAL" userId="c8dee9c8a82970a7" providerId="LiveId" clId="{5D13D954-F149-3944-BE6D-5630D4E0E09B}" dt="2021-03-02T16:53:23.131" v="340" actId="165"/>
           <ac:cxnSpMkLst>
             <pc:docMk/>
             <pc:sldMk cId="1926175025" sldId="257"/>
@@ -476,7 +485,7 @@
           </ac:cxnSpMkLst>
         </pc:cxnChg>
         <pc:cxnChg chg="mod topLvl">
-          <ac:chgData name="NIKHIL SAWAL" userId="c8dee9c8a82970a7" providerId="LiveId" clId="{5D13D954-F149-3944-BE6D-5630D4E0E09B}" dt="2021-02-02T15:56:53.473" v="10" actId="165"/>
+          <ac:chgData name="NIKHIL SAWAL" userId="c8dee9c8a82970a7" providerId="LiveId" clId="{5D13D954-F149-3944-BE6D-5630D4E0E09B}" dt="2021-03-02T16:53:23.131" v="340" actId="165"/>
           <ac:cxnSpMkLst>
             <pc:docMk/>
             <pc:sldMk cId="1926175025" sldId="257"/>
@@ -484,7 +493,7 @@
           </ac:cxnSpMkLst>
         </pc:cxnChg>
         <pc:cxnChg chg="mod topLvl">
-          <ac:chgData name="NIKHIL SAWAL" userId="c8dee9c8a82970a7" providerId="LiveId" clId="{5D13D954-F149-3944-BE6D-5630D4E0E09B}" dt="2021-02-02T15:56:53.473" v="10" actId="165"/>
+          <ac:chgData name="NIKHIL SAWAL" userId="c8dee9c8a82970a7" providerId="LiveId" clId="{5D13D954-F149-3944-BE6D-5630D4E0E09B}" dt="2021-03-02T16:53:23.131" v="340" actId="165"/>
           <ac:cxnSpMkLst>
             <pc:docMk/>
             <pc:sldMk cId="1926175025" sldId="257"/>
@@ -492,7 +501,7 @@
           </ac:cxnSpMkLst>
         </pc:cxnChg>
         <pc:cxnChg chg="mod topLvl">
-          <ac:chgData name="NIKHIL SAWAL" userId="c8dee9c8a82970a7" providerId="LiveId" clId="{5D13D954-F149-3944-BE6D-5630D4E0E09B}" dt="2021-02-02T15:56:53.473" v="10" actId="165"/>
+          <ac:chgData name="NIKHIL SAWAL" userId="c8dee9c8a82970a7" providerId="LiveId" clId="{5D13D954-F149-3944-BE6D-5630D4E0E09B}" dt="2021-03-02T16:53:23.131" v="340" actId="165"/>
           <ac:cxnSpMkLst>
             <pc:docMk/>
             <pc:sldMk cId="1926175025" sldId="257"/>
@@ -500,7 +509,7 @@
           </ac:cxnSpMkLst>
         </pc:cxnChg>
         <pc:cxnChg chg="mod topLvl">
-          <ac:chgData name="NIKHIL SAWAL" userId="c8dee9c8a82970a7" providerId="LiveId" clId="{5D13D954-F149-3944-BE6D-5630D4E0E09B}" dt="2021-02-02T15:56:53.473" v="10" actId="165"/>
+          <ac:chgData name="NIKHIL SAWAL" userId="c8dee9c8a82970a7" providerId="LiveId" clId="{5D13D954-F149-3944-BE6D-5630D4E0E09B}" dt="2021-03-02T16:53:23.131" v="340" actId="165"/>
           <ac:cxnSpMkLst>
             <pc:docMk/>
             <pc:sldMk cId="1926175025" sldId="257"/>
@@ -508,7 +517,7 @@
           </ac:cxnSpMkLst>
         </pc:cxnChg>
         <pc:cxnChg chg="mod topLvl">
-          <ac:chgData name="NIKHIL SAWAL" userId="c8dee9c8a82970a7" providerId="LiveId" clId="{5D13D954-F149-3944-BE6D-5630D4E0E09B}" dt="2021-02-02T15:56:53.473" v="10" actId="165"/>
+          <ac:chgData name="NIKHIL SAWAL" userId="c8dee9c8a82970a7" providerId="LiveId" clId="{5D13D954-F149-3944-BE6D-5630D4E0E09B}" dt="2021-03-02T16:53:23.131" v="340" actId="165"/>
           <ac:cxnSpMkLst>
             <pc:docMk/>
             <pc:sldMk cId="1926175025" sldId="257"/>
@@ -516,7 +525,7 @@
           </ac:cxnSpMkLst>
         </pc:cxnChg>
         <pc:cxnChg chg="mod topLvl">
-          <ac:chgData name="NIKHIL SAWAL" userId="c8dee9c8a82970a7" providerId="LiveId" clId="{5D13D954-F149-3944-BE6D-5630D4E0E09B}" dt="2021-02-02T15:56:53.473" v="10" actId="165"/>
+          <ac:chgData name="NIKHIL SAWAL" userId="c8dee9c8a82970a7" providerId="LiveId" clId="{5D13D954-F149-3944-BE6D-5630D4E0E09B}" dt="2021-03-02T16:53:23.131" v="340" actId="165"/>
           <ac:cxnSpMkLst>
             <pc:docMk/>
             <pc:sldMk cId="1926175025" sldId="257"/>
@@ -524,7 +533,7 @@
           </ac:cxnSpMkLst>
         </pc:cxnChg>
         <pc:cxnChg chg="mod topLvl">
-          <ac:chgData name="NIKHIL SAWAL" userId="c8dee9c8a82970a7" providerId="LiveId" clId="{5D13D954-F149-3944-BE6D-5630D4E0E09B}" dt="2021-02-02T15:56:53.473" v="10" actId="165"/>
+          <ac:chgData name="NIKHIL SAWAL" userId="c8dee9c8a82970a7" providerId="LiveId" clId="{5D13D954-F149-3944-BE6D-5630D4E0E09B}" dt="2021-03-02T16:53:23.131" v="340" actId="165"/>
           <ac:cxnSpMkLst>
             <pc:docMk/>
             <pc:sldMk cId="1926175025" sldId="257"/>
@@ -532,7 +541,7 @@
           </ac:cxnSpMkLst>
         </pc:cxnChg>
         <pc:cxnChg chg="mod topLvl">
-          <ac:chgData name="NIKHIL SAWAL" userId="c8dee9c8a82970a7" providerId="LiveId" clId="{5D13D954-F149-3944-BE6D-5630D4E0E09B}" dt="2021-02-02T15:56:53.473" v="10" actId="165"/>
+          <ac:chgData name="NIKHIL SAWAL" userId="c8dee9c8a82970a7" providerId="LiveId" clId="{5D13D954-F149-3944-BE6D-5630D4E0E09B}" dt="2021-03-02T16:53:23.131" v="340" actId="165"/>
           <ac:cxnSpMkLst>
             <pc:docMk/>
             <pc:sldMk cId="1926175025" sldId="257"/>
@@ -540,7 +549,7 @@
           </ac:cxnSpMkLst>
         </pc:cxnChg>
         <pc:cxnChg chg="mod topLvl">
-          <ac:chgData name="NIKHIL SAWAL" userId="c8dee9c8a82970a7" providerId="LiveId" clId="{5D13D954-F149-3944-BE6D-5630D4E0E09B}" dt="2021-02-02T15:56:53.473" v="10" actId="165"/>
+          <ac:chgData name="NIKHIL SAWAL" userId="c8dee9c8a82970a7" providerId="LiveId" clId="{5D13D954-F149-3944-BE6D-5630D4E0E09B}" dt="2021-03-02T16:53:23.131" v="340" actId="165"/>
           <ac:cxnSpMkLst>
             <pc:docMk/>
             <pc:sldMk cId="1926175025" sldId="257"/>
@@ -548,7 +557,7 @@
           </ac:cxnSpMkLst>
         </pc:cxnChg>
         <pc:cxnChg chg="mod topLvl">
-          <ac:chgData name="NIKHIL SAWAL" userId="c8dee9c8a82970a7" providerId="LiveId" clId="{5D13D954-F149-3944-BE6D-5630D4E0E09B}" dt="2021-02-02T15:56:53.473" v="10" actId="165"/>
+          <ac:chgData name="NIKHIL SAWAL" userId="c8dee9c8a82970a7" providerId="LiveId" clId="{5D13D954-F149-3944-BE6D-5630D4E0E09B}" dt="2021-03-02T16:53:23.131" v="340" actId="165"/>
           <ac:cxnSpMkLst>
             <pc:docMk/>
             <pc:sldMk cId="1926175025" sldId="257"/>
@@ -556,7 +565,7 @@
           </ac:cxnSpMkLst>
         </pc:cxnChg>
         <pc:cxnChg chg="mod topLvl">
-          <ac:chgData name="NIKHIL SAWAL" userId="c8dee9c8a82970a7" providerId="LiveId" clId="{5D13D954-F149-3944-BE6D-5630D4E0E09B}" dt="2021-02-02T15:56:53.473" v="10" actId="165"/>
+          <ac:chgData name="NIKHIL SAWAL" userId="c8dee9c8a82970a7" providerId="LiveId" clId="{5D13D954-F149-3944-BE6D-5630D4E0E09B}" dt="2021-03-02T16:53:23.131" v="340" actId="165"/>
           <ac:cxnSpMkLst>
             <pc:docMk/>
             <pc:sldMk cId="1926175025" sldId="257"/>
@@ -564,7 +573,7 @@
           </ac:cxnSpMkLst>
         </pc:cxnChg>
         <pc:cxnChg chg="mod topLvl">
-          <ac:chgData name="NIKHIL SAWAL" userId="c8dee9c8a82970a7" providerId="LiveId" clId="{5D13D954-F149-3944-BE6D-5630D4E0E09B}" dt="2021-02-02T15:56:53.473" v="10" actId="165"/>
+          <ac:chgData name="NIKHIL SAWAL" userId="c8dee9c8a82970a7" providerId="LiveId" clId="{5D13D954-F149-3944-BE6D-5630D4E0E09B}" dt="2021-03-02T16:53:23.131" v="340" actId="165"/>
           <ac:cxnSpMkLst>
             <pc:docMk/>
             <pc:sldMk cId="1926175025" sldId="257"/>
@@ -572,7 +581,7 @@
           </ac:cxnSpMkLst>
         </pc:cxnChg>
         <pc:cxnChg chg="mod topLvl">
-          <ac:chgData name="NIKHIL SAWAL" userId="c8dee9c8a82970a7" providerId="LiveId" clId="{5D13D954-F149-3944-BE6D-5630D4E0E09B}" dt="2021-02-02T15:56:53.473" v="10" actId="165"/>
+          <ac:chgData name="NIKHIL SAWAL" userId="c8dee9c8a82970a7" providerId="LiveId" clId="{5D13D954-F149-3944-BE6D-5630D4E0E09B}" dt="2021-03-02T16:53:23.131" v="340" actId="165"/>
           <ac:cxnSpMkLst>
             <pc:docMk/>
             <pc:sldMk cId="1926175025" sldId="257"/>
@@ -580,7 +589,7 @@
           </ac:cxnSpMkLst>
         </pc:cxnChg>
         <pc:cxnChg chg="mod topLvl">
-          <ac:chgData name="NIKHIL SAWAL" userId="c8dee9c8a82970a7" providerId="LiveId" clId="{5D13D954-F149-3944-BE6D-5630D4E0E09B}" dt="2021-02-02T15:56:53.473" v="10" actId="165"/>
+          <ac:chgData name="NIKHIL SAWAL" userId="c8dee9c8a82970a7" providerId="LiveId" clId="{5D13D954-F149-3944-BE6D-5630D4E0E09B}" dt="2021-03-02T16:53:23.131" v="340" actId="165"/>
           <ac:cxnSpMkLst>
             <pc:docMk/>
             <pc:sldMk cId="1926175025" sldId="257"/>
@@ -588,7 +597,7 @@
           </ac:cxnSpMkLst>
         </pc:cxnChg>
         <pc:cxnChg chg="mod topLvl">
-          <ac:chgData name="NIKHIL SAWAL" userId="c8dee9c8a82970a7" providerId="LiveId" clId="{5D13D954-F149-3944-BE6D-5630D4E0E09B}" dt="2021-02-02T15:56:53.473" v="10" actId="165"/>
+          <ac:chgData name="NIKHIL SAWAL" userId="c8dee9c8a82970a7" providerId="LiveId" clId="{5D13D954-F149-3944-BE6D-5630D4E0E09B}" dt="2021-03-02T16:53:23.131" v="340" actId="165"/>
           <ac:cxnSpMkLst>
             <pc:docMk/>
             <pc:sldMk cId="1926175025" sldId="257"/>
@@ -596,7 +605,7 @@
           </ac:cxnSpMkLst>
         </pc:cxnChg>
         <pc:cxnChg chg="mod topLvl">
-          <ac:chgData name="NIKHIL SAWAL" userId="c8dee9c8a82970a7" providerId="LiveId" clId="{5D13D954-F149-3944-BE6D-5630D4E0E09B}" dt="2021-02-02T15:56:53.473" v="10" actId="165"/>
+          <ac:chgData name="NIKHIL SAWAL" userId="c8dee9c8a82970a7" providerId="LiveId" clId="{5D13D954-F149-3944-BE6D-5630D4E0E09B}" dt="2021-03-02T16:53:23.131" v="340" actId="165"/>
           <ac:cxnSpMkLst>
             <pc:docMk/>
             <pc:sldMk cId="1926175025" sldId="257"/>
@@ -604,7 +613,7 @@
           </ac:cxnSpMkLst>
         </pc:cxnChg>
         <pc:cxnChg chg="mod topLvl">
-          <ac:chgData name="NIKHIL SAWAL" userId="c8dee9c8a82970a7" providerId="LiveId" clId="{5D13D954-F149-3944-BE6D-5630D4E0E09B}" dt="2021-02-02T15:56:53.473" v="10" actId="165"/>
+          <ac:chgData name="NIKHIL SAWAL" userId="c8dee9c8a82970a7" providerId="LiveId" clId="{5D13D954-F149-3944-BE6D-5630D4E0E09B}" dt="2021-03-02T16:53:23.131" v="340" actId="165"/>
           <ac:cxnSpMkLst>
             <pc:docMk/>
             <pc:sldMk cId="1926175025" sldId="257"/>
@@ -612,7 +621,7 @@
           </ac:cxnSpMkLst>
         </pc:cxnChg>
         <pc:cxnChg chg="mod topLvl">
-          <ac:chgData name="NIKHIL SAWAL" userId="c8dee9c8a82970a7" providerId="LiveId" clId="{5D13D954-F149-3944-BE6D-5630D4E0E09B}" dt="2021-02-02T15:56:53.473" v="10" actId="165"/>
+          <ac:chgData name="NIKHIL SAWAL" userId="c8dee9c8a82970a7" providerId="LiveId" clId="{5D13D954-F149-3944-BE6D-5630D4E0E09B}" dt="2021-03-02T16:53:23.131" v="340" actId="165"/>
           <ac:cxnSpMkLst>
             <pc:docMk/>
             <pc:sldMk cId="1926175025" sldId="257"/>
@@ -620,7 +629,7 @@
           </ac:cxnSpMkLst>
         </pc:cxnChg>
         <pc:cxnChg chg="mod topLvl">
-          <ac:chgData name="NIKHIL SAWAL" userId="c8dee9c8a82970a7" providerId="LiveId" clId="{5D13D954-F149-3944-BE6D-5630D4E0E09B}" dt="2021-02-02T15:56:53.473" v="10" actId="165"/>
+          <ac:chgData name="NIKHIL SAWAL" userId="c8dee9c8a82970a7" providerId="LiveId" clId="{5D13D954-F149-3944-BE6D-5630D4E0E09B}" dt="2021-03-02T16:53:23.131" v="340" actId="165"/>
           <ac:cxnSpMkLst>
             <pc:docMk/>
             <pc:sldMk cId="1926175025" sldId="257"/>
@@ -2153,6 +2162,501 @@
             <ac:picMk id="8" creationId="{DB26561F-50AD-DC48-A7FE-D315F8B8099A}"/>
           </ac:picMkLst>
         </pc:picChg>
+      </pc:sldChg>
+      <pc:sldChg chg="addSp delSp modSp new mod">
+        <pc:chgData name="NIKHIL SAWAL" userId="c8dee9c8a82970a7" providerId="LiveId" clId="{5D13D954-F149-3944-BE6D-5630D4E0E09B}" dt="2021-03-02T16:53:00.729" v="339"/>
+        <pc:sldMkLst>
+          <pc:docMk/>
+          <pc:sldMk cId="2502796257" sldId="261"/>
+        </pc:sldMkLst>
+        <pc:spChg chg="del">
+          <ac:chgData name="NIKHIL SAWAL" userId="c8dee9c8a82970a7" providerId="LiveId" clId="{5D13D954-F149-3944-BE6D-5630D4E0E09B}" dt="2021-03-02T16:52:59.225" v="338" actId="478"/>
+          <ac:spMkLst>
+            <pc:docMk/>
+            <pc:sldMk cId="2502796257" sldId="261"/>
+            <ac:spMk id="2" creationId="{123BE2A2-8D2C-D442-9DF0-917E9751C661}"/>
+          </ac:spMkLst>
+        </pc:spChg>
+        <pc:spChg chg="del">
+          <ac:chgData name="NIKHIL SAWAL" userId="c8dee9c8a82970a7" providerId="LiveId" clId="{5D13D954-F149-3944-BE6D-5630D4E0E09B}" dt="2021-03-02T16:52:58.032" v="337" actId="478"/>
+          <ac:spMkLst>
+            <pc:docMk/>
+            <pc:sldMk cId="2502796257" sldId="261"/>
+            <ac:spMk id="3" creationId="{45D57BCE-8359-8843-9A8E-489B1894CE96}"/>
+          </ac:spMkLst>
+        </pc:spChg>
+        <pc:spChg chg="mod">
+          <ac:chgData name="NIKHIL SAWAL" userId="c8dee9c8a82970a7" providerId="LiveId" clId="{5D13D954-F149-3944-BE6D-5630D4E0E09B}" dt="2021-03-02T16:53:00.729" v="339"/>
+          <ac:spMkLst>
+            <pc:docMk/>
+            <pc:sldMk cId="2502796257" sldId="261"/>
+            <ac:spMk id="5" creationId="{8A03BC1E-2FFE-224E-8064-4435F24A57C2}"/>
+          </ac:spMkLst>
+        </pc:spChg>
+        <pc:spChg chg="mod">
+          <ac:chgData name="NIKHIL SAWAL" userId="c8dee9c8a82970a7" providerId="LiveId" clId="{5D13D954-F149-3944-BE6D-5630D4E0E09B}" dt="2021-03-02T16:53:00.729" v="339"/>
+          <ac:spMkLst>
+            <pc:docMk/>
+            <pc:sldMk cId="2502796257" sldId="261"/>
+            <ac:spMk id="6" creationId="{A9527D3D-C5CD-5D46-AC8C-70F18EFBE0AC}"/>
+          </ac:spMkLst>
+        </pc:spChg>
+        <pc:spChg chg="mod">
+          <ac:chgData name="NIKHIL SAWAL" userId="c8dee9c8a82970a7" providerId="LiveId" clId="{5D13D954-F149-3944-BE6D-5630D4E0E09B}" dt="2021-03-02T16:53:00.729" v="339"/>
+          <ac:spMkLst>
+            <pc:docMk/>
+            <pc:sldMk cId="2502796257" sldId="261"/>
+            <ac:spMk id="7" creationId="{4F61C3BC-AB2A-0342-8A07-1E76868CE644}"/>
+          </ac:spMkLst>
+        </pc:spChg>
+        <pc:spChg chg="mod">
+          <ac:chgData name="NIKHIL SAWAL" userId="c8dee9c8a82970a7" providerId="LiveId" clId="{5D13D954-F149-3944-BE6D-5630D4E0E09B}" dt="2021-03-02T16:53:00.729" v="339"/>
+          <ac:spMkLst>
+            <pc:docMk/>
+            <pc:sldMk cId="2502796257" sldId="261"/>
+            <ac:spMk id="8" creationId="{48BB85A4-8F27-C84F-92C3-D88DA8EA0650}"/>
+          </ac:spMkLst>
+        </pc:spChg>
+        <pc:spChg chg="mod">
+          <ac:chgData name="NIKHIL SAWAL" userId="c8dee9c8a82970a7" providerId="LiveId" clId="{5D13D954-F149-3944-BE6D-5630D4E0E09B}" dt="2021-03-02T16:53:00.729" v="339"/>
+          <ac:spMkLst>
+            <pc:docMk/>
+            <pc:sldMk cId="2502796257" sldId="261"/>
+            <ac:spMk id="9" creationId="{524BEEA7-4363-0F42-BD24-1CB800B1C8A5}"/>
+          </ac:spMkLst>
+        </pc:spChg>
+        <pc:spChg chg="mod">
+          <ac:chgData name="NIKHIL SAWAL" userId="c8dee9c8a82970a7" providerId="LiveId" clId="{5D13D954-F149-3944-BE6D-5630D4E0E09B}" dt="2021-03-02T16:53:00.729" v="339"/>
+          <ac:spMkLst>
+            <pc:docMk/>
+            <pc:sldMk cId="2502796257" sldId="261"/>
+            <ac:spMk id="10" creationId="{A51A1DFF-626E-074B-B19E-34DA1903EFCD}"/>
+          </ac:spMkLst>
+        </pc:spChg>
+        <pc:spChg chg="mod">
+          <ac:chgData name="NIKHIL SAWAL" userId="c8dee9c8a82970a7" providerId="LiveId" clId="{5D13D954-F149-3944-BE6D-5630D4E0E09B}" dt="2021-03-02T16:53:00.729" v="339"/>
+          <ac:spMkLst>
+            <pc:docMk/>
+            <pc:sldMk cId="2502796257" sldId="261"/>
+            <ac:spMk id="11" creationId="{CA1E83BD-087B-FD4B-B58B-02E045302B55}"/>
+          </ac:spMkLst>
+        </pc:spChg>
+        <pc:spChg chg="mod">
+          <ac:chgData name="NIKHIL SAWAL" userId="c8dee9c8a82970a7" providerId="LiveId" clId="{5D13D954-F149-3944-BE6D-5630D4E0E09B}" dt="2021-03-02T16:53:00.729" v="339"/>
+          <ac:spMkLst>
+            <pc:docMk/>
+            <pc:sldMk cId="2502796257" sldId="261"/>
+            <ac:spMk id="12" creationId="{189E0D80-56E0-864D-BF1F-D834ED6592D3}"/>
+          </ac:spMkLst>
+        </pc:spChg>
+        <pc:spChg chg="mod">
+          <ac:chgData name="NIKHIL SAWAL" userId="c8dee9c8a82970a7" providerId="LiveId" clId="{5D13D954-F149-3944-BE6D-5630D4E0E09B}" dt="2021-03-02T16:53:00.729" v="339"/>
+          <ac:spMkLst>
+            <pc:docMk/>
+            <pc:sldMk cId="2502796257" sldId="261"/>
+            <ac:spMk id="13" creationId="{CBF5BD21-C1CA-1E4C-B8CC-7D7269FE6B25}"/>
+          </ac:spMkLst>
+        </pc:spChg>
+        <pc:spChg chg="mod">
+          <ac:chgData name="NIKHIL SAWAL" userId="c8dee9c8a82970a7" providerId="LiveId" clId="{5D13D954-F149-3944-BE6D-5630D4E0E09B}" dt="2021-03-02T16:53:00.729" v="339"/>
+          <ac:spMkLst>
+            <pc:docMk/>
+            <pc:sldMk cId="2502796257" sldId="261"/>
+            <ac:spMk id="14" creationId="{9920738B-58FA-5543-8CC1-0AC3DB39B4E7}"/>
+          </ac:spMkLst>
+        </pc:spChg>
+        <pc:spChg chg="mod">
+          <ac:chgData name="NIKHIL SAWAL" userId="c8dee9c8a82970a7" providerId="LiveId" clId="{5D13D954-F149-3944-BE6D-5630D4E0E09B}" dt="2021-03-02T16:53:00.729" v="339"/>
+          <ac:spMkLst>
+            <pc:docMk/>
+            <pc:sldMk cId="2502796257" sldId="261"/>
+            <ac:spMk id="32" creationId="{67D6D84C-4437-3545-8F51-9685C538C91F}"/>
+          </ac:spMkLst>
+        </pc:spChg>
+        <pc:spChg chg="mod">
+          <ac:chgData name="NIKHIL SAWAL" userId="c8dee9c8a82970a7" providerId="LiveId" clId="{5D13D954-F149-3944-BE6D-5630D4E0E09B}" dt="2021-03-02T16:53:00.729" v="339"/>
+          <ac:spMkLst>
+            <pc:docMk/>
+            <pc:sldMk cId="2502796257" sldId="261"/>
+            <ac:spMk id="35" creationId="{130801B5-070F-024C-BD6A-28B37786BE1E}"/>
+          </ac:spMkLst>
+        </pc:spChg>
+        <pc:spChg chg="mod">
+          <ac:chgData name="NIKHIL SAWAL" userId="c8dee9c8a82970a7" providerId="LiveId" clId="{5D13D954-F149-3944-BE6D-5630D4E0E09B}" dt="2021-03-02T16:53:00.729" v="339"/>
+          <ac:spMkLst>
+            <pc:docMk/>
+            <pc:sldMk cId="2502796257" sldId="261"/>
+            <ac:spMk id="44" creationId="{4B91D3F0-B7CA-D14F-B772-0AD0457E2D0F}"/>
+          </ac:spMkLst>
+        </pc:spChg>
+        <pc:spChg chg="mod">
+          <ac:chgData name="NIKHIL SAWAL" userId="c8dee9c8a82970a7" providerId="LiveId" clId="{5D13D954-F149-3944-BE6D-5630D4E0E09B}" dt="2021-03-02T16:53:00.729" v="339"/>
+          <ac:spMkLst>
+            <pc:docMk/>
+            <pc:sldMk cId="2502796257" sldId="261"/>
+            <ac:spMk id="45" creationId="{56C8FE8B-D9E2-FB47-AEB2-02648A4C5382}"/>
+          </ac:spMkLst>
+        </pc:spChg>
+        <pc:spChg chg="mod">
+          <ac:chgData name="NIKHIL SAWAL" userId="c8dee9c8a82970a7" providerId="LiveId" clId="{5D13D954-F149-3944-BE6D-5630D4E0E09B}" dt="2021-03-02T16:53:00.729" v="339"/>
+          <ac:spMkLst>
+            <pc:docMk/>
+            <pc:sldMk cId="2502796257" sldId="261"/>
+            <ac:spMk id="53" creationId="{8315D20D-78E6-7741-802B-1D285BC32E83}"/>
+          </ac:spMkLst>
+        </pc:spChg>
+        <pc:spChg chg="mod">
+          <ac:chgData name="NIKHIL SAWAL" userId="c8dee9c8a82970a7" providerId="LiveId" clId="{5D13D954-F149-3944-BE6D-5630D4E0E09B}" dt="2021-03-02T16:53:00.729" v="339"/>
+          <ac:spMkLst>
+            <pc:docMk/>
+            <pc:sldMk cId="2502796257" sldId="261"/>
+            <ac:spMk id="57" creationId="{5603AB65-BA52-8340-81A5-5D00EF4689D5}"/>
+          </ac:spMkLst>
+        </pc:spChg>
+        <pc:spChg chg="mod">
+          <ac:chgData name="NIKHIL SAWAL" userId="c8dee9c8a82970a7" providerId="LiveId" clId="{5D13D954-F149-3944-BE6D-5630D4E0E09B}" dt="2021-03-02T16:53:00.729" v="339"/>
+          <ac:spMkLst>
+            <pc:docMk/>
+            <pc:sldMk cId="2502796257" sldId="261"/>
+            <ac:spMk id="58" creationId="{526FCD2D-9E99-C548-9909-62BBBA4E87CF}"/>
+          </ac:spMkLst>
+        </pc:spChg>
+        <pc:spChg chg="mod">
+          <ac:chgData name="NIKHIL SAWAL" userId="c8dee9c8a82970a7" providerId="LiveId" clId="{5D13D954-F149-3944-BE6D-5630D4E0E09B}" dt="2021-03-02T16:53:00.729" v="339"/>
+          <ac:spMkLst>
+            <pc:docMk/>
+            <pc:sldMk cId="2502796257" sldId="261"/>
+            <ac:spMk id="59" creationId="{B58E4C7E-50FD-2047-937A-7E9F37D50166}"/>
+          </ac:spMkLst>
+        </pc:spChg>
+        <pc:spChg chg="mod">
+          <ac:chgData name="NIKHIL SAWAL" userId="c8dee9c8a82970a7" providerId="LiveId" clId="{5D13D954-F149-3944-BE6D-5630D4E0E09B}" dt="2021-03-02T16:53:00.729" v="339"/>
+          <ac:spMkLst>
+            <pc:docMk/>
+            <pc:sldMk cId="2502796257" sldId="261"/>
+            <ac:spMk id="60" creationId="{131CB29A-C29B-3E4E-9C1F-7EBFB9A5BB4D}"/>
+          </ac:spMkLst>
+        </pc:spChg>
+        <pc:spChg chg="mod">
+          <ac:chgData name="NIKHIL SAWAL" userId="c8dee9c8a82970a7" providerId="LiveId" clId="{5D13D954-F149-3944-BE6D-5630D4E0E09B}" dt="2021-03-02T16:53:00.729" v="339"/>
+          <ac:spMkLst>
+            <pc:docMk/>
+            <pc:sldMk cId="2502796257" sldId="261"/>
+            <ac:spMk id="61" creationId="{37101CE7-4AC9-4D44-9727-A33AE322C929}"/>
+          </ac:spMkLst>
+        </pc:spChg>
+        <pc:spChg chg="mod">
+          <ac:chgData name="NIKHIL SAWAL" userId="c8dee9c8a82970a7" providerId="LiveId" clId="{5D13D954-F149-3944-BE6D-5630D4E0E09B}" dt="2021-03-02T16:53:00.729" v="339"/>
+          <ac:spMkLst>
+            <pc:docMk/>
+            <pc:sldMk cId="2502796257" sldId="261"/>
+            <ac:spMk id="62" creationId="{4473EC34-93B2-7446-A62B-09DA3D35EB39}"/>
+          </ac:spMkLst>
+        </pc:spChg>
+        <pc:grpChg chg="add mod">
+          <ac:chgData name="NIKHIL SAWAL" userId="c8dee9c8a82970a7" providerId="LiveId" clId="{5D13D954-F149-3944-BE6D-5630D4E0E09B}" dt="2021-03-02T16:53:00.729" v="339"/>
+          <ac:grpSpMkLst>
+            <pc:docMk/>
+            <pc:sldMk cId="2502796257" sldId="261"/>
+            <ac:grpSpMk id="4" creationId="{B11D1E96-29EB-9F40-9850-8B5C29E86FAD}"/>
+          </ac:grpSpMkLst>
+        </pc:grpChg>
+        <pc:picChg chg="mod">
+          <ac:chgData name="NIKHIL SAWAL" userId="c8dee9c8a82970a7" providerId="LiveId" clId="{5D13D954-F149-3944-BE6D-5630D4E0E09B}" dt="2021-03-02T16:53:00.729" v="339"/>
+          <ac:picMkLst>
+            <pc:docMk/>
+            <pc:sldMk cId="2502796257" sldId="261"/>
+            <ac:picMk id="15" creationId="{8B0E13C3-5F0B-B843-9024-DFFD6B77B372}"/>
+          </ac:picMkLst>
+        </pc:picChg>
+        <pc:picChg chg="mod">
+          <ac:chgData name="NIKHIL SAWAL" userId="c8dee9c8a82970a7" providerId="LiveId" clId="{5D13D954-F149-3944-BE6D-5630D4E0E09B}" dt="2021-03-02T16:53:00.729" v="339"/>
+          <ac:picMkLst>
+            <pc:docMk/>
+            <pc:sldMk cId="2502796257" sldId="261"/>
+            <ac:picMk id="26" creationId="{04C4D5E7-C7C6-3146-90AE-1199EC55A5B9}"/>
+          </ac:picMkLst>
+        </pc:picChg>
+        <pc:picChg chg="mod">
+          <ac:chgData name="NIKHIL SAWAL" userId="c8dee9c8a82970a7" providerId="LiveId" clId="{5D13D954-F149-3944-BE6D-5630D4E0E09B}" dt="2021-03-02T16:53:00.729" v="339"/>
+          <ac:picMkLst>
+            <pc:docMk/>
+            <pc:sldMk cId="2502796257" sldId="261"/>
+            <ac:picMk id="27" creationId="{A03B6C4E-D137-9449-9404-9AC23FC2DF2C}"/>
+          </ac:picMkLst>
+        </pc:picChg>
+        <pc:picChg chg="mod">
+          <ac:chgData name="NIKHIL SAWAL" userId="c8dee9c8a82970a7" providerId="LiveId" clId="{5D13D954-F149-3944-BE6D-5630D4E0E09B}" dt="2021-03-02T16:53:00.729" v="339"/>
+          <ac:picMkLst>
+            <pc:docMk/>
+            <pc:sldMk cId="2502796257" sldId="261"/>
+            <ac:picMk id="28" creationId="{458855FA-47D6-EF43-A9EE-7172361AFF18}"/>
+          </ac:picMkLst>
+        </pc:picChg>
+        <pc:picChg chg="mod">
+          <ac:chgData name="NIKHIL SAWAL" userId="c8dee9c8a82970a7" providerId="LiveId" clId="{5D13D954-F149-3944-BE6D-5630D4E0E09B}" dt="2021-03-02T16:53:00.729" v="339"/>
+          <ac:picMkLst>
+            <pc:docMk/>
+            <pc:sldMk cId="2502796257" sldId="261"/>
+            <ac:picMk id="29" creationId="{A01522F0-57F8-FC4F-B4DA-096599B4DCA9}"/>
+          </ac:picMkLst>
+        </pc:picChg>
+        <pc:picChg chg="mod">
+          <ac:chgData name="NIKHIL SAWAL" userId="c8dee9c8a82970a7" providerId="LiveId" clId="{5D13D954-F149-3944-BE6D-5630D4E0E09B}" dt="2021-03-02T16:53:00.729" v="339"/>
+          <ac:picMkLst>
+            <pc:docMk/>
+            <pc:sldMk cId="2502796257" sldId="261"/>
+            <ac:picMk id="30" creationId="{A323BB18-E643-0C40-8EEF-A0F6027F36CD}"/>
+          </ac:picMkLst>
+        </pc:picChg>
+        <pc:picChg chg="mod">
+          <ac:chgData name="NIKHIL SAWAL" userId="c8dee9c8a82970a7" providerId="LiveId" clId="{5D13D954-F149-3944-BE6D-5630D4E0E09B}" dt="2021-03-02T16:53:00.729" v="339"/>
+          <ac:picMkLst>
+            <pc:docMk/>
+            <pc:sldMk cId="2502796257" sldId="261"/>
+            <ac:picMk id="31" creationId="{1FA10B1E-1EE3-574E-A159-DC13AC1ED4EF}"/>
+          </ac:picMkLst>
+        </pc:picChg>
+        <pc:picChg chg="mod">
+          <ac:chgData name="NIKHIL SAWAL" userId="c8dee9c8a82970a7" providerId="LiveId" clId="{5D13D954-F149-3944-BE6D-5630D4E0E09B}" dt="2021-03-02T16:53:00.729" v="339"/>
+          <ac:picMkLst>
+            <pc:docMk/>
+            <pc:sldMk cId="2502796257" sldId="261"/>
+            <ac:picMk id="33" creationId="{6A8E5AF9-7582-3949-AA06-82CE52F952F6}"/>
+          </ac:picMkLst>
+        </pc:picChg>
+        <pc:picChg chg="mod">
+          <ac:chgData name="NIKHIL SAWAL" userId="c8dee9c8a82970a7" providerId="LiveId" clId="{5D13D954-F149-3944-BE6D-5630D4E0E09B}" dt="2021-03-02T16:53:00.729" v="339"/>
+          <ac:picMkLst>
+            <pc:docMk/>
+            <pc:sldMk cId="2502796257" sldId="261"/>
+            <ac:picMk id="42" creationId="{435C7769-900C-5A47-98F4-A669CB5D05AC}"/>
+          </ac:picMkLst>
+        </pc:picChg>
+        <pc:picChg chg="mod">
+          <ac:chgData name="NIKHIL SAWAL" userId="c8dee9c8a82970a7" providerId="LiveId" clId="{5D13D954-F149-3944-BE6D-5630D4E0E09B}" dt="2021-03-02T16:53:00.729" v="339"/>
+          <ac:picMkLst>
+            <pc:docMk/>
+            <pc:sldMk cId="2502796257" sldId="261"/>
+            <ac:picMk id="43" creationId="{D9D7205B-191F-F94F-B0B3-0ED92E7CF9BD}"/>
+          </ac:picMkLst>
+        </pc:picChg>
+        <pc:picChg chg="mod">
+          <ac:chgData name="NIKHIL SAWAL" userId="c8dee9c8a82970a7" providerId="LiveId" clId="{5D13D954-F149-3944-BE6D-5630D4E0E09B}" dt="2021-03-02T16:53:00.729" v="339"/>
+          <ac:picMkLst>
+            <pc:docMk/>
+            <pc:sldMk cId="2502796257" sldId="261"/>
+            <ac:picMk id="46" creationId="{3C796B09-2873-B145-93C7-39C230785583}"/>
+          </ac:picMkLst>
+        </pc:picChg>
+        <pc:picChg chg="mod">
+          <ac:chgData name="NIKHIL SAWAL" userId="c8dee9c8a82970a7" providerId="LiveId" clId="{5D13D954-F149-3944-BE6D-5630D4E0E09B}" dt="2021-03-02T16:53:00.729" v="339"/>
+          <ac:picMkLst>
+            <pc:docMk/>
+            <pc:sldMk cId="2502796257" sldId="261"/>
+            <ac:picMk id="47" creationId="{24178234-E6F0-8D4F-956C-E7C4B3C9A684}"/>
+          </ac:picMkLst>
+        </pc:picChg>
+        <pc:picChg chg="mod">
+          <ac:chgData name="NIKHIL SAWAL" userId="c8dee9c8a82970a7" providerId="LiveId" clId="{5D13D954-F149-3944-BE6D-5630D4E0E09B}" dt="2021-03-02T16:53:00.729" v="339"/>
+          <ac:picMkLst>
+            <pc:docMk/>
+            <pc:sldMk cId="2502796257" sldId="261"/>
+            <ac:picMk id="54" creationId="{4D885E78-34C1-C64D-A4B4-D6A0AD77F4EE}"/>
+          </ac:picMkLst>
+        </pc:picChg>
+        <pc:picChg chg="mod">
+          <ac:chgData name="NIKHIL SAWAL" userId="c8dee9c8a82970a7" providerId="LiveId" clId="{5D13D954-F149-3944-BE6D-5630D4E0E09B}" dt="2021-03-02T16:53:00.729" v="339"/>
+          <ac:picMkLst>
+            <pc:docMk/>
+            <pc:sldMk cId="2502796257" sldId="261"/>
+            <ac:picMk id="55" creationId="{0FDBD032-3B40-0445-9525-B5525E534123}"/>
+          </ac:picMkLst>
+        </pc:picChg>
+        <pc:picChg chg="mod">
+          <ac:chgData name="NIKHIL SAWAL" userId="c8dee9c8a82970a7" providerId="LiveId" clId="{5D13D954-F149-3944-BE6D-5630D4E0E09B}" dt="2021-03-02T16:53:00.729" v="339"/>
+          <ac:picMkLst>
+            <pc:docMk/>
+            <pc:sldMk cId="2502796257" sldId="261"/>
+            <ac:picMk id="56" creationId="{2E16C604-6A84-D349-BAFC-489AC046CADF}"/>
+          </ac:picMkLst>
+        </pc:picChg>
+        <pc:cxnChg chg="mod">
+          <ac:chgData name="NIKHIL SAWAL" userId="c8dee9c8a82970a7" providerId="LiveId" clId="{5D13D954-F149-3944-BE6D-5630D4E0E09B}" dt="2021-03-02T16:53:00.729" v="339"/>
+          <ac:cxnSpMkLst>
+            <pc:docMk/>
+            <pc:sldMk cId="2502796257" sldId="261"/>
+            <ac:cxnSpMk id="16" creationId="{C43107B1-63BA-BF43-8F3B-2E2C8BA66C07}"/>
+          </ac:cxnSpMkLst>
+        </pc:cxnChg>
+        <pc:cxnChg chg="mod">
+          <ac:chgData name="NIKHIL SAWAL" userId="c8dee9c8a82970a7" providerId="LiveId" clId="{5D13D954-F149-3944-BE6D-5630D4E0E09B}" dt="2021-03-02T16:53:00.729" v="339"/>
+          <ac:cxnSpMkLst>
+            <pc:docMk/>
+            <pc:sldMk cId="2502796257" sldId="261"/>
+            <ac:cxnSpMk id="17" creationId="{E64AC287-954F-E34D-A419-D7FF979B7C05}"/>
+          </ac:cxnSpMkLst>
+        </pc:cxnChg>
+        <pc:cxnChg chg="mod">
+          <ac:chgData name="NIKHIL SAWAL" userId="c8dee9c8a82970a7" providerId="LiveId" clId="{5D13D954-F149-3944-BE6D-5630D4E0E09B}" dt="2021-03-02T16:53:00.729" v="339"/>
+          <ac:cxnSpMkLst>
+            <pc:docMk/>
+            <pc:sldMk cId="2502796257" sldId="261"/>
+            <ac:cxnSpMk id="18" creationId="{3A59DB52-1CA5-EA45-BD02-FAAF05235214}"/>
+          </ac:cxnSpMkLst>
+        </pc:cxnChg>
+        <pc:cxnChg chg="mod">
+          <ac:chgData name="NIKHIL SAWAL" userId="c8dee9c8a82970a7" providerId="LiveId" clId="{5D13D954-F149-3944-BE6D-5630D4E0E09B}" dt="2021-03-02T16:53:00.729" v="339"/>
+          <ac:cxnSpMkLst>
+            <pc:docMk/>
+            <pc:sldMk cId="2502796257" sldId="261"/>
+            <ac:cxnSpMk id="19" creationId="{BCB8D22B-3B30-8B46-B1F4-24A020FBE974}"/>
+          </ac:cxnSpMkLst>
+        </pc:cxnChg>
+        <pc:cxnChg chg="mod">
+          <ac:chgData name="NIKHIL SAWAL" userId="c8dee9c8a82970a7" providerId="LiveId" clId="{5D13D954-F149-3944-BE6D-5630D4E0E09B}" dt="2021-03-02T16:53:00.729" v="339"/>
+          <ac:cxnSpMkLst>
+            <pc:docMk/>
+            <pc:sldMk cId="2502796257" sldId="261"/>
+            <ac:cxnSpMk id="20" creationId="{3FF5BDB9-7EDB-0349-ABDD-AD0419F894F5}"/>
+          </ac:cxnSpMkLst>
+        </pc:cxnChg>
+        <pc:cxnChg chg="mod">
+          <ac:chgData name="NIKHIL SAWAL" userId="c8dee9c8a82970a7" providerId="LiveId" clId="{5D13D954-F149-3944-BE6D-5630D4E0E09B}" dt="2021-03-02T16:53:00.729" v="339"/>
+          <ac:cxnSpMkLst>
+            <pc:docMk/>
+            <pc:sldMk cId="2502796257" sldId="261"/>
+            <ac:cxnSpMk id="21" creationId="{698A9819-EF2B-E44D-A073-74DD0226D468}"/>
+          </ac:cxnSpMkLst>
+        </pc:cxnChg>
+        <pc:cxnChg chg="mod">
+          <ac:chgData name="NIKHIL SAWAL" userId="c8dee9c8a82970a7" providerId="LiveId" clId="{5D13D954-F149-3944-BE6D-5630D4E0E09B}" dt="2021-03-02T16:53:00.729" v="339"/>
+          <ac:cxnSpMkLst>
+            <pc:docMk/>
+            <pc:sldMk cId="2502796257" sldId="261"/>
+            <ac:cxnSpMk id="22" creationId="{2453E96B-8EA9-DD4F-B21A-8C52835E4729}"/>
+          </ac:cxnSpMkLst>
+        </pc:cxnChg>
+        <pc:cxnChg chg="mod">
+          <ac:chgData name="NIKHIL SAWAL" userId="c8dee9c8a82970a7" providerId="LiveId" clId="{5D13D954-F149-3944-BE6D-5630D4E0E09B}" dt="2021-03-02T16:53:00.729" v="339"/>
+          <ac:cxnSpMkLst>
+            <pc:docMk/>
+            <pc:sldMk cId="2502796257" sldId="261"/>
+            <ac:cxnSpMk id="23" creationId="{F32B68FF-F276-2C4F-AC70-2FB2121C4C62}"/>
+          </ac:cxnSpMkLst>
+        </pc:cxnChg>
+        <pc:cxnChg chg="mod">
+          <ac:chgData name="NIKHIL SAWAL" userId="c8dee9c8a82970a7" providerId="LiveId" clId="{5D13D954-F149-3944-BE6D-5630D4E0E09B}" dt="2021-03-02T16:53:00.729" v="339"/>
+          <ac:cxnSpMkLst>
+            <pc:docMk/>
+            <pc:sldMk cId="2502796257" sldId="261"/>
+            <ac:cxnSpMk id="24" creationId="{A2B911F9-FFB9-F24B-9668-2483F60DA77C}"/>
+          </ac:cxnSpMkLst>
+        </pc:cxnChg>
+        <pc:cxnChg chg="mod">
+          <ac:chgData name="NIKHIL SAWAL" userId="c8dee9c8a82970a7" providerId="LiveId" clId="{5D13D954-F149-3944-BE6D-5630D4E0E09B}" dt="2021-03-02T16:53:00.729" v="339"/>
+          <ac:cxnSpMkLst>
+            <pc:docMk/>
+            <pc:sldMk cId="2502796257" sldId="261"/>
+            <ac:cxnSpMk id="25" creationId="{E7A6B3D4-4318-1147-9938-3CB0B32E5FCA}"/>
+          </ac:cxnSpMkLst>
+        </pc:cxnChg>
+        <pc:cxnChg chg="mod">
+          <ac:chgData name="NIKHIL SAWAL" userId="c8dee9c8a82970a7" providerId="LiveId" clId="{5D13D954-F149-3944-BE6D-5630D4E0E09B}" dt="2021-03-02T16:53:00.729" v="339"/>
+          <ac:cxnSpMkLst>
+            <pc:docMk/>
+            <pc:sldMk cId="2502796257" sldId="261"/>
+            <ac:cxnSpMk id="34" creationId="{2CB94DB9-CB2B-824B-BE7E-216F350084DF}"/>
+          </ac:cxnSpMkLst>
+        </pc:cxnChg>
+        <pc:cxnChg chg="mod">
+          <ac:chgData name="NIKHIL SAWAL" userId="c8dee9c8a82970a7" providerId="LiveId" clId="{5D13D954-F149-3944-BE6D-5630D4E0E09B}" dt="2021-03-02T16:53:00.729" v="339"/>
+          <ac:cxnSpMkLst>
+            <pc:docMk/>
+            <pc:sldMk cId="2502796257" sldId="261"/>
+            <ac:cxnSpMk id="36" creationId="{CFA2D530-8E1F-E04A-B14B-DE5836997197}"/>
+          </ac:cxnSpMkLst>
+        </pc:cxnChg>
+        <pc:cxnChg chg="mod">
+          <ac:chgData name="NIKHIL SAWAL" userId="c8dee9c8a82970a7" providerId="LiveId" clId="{5D13D954-F149-3944-BE6D-5630D4E0E09B}" dt="2021-03-02T16:53:00.729" v="339"/>
+          <ac:cxnSpMkLst>
+            <pc:docMk/>
+            <pc:sldMk cId="2502796257" sldId="261"/>
+            <ac:cxnSpMk id="37" creationId="{285CD5EE-A33A-0141-9904-C7E27D70DB89}"/>
+          </ac:cxnSpMkLst>
+        </pc:cxnChg>
+        <pc:cxnChg chg="mod">
+          <ac:chgData name="NIKHIL SAWAL" userId="c8dee9c8a82970a7" providerId="LiveId" clId="{5D13D954-F149-3944-BE6D-5630D4E0E09B}" dt="2021-03-02T16:53:00.729" v="339"/>
+          <ac:cxnSpMkLst>
+            <pc:docMk/>
+            <pc:sldMk cId="2502796257" sldId="261"/>
+            <ac:cxnSpMk id="38" creationId="{A6674FEF-ECBE-ED4D-96EA-43E0CA46B57A}"/>
+          </ac:cxnSpMkLst>
+        </pc:cxnChg>
+        <pc:cxnChg chg="mod">
+          <ac:chgData name="NIKHIL SAWAL" userId="c8dee9c8a82970a7" providerId="LiveId" clId="{5D13D954-F149-3944-BE6D-5630D4E0E09B}" dt="2021-03-02T16:53:00.729" v="339"/>
+          <ac:cxnSpMkLst>
+            <pc:docMk/>
+            <pc:sldMk cId="2502796257" sldId="261"/>
+            <ac:cxnSpMk id="39" creationId="{A0449B51-1299-7B45-A5ED-F9136FF3FA01}"/>
+          </ac:cxnSpMkLst>
+        </pc:cxnChg>
+        <pc:cxnChg chg="mod">
+          <ac:chgData name="NIKHIL SAWAL" userId="c8dee9c8a82970a7" providerId="LiveId" clId="{5D13D954-F149-3944-BE6D-5630D4E0E09B}" dt="2021-03-02T16:53:00.729" v="339"/>
+          <ac:cxnSpMkLst>
+            <pc:docMk/>
+            <pc:sldMk cId="2502796257" sldId="261"/>
+            <ac:cxnSpMk id="40" creationId="{419F76FD-308F-9143-A1C6-52D3CF364775}"/>
+          </ac:cxnSpMkLst>
+        </pc:cxnChg>
+        <pc:cxnChg chg="mod">
+          <ac:chgData name="NIKHIL SAWAL" userId="c8dee9c8a82970a7" providerId="LiveId" clId="{5D13D954-F149-3944-BE6D-5630D4E0E09B}" dt="2021-03-02T16:53:00.729" v="339"/>
+          <ac:cxnSpMkLst>
+            <pc:docMk/>
+            <pc:sldMk cId="2502796257" sldId="261"/>
+            <ac:cxnSpMk id="41" creationId="{FC9ECC92-07E7-824B-8C77-16F5E8CC366B}"/>
+          </ac:cxnSpMkLst>
+        </pc:cxnChg>
+        <pc:cxnChg chg="mod">
+          <ac:chgData name="NIKHIL SAWAL" userId="c8dee9c8a82970a7" providerId="LiveId" clId="{5D13D954-F149-3944-BE6D-5630D4E0E09B}" dt="2021-03-02T16:53:00.729" v="339"/>
+          <ac:cxnSpMkLst>
+            <pc:docMk/>
+            <pc:sldMk cId="2502796257" sldId="261"/>
+            <ac:cxnSpMk id="48" creationId="{08060C37-1EDF-A34B-8F97-A2CF671DAFE0}"/>
+          </ac:cxnSpMkLst>
+        </pc:cxnChg>
+        <pc:cxnChg chg="mod">
+          <ac:chgData name="NIKHIL SAWAL" userId="c8dee9c8a82970a7" providerId="LiveId" clId="{5D13D954-F149-3944-BE6D-5630D4E0E09B}" dt="2021-03-02T16:53:00.729" v="339"/>
+          <ac:cxnSpMkLst>
+            <pc:docMk/>
+            <pc:sldMk cId="2502796257" sldId="261"/>
+            <ac:cxnSpMk id="49" creationId="{97D565A5-69EC-0C43-B52B-77470C8A7565}"/>
+          </ac:cxnSpMkLst>
+        </pc:cxnChg>
+        <pc:cxnChg chg="mod">
+          <ac:chgData name="NIKHIL SAWAL" userId="c8dee9c8a82970a7" providerId="LiveId" clId="{5D13D954-F149-3944-BE6D-5630D4E0E09B}" dt="2021-03-02T16:53:00.729" v="339"/>
+          <ac:cxnSpMkLst>
+            <pc:docMk/>
+            <pc:sldMk cId="2502796257" sldId="261"/>
+            <ac:cxnSpMk id="50" creationId="{56EABCB1-D4CB-0447-9118-847FA9C8DD92}"/>
+          </ac:cxnSpMkLst>
+        </pc:cxnChg>
+        <pc:cxnChg chg="mod">
+          <ac:chgData name="NIKHIL SAWAL" userId="c8dee9c8a82970a7" providerId="LiveId" clId="{5D13D954-F149-3944-BE6D-5630D4E0E09B}" dt="2021-03-02T16:53:00.729" v="339"/>
+          <ac:cxnSpMkLst>
+            <pc:docMk/>
+            <pc:sldMk cId="2502796257" sldId="261"/>
+            <ac:cxnSpMk id="51" creationId="{33C75E80-17A6-5642-9154-14A5DBD1FCD5}"/>
+          </ac:cxnSpMkLst>
+        </pc:cxnChg>
+        <pc:cxnChg chg="mod">
+          <ac:chgData name="NIKHIL SAWAL" userId="c8dee9c8a82970a7" providerId="LiveId" clId="{5D13D954-F149-3944-BE6D-5630D4E0E09B}" dt="2021-03-02T16:53:00.729" v="339"/>
+          <ac:cxnSpMkLst>
+            <pc:docMk/>
+            <pc:sldMk cId="2502796257" sldId="261"/>
+            <ac:cxnSpMk id="52" creationId="{1EF0FF93-3449-5B43-81BF-1258E2A5B9AD}"/>
+          </ac:cxnSpMkLst>
+        </pc:cxnChg>
       </pc:sldChg>
     </pc:docChg>
   </pc:docChgLst>
@@ -2306,7 +2810,7 @@
           <a:p>
             <a:fld id="{65FCF51C-0661-D24B-9A1A-0E491DBFC9EE}" type="datetimeFigureOut">
               <a:rPr lang="en-US" smtClean="0"/>
-              <a:t>2/2/21</a:t>
+              <a:t>3/2/21</a:t>
             </a:fld>
             <a:endParaRPr lang="en-US"/>
           </a:p>
@@ -2504,7 +3008,7 @@
           <a:p>
             <a:fld id="{65FCF51C-0661-D24B-9A1A-0E491DBFC9EE}" type="datetimeFigureOut">
               <a:rPr lang="en-US" smtClean="0"/>
-              <a:t>2/2/21</a:t>
+              <a:t>3/2/21</a:t>
             </a:fld>
             <a:endParaRPr lang="en-US"/>
           </a:p>
@@ -2712,7 +3216,7 @@
           <a:p>
             <a:fld id="{65FCF51C-0661-D24B-9A1A-0E491DBFC9EE}" type="datetimeFigureOut">
               <a:rPr lang="en-US" smtClean="0"/>
-              <a:t>2/2/21</a:t>
+              <a:t>3/2/21</a:t>
             </a:fld>
             <a:endParaRPr lang="en-US"/>
           </a:p>
@@ -2910,7 +3414,7 @@
           <a:p>
             <a:fld id="{65FCF51C-0661-D24B-9A1A-0E491DBFC9EE}" type="datetimeFigureOut">
               <a:rPr lang="en-US" smtClean="0"/>
-              <a:t>2/2/21</a:t>
+              <a:t>3/2/21</a:t>
             </a:fld>
             <a:endParaRPr lang="en-US"/>
           </a:p>
@@ -3185,7 +3689,7 @@
           <a:p>
             <a:fld id="{65FCF51C-0661-D24B-9A1A-0E491DBFC9EE}" type="datetimeFigureOut">
               <a:rPr lang="en-US" smtClean="0"/>
-              <a:t>2/2/21</a:t>
+              <a:t>3/2/21</a:t>
             </a:fld>
             <a:endParaRPr lang="en-US"/>
           </a:p>
@@ -3450,7 +3954,7 @@
           <a:p>
             <a:fld id="{65FCF51C-0661-D24B-9A1A-0E491DBFC9EE}" type="datetimeFigureOut">
               <a:rPr lang="en-US" smtClean="0"/>
-              <a:t>2/2/21</a:t>
+              <a:t>3/2/21</a:t>
             </a:fld>
             <a:endParaRPr lang="en-US"/>
           </a:p>
@@ -3862,7 +4366,7 @@
           <a:p>
             <a:fld id="{65FCF51C-0661-D24B-9A1A-0E491DBFC9EE}" type="datetimeFigureOut">
               <a:rPr lang="en-US" smtClean="0"/>
-              <a:t>2/2/21</a:t>
+              <a:t>3/2/21</a:t>
             </a:fld>
             <a:endParaRPr lang="en-US"/>
           </a:p>
@@ -4003,7 +4507,7 @@
           <a:p>
             <a:fld id="{65FCF51C-0661-D24B-9A1A-0E491DBFC9EE}" type="datetimeFigureOut">
               <a:rPr lang="en-US" smtClean="0"/>
-              <a:t>2/2/21</a:t>
+              <a:t>3/2/21</a:t>
             </a:fld>
             <a:endParaRPr lang="en-US"/>
           </a:p>
@@ -4116,7 +4620,7 @@
           <a:p>
             <a:fld id="{65FCF51C-0661-D24B-9A1A-0E491DBFC9EE}" type="datetimeFigureOut">
               <a:rPr lang="en-US" smtClean="0"/>
-              <a:t>2/2/21</a:t>
+              <a:t>3/2/21</a:t>
             </a:fld>
             <a:endParaRPr lang="en-US"/>
           </a:p>
@@ -4427,7 +4931,7 @@
           <a:p>
             <a:fld id="{65FCF51C-0661-D24B-9A1A-0E491DBFC9EE}" type="datetimeFigureOut">
               <a:rPr lang="en-US" smtClean="0"/>
-              <a:t>2/2/21</a:t>
+              <a:t>3/2/21</a:t>
             </a:fld>
             <a:endParaRPr lang="en-US"/>
           </a:p>
@@ -4715,7 +5219,7 @@
           <a:p>
             <a:fld id="{65FCF51C-0661-D24B-9A1A-0E491DBFC9EE}" type="datetimeFigureOut">
               <a:rPr lang="en-US" smtClean="0"/>
-              <a:t>2/2/21</a:t>
+              <a:t>3/2/21</a:t>
             </a:fld>
             <a:endParaRPr lang="en-US"/>
           </a:p>
@@ -4956,7 +5460,7 @@
           <a:p>
             <a:fld id="{65FCF51C-0661-D24B-9A1A-0E491DBFC9EE}" type="datetimeFigureOut">
               <a:rPr lang="en-US" smtClean="0"/>
-              <a:t>2/2/21</a:t>
+              <a:t>3/2/21</a:t>
             </a:fld>
             <a:endParaRPr lang="en-US"/>
           </a:p>
@@ -7252,8 +7756,8 @@
         </p:nvSpPr>
         <p:spPr>
           <a:xfrm>
-            <a:off x="650272" y="150089"/>
-            <a:ext cx="9954155" cy="5050649"/>
+            <a:off x="646766" y="1092227"/>
+            <a:ext cx="9954155" cy="4118584"/>
           </a:xfrm>
           <a:prstGeom prst="rect">
             <a:avLst/>
@@ -7314,7 +7818,7 @@
         </p:nvSpPr>
         <p:spPr>
           <a:xfrm>
-            <a:off x="-698572" y="5568595"/>
+            <a:off x="646750" y="5568595"/>
             <a:ext cx="9954171" cy="1143502"/>
           </a:xfrm>
           <a:prstGeom prst="rect">
@@ -7388,7 +7892,7 @@
         </p:blipFill>
         <p:spPr bwMode="auto">
           <a:xfrm>
-            <a:off x="8758885" y="250607"/>
+            <a:off x="8759358" y="1103327"/>
             <a:ext cx="1759743" cy="938530"/>
           </a:xfrm>
           <a:prstGeom prst="rect">
@@ -7668,45 +8172,6 @@
           </a:fontRef>
         </p:style>
       </p:cxnSp>
-      <p:sp>
-        <p:nvSpPr>
-          <p:cNvPr id="112" name="TextBox 111">
-            <a:extLst>
-              <a:ext uri="{FF2B5EF4-FFF2-40B4-BE49-F238E27FC236}">
-                <a16:creationId xmlns:a16="http://schemas.microsoft.com/office/drawing/2014/main" id="{E3ADC016-B89E-5D46-B934-3F63B4F3E2B1}"/>
-              </a:ext>
-            </a:extLst>
-          </p:cNvPr>
-          <p:cNvSpPr txBox="1"/>
-          <p:nvPr/>
-        </p:nvSpPr>
-        <p:spPr>
-          <a:xfrm>
-            <a:off x="9220602" y="1000637"/>
-            <a:ext cx="1255470" cy="369323"/>
-          </a:xfrm>
-          <a:prstGeom prst="rect">
-            <a:avLst/>
-          </a:prstGeom>
-          <a:noFill/>
-        </p:spPr>
-        <p:txBody>
-          <a:bodyPr wrap="square" rtlCol="0">
-            <a:spAutoFit/>
-          </a:bodyPr>
-          <a:lstStyle/>
-          <a:p>
-            <a:r>
-              <a:rPr lang="en-US" dirty="0">
-                <a:solidFill>
-                  <a:srgbClr val="FF0000"/>
-                </a:solidFill>
-              </a:rPr>
-              <a:t>track_proj</a:t>
-            </a:r>
-          </a:p>
-        </p:txBody>
-      </p:sp>
       <p:sp>
         <p:nvSpPr>
           <p:cNvPr id="113" name="TextBox 112">
@@ -13610,6 +14075,2738 @@
 </file>
 
 <file path=ppt/slides/slide5.xml><?xml version="1.0" encoding="utf-8"?>
+<p:sld xmlns:a="http://schemas.openxmlformats.org/drawingml/2006/main" xmlns:r="http://schemas.openxmlformats.org/officeDocument/2006/relationships" xmlns:p="http://schemas.openxmlformats.org/presentationml/2006/main">
+  <p:cSld>
+    <p:spTree>
+      <p:nvGrpSpPr>
+        <p:cNvPr id="1" name=""/>
+        <p:cNvGrpSpPr/>
+        <p:nvPr/>
+      </p:nvGrpSpPr>
+      <p:grpSpPr>
+        <a:xfrm>
+          <a:off x="0" y="0"/>
+          <a:ext cx="0" cy="0"/>
+          <a:chOff x="0" y="0"/>
+          <a:chExt cx="0" cy="0"/>
+        </a:xfrm>
+      </p:grpSpPr>
+      <p:grpSp>
+        <p:nvGrpSpPr>
+          <p:cNvPr id="4" name="Group 3">
+            <a:extLst>
+              <a:ext uri="{FF2B5EF4-FFF2-40B4-BE49-F238E27FC236}">
+                <a16:creationId xmlns:a16="http://schemas.microsoft.com/office/drawing/2014/main" id="{B11D1E96-29EB-9F40-9850-8B5C29E86FAD}"/>
+              </a:ext>
+            </a:extLst>
+          </p:cNvPr>
+          <p:cNvGrpSpPr/>
+          <p:nvPr/>
+        </p:nvGrpSpPr>
+        <p:grpSpPr>
+          <a:xfrm>
+            <a:off x="404883" y="282503"/>
+            <a:ext cx="11672428" cy="6446956"/>
+            <a:chOff x="404883" y="282503"/>
+            <a:chExt cx="11672428" cy="6446956"/>
+          </a:xfrm>
+        </p:grpSpPr>
+        <p:sp>
+          <p:nvSpPr>
+            <p:cNvPr id="5" name="Rectangle 4">
+              <a:extLst>
+                <a:ext uri="{FF2B5EF4-FFF2-40B4-BE49-F238E27FC236}">
+                  <a16:creationId xmlns:a16="http://schemas.microsoft.com/office/drawing/2014/main" id="{8A03BC1E-2FFE-224E-8064-4435F24A57C2}"/>
+                </a:ext>
+              </a:extLst>
+            </p:cNvPr>
+            <p:cNvSpPr/>
+            <p:nvPr/>
+          </p:nvSpPr>
+          <p:spPr>
+            <a:xfrm>
+              <a:off x="2767912" y="1396313"/>
+              <a:ext cx="1569309" cy="930877"/>
+            </a:xfrm>
+            <a:prstGeom prst="rect">
+              <a:avLst/>
+            </a:prstGeom>
+          </p:spPr>
+          <p:style>
+            <a:lnRef idx="1">
+              <a:schemeClr val="accent2"/>
+            </a:lnRef>
+            <a:fillRef idx="2">
+              <a:schemeClr val="accent2"/>
+            </a:fillRef>
+            <a:effectRef idx="1">
+              <a:schemeClr val="accent2"/>
+            </a:effectRef>
+            <a:fontRef idx="minor">
+              <a:schemeClr val="dk1"/>
+            </a:fontRef>
+          </p:style>
+          <p:txBody>
+            <a:bodyPr rtlCol="0" anchor="ctr"/>
+            <a:lstStyle/>
+            <a:p>
+              <a:pPr algn="ctr"/>
+              <a:r>
+                <a:rPr lang="en-US" sz="1400" dirty="0">
+                  <a:solidFill>
+                    <a:srgbClr val="FF0000"/>
+                  </a:solidFill>
+                </a:rPr>
+                <a:t>companyProfile.py</a:t>
+              </a:r>
+            </a:p>
+          </p:txBody>
+        </p:sp>
+        <p:sp>
+          <p:nvSpPr>
+            <p:cNvPr id="6" name="Rectangle 5">
+              <a:extLst>
+                <a:ext uri="{FF2B5EF4-FFF2-40B4-BE49-F238E27FC236}">
+                  <a16:creationId xmlns:a16="http://schemas.microsoft.com/office/drawing/2014/main" id="{A9527D3D-C5CD-5D46-AC8C-70F18EFBE0AC}"/>
+                </a:ext>
+              </a:extLst>
+            </p:cNvPr>
+            <p:cNvSpPr/>
+            <p:nvPr/>
+          </p:nvSpPr>
+          <p:spPr>
+            <a:xfrm>
+              <a:off x="4866502" y="1396313"/>
+              <a:ext cx="1569309" cy="930877"/>
+            </a:xfrm>
+            <a:prstGeom prst="rect">
+              <a:avLst/>
+            </a:prstGeom>
+          </p:spPr>
+          <p:style>
+            <a:lnRef idx="1">
+              <a:schemeClr val="accent2"/>
+            </a:lnRef>
+            <a:fillRef idx="2">
+              <a:schemeClr val="accent2"/>
+            </a:fillRef>
+            <a:effectRef idx="1">
+              <a:schemeClr val="accent2"/>
+            </a:effectRef>
+            <a:fontRef idx="minor">
+              <a:schemeClr val="dk1"/>
+            </a:fontRef>
+          </p:style>
+          <p:txBody>
+            <a:bodyPr rtlCol="0" anchor="ctr"/>
+            <a:lstStyle/>
+            <a:p>
+              <a:pPr algn="ctr"/>
+              <a:r>
+                <a:rPr lang="en-US" sz="1400" dirty="0">
+                  <a:solidFill>
+                    <a:srgbClr val="FF0000"/>
+                  </a:solidFill>
+                </a:rPr>
+                <a:t>stockPrice.py</a:t>
+              </a:r>
+            </a:p>
+          </p:txBody>
+        </p:sp>
+        <p:sp>
+          <p:nvSpPr>
+            <p:cNvPr id="7" name="Rectangle 6">
+              <a:extLst>
+                <a:ext uri="{FF2B5EF4-FFF2-40B4-BE49-F238E27FC236}">
+                  <a16:creationId xmlns:a16="http://schemas.microsoft.com/office/drawing/2014/main" id="{4F61C3BC-AB2A-0342-8A07-1E76868CE644}"/>
+                </a:ext>
+              </a:extLst>
+            </p:cNvPr>
+            <p:cNvSpPr/>
+            <p:nvPr/>
+          </p:nvSpPr>
+          <p:spPr>
+            <a:xfrm>
+              <a:off x="6965092" y="1396313"/>
+              <a:ext cx="1569309" cy="930877"/>
+            </a:xfrm>
+            <a:prstGeom prst="rect">
+              <a:avLst/>
+            </a:prstGeom>
+          </p:spPr>
+          <p:style>
+            <a:lnRef idx="1">
+              <a:schemeClr val="accent2"/>
+            </a:lnRef>
+            <a:fillRef idx="2">
+              <a:schemeClr val="accent2"/>
+            </a:fillRef>
+            <a:effectRef idx="1">
+              <a:schemeClr val="accent2"/>
+            </a:effectRef>
+            <a:fontRef idx="minor">
+              <a:schemeClr val="dk1"/>
+            </a:fontRef>
+          </p:style>
+          <p:txBody>
+            <a:bodyPr rtlCol="0" anchor="ctr"/>
+            <a:lstStyle/>
+            <a:p>
+              <a:pPr algn="ctr"/>
+              <a:r>
+                <a:rPr lang="en-US" sz="1400" dirty="0">
+                  <a:solidFill>
+                    <a:srgbClr val="FF0000"/>
+                  </a:solidFill>
+                </a:rPr>
+                <a:t>marketIndex.py</a:t>
+              </a:r>
+            </a:p>
+          </p:txBody>
+        </p:sp>
+        <p:sp>
+          <p:nvSpPr>
+            <p:cNvPr id="8" name="Rectangle 7">
+              <a:extLst>
+                <a:ext uri="{FF2B5EF4-FFF2-40B4-BE49-F238E27FC236}">
+                  <a16:creationId xmlns:a16="http://schemas.microsoft.com/office/drawing/2014/main" id="{48BB85A4-8F27-C84F-92C3-D88DA8EA0650}"/>
+                </a:ext>
+              </a:extLst>
+            </p:cNvPr>
+            <p:cNvSpPr/>
+            <p:nvPr/>
+          </p:nvSpPr>
+          <p:spPr>
+            <a:xfrm>
+              <a:off x="2767912" y="2934724"/>
+              <a:ext cx="1569309" cy="930877"/>
+            </a:xfrm>
+            <a:prstGeom prst="rect">
+              <a:avLst/>
+            </a:prstGeom>
+          </p:spPr>
+          <p:style>
+            <a:lnRef idx="1">
+              <a:schemeClr val="accent6"/>
+            </a:lnRef>
+            <a:fillRef idx="2">
+              <a:schemeClr val="accent6"/>
+            </a:fillRef>
+            <a:effectRef idx="1">
+              <a:schemeClr val="accent6"/>
+            </a:effectRef>
+            <a:fontRef idx="minor">
+              <a:schemeClr val="dk1"/>
+            </a:fontRef>
+          </p:style>
+          <p:txBody>
+            <a:bodyPr rtlCol="0" anchor="ctr"/>
+            <a:lstStyle/>
+            <a:p>
+              <a:pPr algn="ctr"/>
+              <a:endParaRPr lang="en-US" sz="1400" dirty="0">
+                <a:solidFill>
+                  <a:srgbClr val="FF0000"/>
+                </a:solidFill>
+              </a:endParaRPr>
+            </a:p>
+            <a:p>
+              <a:pPr algn="ctr"/>
+              <a:r>
+                <a:rPr lang="en-US" sz="1400" dirty="0">
+                  <a:solidFill>
+                    <a:srgbClr val="FF0000"/>
+                  </a:solidFill>
+                </a:rPr>
+                <a:t>company_profile.jl</a:t>
+              </a:r>
+            </a:p>
+          </p:txBody>
+        </p:sp>
+        <p:sp>
+          <p:nvSpPr>
+            <p:cNvPr id="9" name="Rectangle 8">
+              <a:extLst>
+                <a:ext uri="{FF2B5EF4-FFF2-40B4-BE49-F238E27FC236}">
+                  <a16:creationId xmlns:a16="http://schemas.microsoft.com/office/drawing/2014/main" id="{524BEEA7-4363-0F42-BD24-1CB800B1C8A5}"/>
+                </a:ext>
+              </a:extLst>
+            </p:cNvPr>
+            <p:cNvSpPr/>
+            <p:nvPr/>
+          </p:nvSpPr>
+          <p:spPr>
+            <a:xfrm>
+              <a:off x="4866502" y="2887355"/>
+              <a:ext cx="1569309" cy="930877"/>
+            </a:xfrm>
+            <a:prstGeom prst="rect">
+              <a:avLst/>
+            </a:prstGeom>
+          </p:spPr>
+          <p:style>
+            <a:lnRef idx="1">
+              <a:schemeClr val="accent6"/>
+            </a:lnRef>
+            <a:fillRef idx="2">
+              <a:schemeClr val="accent6"/>
+            </a:fillRef>
+            <a:effectRef idx="1">
+              <a:schemeClr val="accent6"/>
+            </a:effectRef>
+            <a:fontRef idx="minor">
+              <a:schemeClr val="dk1"/>
+            </a:fontRef>
+          </p:style>
+          <p:txBody>
+            <a:bodyPr rtlCol="0" anchor="ctr"/>
+            <a:lstStyle/>
+            <a:p>
+              <a:pPr algn="ctr"/>
+              <a:endParaRPr lang="en-US" sz="1400" dirty="0">
+                <a:solidFill>
+                  <a:srgbClr val="FF0000"/>
+                </a:solidFill>
+              </a:endParaRPr>
+            </a:p>
+            <a:p>
+              <a:pPr algn="ctr"/>
+              <a:r>
+                <a:rPr lang="en-US" sz="1400" dirty="0">
+                  <a:solidFill>
+                    <a:srgbClr val="FF0000"/>
+                  </a:solidFill>
+                </a:rPr>
+                <a:t>stock_prices.jl</a:t>
+              </a:r>
+            </a:p>
+          </p:txBody>
+        </p:sp>
+        <p:sp>
+          <p:nvSpPr>
+            <p:cNvPr id="10" name="Rectangle 9">
+              <a:extLst>
+                <a:ext uri="{FF2B5EF4-FFF2-40B4-BE49-F238E27FC236}">
+                  <a16:creationId xmlns:a16="http://schemas.microsoft.com/office/drawing/2014/main" id="{A51A1DFF-626E-074B-B19E-34DA1903EFCD}"/>
+                </a:ext>
+              </a:extLst>
+            </p:cNvPr>
+            <p:cNvSpPr/>
+            <p:nvPr/>
+          </p:nvSpPr>
+          <p:spPr>
+            <a:xfrm>
+              <a:off x="6965092" y="2870883"/>
+              <a:ext cx="1569309" cy="930877"/>
+            </a:xfrm>
+            <a:prstGeom prst="rect">
+              <a:avLst/>
+            </a:prstGeom>
+          </p:spPr>
+          <p:style>
+            <a:lnRef idx="1">
+              <a:schemeClr val="accent6"/>
+            </a:lnRef>
+            <a:fillRef idx="2">
+              <a:schemeClr val="accent6"/>
+            </a:fillRef>
+            <a:effectRef idx="1">
+              <a:schemeClr val="accent6"/>
+            </a:effectRef>
+            <a:fontRef idx="minor">
+              <a:schemeClr val="dk1"/>
+            </a:fontRef>
+          </p:style>
+          <p:txBody>
+            <a:bodyPr rtlCol="0" anchor="ctr"/>
+            <a:lstStyle/>
+            <a:p>
+              <a:pPr algn="ctr"/>
+              <a:endParaRPr lang="en-US" sz="1400" dirty="0">
+                <a:solidFill>
+                  <a:srgbClr val="FF0000"/>
+                </a:solidFill>
+              </a:endParaRPr>
+            </a:p>
+            <a:p>
+              <a:pPr algn="ctr"/>
+              <a:r>
+                <a:rPr lang="en-US" sz="1400" dirty="0">
+                  <a:solidFill>
+                    <a:srgbClr val="FF0000"/>
+                  </a:solidFill>
+                </a:rPr>
+                <a:t>index.jl</a:t>
+              </a:r>
+            </a:p>
+          </p:txBody>
+        </p:sp>
+        <p:sp>
+          <p:nvSpPr>
+            <p:cNvPr id="11" name="Rectangle 10">
+              <a:extLst>
+                <a:ext uri="{FF2B5EF4-FFF2-40B4-BE49-F238E27FC236}">
+                  <a16:creationId xmlns:a16="http://schemas.microsoft.com/office/drawing/2014/main" id="{CA1E83BD-087B-FD4B-B58B-02E045302B55}"/>
+                </a:ext>
+              </a:extLst>
+            </p:cNvPr>
+            <p:cNvSpPr/>
+            <p:nvPr/>
+          </p:nvSpPr>
+          <p:spPr>
+            <a:xfrm>
+              <a:off x="2767912" y="5648071"/>
+              <a:ext cx="1569307" cy="930877"/>
+            </a:xfrm>
+            <a:prstGeom prst="rect">
+              <a:avLst/>
+            </a:prstGeom>
+          </p:spPr>
+          <p:style>
+            <a:lnRef idx="1">
+              <a:schemeClr val="accent4"/>
+            </a:lnRef>
+            <a:fillRef idx="2">
+              <a:schemeClr val="accent4"/>
+            </a:fillRef>
+            <a:effectRef idx="1">
+              <a:schemeClr val="accent4"/>
+            </a:effectRef>
+            <a:fontRef idx="minor">
+              <a:schemeClr val="dk1"/>
+            </a:fontRef>
+          </p:style>
+          <p:txBody>
+            <a:bodyPr rtlCol="0" anchor="ctr"/>
+            <a:lstStyle/>
+            <a:p>
+              <a:pPr algn="ctr"/>
+              <a:r>
+                <a:rPr lang="en-US" sz="1400" dirty="0">
+                  <a:solidFill>
+                    <a:srgbClr val="FF0000"/>
+                  </a:solidFill>
+                </a:rPr>
+                <a:t>company_profile</a:t>
+              </a:r>
+            </a:p>
+          </p:txBody>
+        </p:sp>
+        <p:sp>
+          <p:nvSpPr>
+            <p:cNvPr id="12" name="Rectangle 11">
+              <a:extLst>
+                <a:ext uri="{FF2B5EF4-FFF2-40B4-BE49-F238E27FC236}">
+                  <a16:creationId xmlns:a16="http://schemas.microsoft.com/office/drawing/2014/main" id="{189E0D80-56E0-864D-BF1F-D834ED6592D3}"/>
+                </a:ext>
+              </a:extLst>
+            </p:cNvPr>
+            <p:cNvSpPr/>
+            <p:nvPr/>
+          </p:nvSpPr>
+          <p:spPr>
+            <a:xfrm>
+              <a:off x="4866502" y="5648071"/>
+              <a:ext cx="1569307" cy="930877"/>
+            </a:xfrm>
+            <a:prstGeom prst="rect">
+              <a:avLst/>
+            </a:prstGeom>
+          </p:spPr>
+          <p:style>
+            <a:lnRef idx="1">
+              <a:schemeClr val="accent4"/>
+            </a:lnRef>
+            <a:fillRef idx="2">
+              <a:schemeClr val="accent4"/>
+            </a:fillRef>
+            <a:effectRef idx="1">
+              <a:schemeClr val="accent4"/>
+            </a:effectRef>
+            <a:fontRef idx="minor">
+              <a:schemeClr val="dk1"/>
+            </a:fontRef>
+          </p:style>
+          <p:txBody>
+            <a:bodyPr rtlCol="0" anchor="ctr"/>
+            <a:lstStyle/>
+            <a:p>
+              <a:pPr algn="ctr"/>
+              <a:r>
+                <a:rPr lang="en-US" sz="1400" dirty="0">
+                  <a:solidFill>
+                    <a:srgbClr val="FF0000"/>
+                  </a:solidFill>
+                </a:rPr>
+                <a:t>stock_price</a:t>
+              </a:r>
+            </a:p>
+          </p:txBody>
+        </p:sp>
+        <p:sp>
+          <p:nvSpPr>
+            <p:cNvPr id="13" name="Rectangle 12">
+              <a:extLst>
+                <a:ext uri="{FF2B5EF4-FFF2-40B4-BE49-F238E27FC236}">
+                  <a16:creationId xmlns:a16="http://schemas.microsoft.com/office/drawing/2014/main" id="{CBF5BD21-C1CA-1E4C-B8CC-7D7269FE6B25}"/>
+                </a:ext>
+              </a:extLst>
+            </p:cNvPr>
+            <p:cNvSpPr/>
+            <p:nvPr/>
+          </p:nvSpPr>
+          <p:spPr>
+            <a:xfrm>
+              <a:off x="6965092" y="5648070"/>
+              <a:ext cx="1569307" cy="930877"/>
+            </a:xfrm>
+            <a:prstGeom prst="rect">
+              <a:avLst/>
+            </a:prstGeom>
+          </p:spPr>
+          <p:style>
+            <a:lnRef idx="1">
+              <a:schemeClr val="accent4"/>
+            </a:lnRef>
+            <a:fillRef idx="2">
+              <a:schemeClr val="accent4"/>
+            </a:fillRef>
+            <a:effectRef idx="1">
+              <a:schemeClr val="accent4"/>
+            </a:effectRef>
+            <a:fontRef idx="minor">
+              <a:schemeClr val="dk1"/>
+            </a:fontRef>
+          </p:style>
+          <p:txBody>
+            <a:bodyPr rtlCol="0" anchor="ctr"/>
+            <a:lstStyle/>
+            <a:p>
+              <a:pPr algn="ctr"/>
+              <a:r>
+                <a:rPr lang="en-US" sz="1400" dirty="0">
+                  <a:solidFill>
+                    <a:srgbClr val="FF0000"/>
+                  </a:solidFill>
+                </a:rPr>
+                <a:t>market_index</a:t>
+              </a:r>
+            </a:p>
+          </p:txBody>
+        </p:sp>
+        <p:sp>
+          <p:nvSpPr>
+            <p:cNvPr id="14" name="Rectangle 13">
+              <a:extLst>
+                <a:ext uri="{FF2B5EF4-FFF2-40B4-BE49-F238E27FC236}">
+                  <a16:creationId xmlns:a16="http://schemas.microsoft.com/office/drawing/2014/main" id="{9920738B-58FA-5543-8CC1-0AC3DB39B4E7}"/>
+                </a:ext>
+              </a:extLst>
+            </p:cNvPr>
+            <p:cNvSpPr/>
+            <p:nvPr/>
+          </p:nvSpPr>
+          <p:spPr>
+            <a:xfrm>
+              <a:off x="2767913" y="288323"/>
+              <a:ext cx="5766488" cy="564297"/>
+            </a:xfrm>
+            <a:prstGeom prst="rect">
+              <a:avLst/>
+            </a:prstGeom>
+          </p:spPr>
+          <p:style>
+            <a:lnRef idx="1">
+              <a:schemeClr val="accent1"/>
+            </a:lnRef>
+            <a:fillRef idx="2">
+              <a:schemeClr val="accent1"/>
+            </a:fillRef>
+            <a:effectRef idx="1">
+              <a:schemeClr val="accent1"/>
+            </a:effectRef>
+            <a:fontRef idx="minor">
+              <a:schemeClr val="dk1"/>
+            </a:fontRef>
+          </p:style>
+          <p:txBody>
+            <a:bodyPr rtlCol="0" anchor="ctr"/>
+            <a:lstStyle/>
+            <a:p>
+              <a:pPr algn="ctr"/>
+              <a:r>
+                <a:rPr lang="en-US" dirty="0">
+                  <a:solidFill>
+                    <a:srgbClr val="FF0000"/>
+                  </a:solidFill>
+                </a:rPr>
+                <a:t>Yahoo Finance</a:t>
+              </a:r>
+            </a:p>
+          </p:txBody>
+        </p:sp>
+        <p:pic>
+          <p:nvPicPr>
+            <p:cNvPr id="15" name="Picture 12">
+              <a:extLst>
+                <a:ext uri="{FF2B5EF4-FFF2-40B4-BE49-F238E27FC236}">
+                  <a16:creationId xmlns:a16="http://schemas.microsoft.com/office/drawing/2014/main" id="{8B0E13C3-5F0B-B843-9024-DFFD6B77B372}"/>
+                </a:ext>
+              </a:extLst>
+            </p:cNvPr>
+            <p:cNvPicPr>
+              <a:picLocks noChangeAspect="1" noChangeArrowheads="1"/>
+            </p:cNvPicPr>
+            <p:nvPr/>
+          </p:nvPicPr>
+          <p:blipFill>
+            <a:blip r:embed="rId2">
+              <a:extLst>
+                <a:ext uri="{28A0092B-C50C-407E-A947-70E740481C1C}">
+                  <a14:useLocalDpi xmlns:a14="http://schemas.microsoft.com/office/drawing/2010/main" val="0"/>
+                </a:ext>
+              </a:extLst>
+            </a:blip>
+            <a:srcRect/>
+            <a:stretch>
+              <a:fillRect/>
+            </a:stretch>
+          </p:blipFill>
+          <p:spPr bwMode="auto">
+            <a:xfrm>
+              <a:off x="8775696" y="5510258"/>
+              <a:ext cx="1828802" cy="1219201"/>
+            </a:xfrm>
+            <a:prstGeom prst="rect">
+              <a:avLst/>
+            </a:prstGeom>
+            <a:noFill/>
+            <a:extLst>
+              <a:ext uri="{909E8E84-426E-40DD-AFC4-6F175D3DCCD1}">
+                <a14:hiddenFill xmlns:a14="http://schemas.microsoft.com/office/drawing/2010/main">
+                  <a:solidFill>
+                    <a:srgbClr val="FFFFFF"/>
+                  </a:solidFill>
+                </a14:hiddenFill>
+              </a:ext>
+            </a:extLst>
+          </p:spPr>
+        </p:pic>
+        <p:cxnSp>
+          <p:nvCxnSpPr>
+            <p:cNvPr id="16" name="Straight Arrow Connector 15">
+              <a:extLst>
+                <a:ext uri="{FF2B5EF4-FFF2-40B4-BE49-F238E27FC236}">
+                  <a16:creationId xmlns:a16="http://schemas.microsoft.com/office/drawing/2014/main" id="{C43107B1-63BA-BF43-8F3B-2E2C8BA66C07}"/>
+                </a:ext>
+              </a:extLst>
+            </p:cNvPr>
+            <p:cNvCxnSpPr>
+              <a:cxnSpLocks/>
+              <a:endCxn id="5" idx="0"/>
+            </p:cNvCxnSpPr>
+            <p:nvPr/>
+          </p:nvCxnSpPr>
+          <p:spPr>
+            <a:xfrm>
+              <a:off x="3552567" y="852620"/>
+              <a:ext cx="0" cy="543693"/>
+            </a:xfrm>
+            <a:prstGeom prst="straightConnector1">
+              <a:avLst/>
+            </a:prstGeom>
+            <a:ln w="31750">
+              <a:solidFill>
+                <a:srgbClr val="C00000"/>
+              </a:solidFill>
+              <a:tailEnd type="triangle"/>
+            </a:ln>
+          </p:spPr>
+          <p:style>
+            <a:lnRef idx="1">
+              <a:schemeClr val="accent1"/>
+            </a:lnRef>
+            <a:fillRef idx="0">
+              <a:schemeClr val="accent1"/>
+            </a:fillRef>
+            <a:effectRef idx="0">
+              <a:schemeClr val="accent1"/>
+            </a:effectRef>
+            <a:fontRef idx="minor">
+              <a:schemeClr val="tx1"/>
+            </a:fontRef>
+          </p:style>
+        </p:cxnSp>
+        <p:cxnSp>
+          <p:nvCxnSpPr>
+            <p:cNvPr id="17" name="Straight Arrow Connector 16">
+              <a:extLst>
+                <a:ext uri="{FF2B5EF4-FFF2-40B4-BE49-F238E27FC236}">
+                  <a16:creationId xmlns:a16="http://schemas.microsoft.com/office/drawing/2014/main" id="{E64AC287-954F-E34D-A419-D7FF979B7C05}"/>
+                </a:ext>
+              </a:extLst>
+            </p:cNvPr>
+            <p:cNvCxnSpPr>
+              <a:cxnSpLocks/>
+              <a:stCxn id="14" idx="2"/>
+              <a:endCxn id="6" idx="0"/>
+            </p:cNvCxnSpPr>
+            <p:nvPr/>
+          </p:nvCxnSpPr>
+          <p:spPr>
+            <a:xfrm>
+              <a:off x="5651157" y="852620"/>
+              <a:ext cx="0" cy="543693"/>
+            </a:xfrm>
+            <a:prstGeom prst="straightConnector1">
+              <a:avLst/>
+            </a:prstGeom>
+            <a:ln w="31750">
+              <a:solidFill>
+                <a:srgbClr val="C00000"/>
+              </a:solidFill>
+              <a:tailEnd type="triangle"/>
+            </a:ln>
+          </p:spPr>
+          <p:style>
+            <a:lnRef idx="1">
+              <a:schemeClr val="accent1"/>
+            </a:lnRef>
+            <a:fillRef idx="0">
+              <a:schemeClr val="accent1"/>
+            </a:fillRef>
+            <a:effectRef idx="0">
+              <a:schemeClr val="accent1"/>
+            </a:effectRef>
+            <a:fontRef idx="minor">
+              <a:schemeClr val="tx1"/>
+            </a:fontRef>
+          </p:style>
+        </p:cxnSp>
+        <p:cxnSp>
+          <p:nvCxnSpPr>
+            <p:cNvPr id="18" name="Straight Arrow Connector 17">
+              <a:extLst>
+                <a:ext uri="{FF2B5EF4-FFF2-40B4-BE49-F238E27FC236}">
+                  <a16:creationId xmlns:a16="http://schemas.microsoft.com/office/drawing/2014/main" id="{3A59DB52-1CA5-EA45-BD02-FAAF05235214}"/>
+                </a:ext>
+              </a:extLst>
+            </p:cNvPr>
+            <p:cNvCxnSpPr>
+              <a:cxnSpLocks/>
+              <a:endCxn id="7" idx="0"/>
+            </p:cNvCxnSpPr>
+            <p:nvPr/>
+          </p:nvCxnSpPr>
+          <p:spPr>
+            <a:xfrm>
+              <a:off x="7749747" y="852620"/>
+              <a:ext cx="0" cy="543693"/>
+            </a:xfrm>
+            <a:prstGeom prst="straightConnector1">
+              <a:avLst/>
+            </a:prstGeom>
+            <a:ln w="31750">
+              <a:solidFill>
+                <a:srgbClr val="C00000"/>
+              </a:solidFill>
+              <a:tailEnd type="triangle"/>
+            </a:ln>
+          </p:spPr>
+          <p:style>
+            <a:lnRef idx="1">
+              <a:schemeClr val="accent1"/>
+            </a:lnRef>
+            <a:fillRef idx="0">
+              <a:schemeClr val="accent1"/>
+            </a:fillRef>
+            <a:effectRef idx="0">
+              <a:schemeClr val="accent1"/>
+            </a:effectRef>
+            <a:fontRef idx="minor">
+              <a:schemeClr val="tx1"/>
+            </a:fontRef>
+          </p:style>
+        </p:cxnSp>
+        <p:cxnSp>
+          <p:nvCxnSpPr>
+            <p:cNvPr id="19" name="Straight Arrow Connector 18">
+              <a:extLst>
+                <a:ext uri="{FF2B5EF4-FFF2-40B4-BE49-F238E27FC236}">
+                  <a16:creationId xmlns:a16="http://schemas.microsoft.com/office/drawing/2014/main" id="{BCB8D22B-3B30-8B46-B1F4-24A020FBE974}"/>
+                </a:ext>
+              </a:extLst>
+            </p:cNvPr>
+            <p:cNvCxnSpPr>
+              <a:cxnSpLocks/>
+              <a:endCxn id="8" idx="0"/>
+            </p:cNvCxnSpPr>
+            <p:nvPr/>
+          </p:nvCxnSpPr>
+          <p:spPr>
+            <a:xfrm>
+              <a:off x="3552567" y="2327190"/>
+              <a:ext cx="0" cy="607534"/>
+            </a:xfrm>
+            <a:prstGeom prst="straightConnector1">
+              <a:avLst/>
+            </a:prstGeom>
+            <a:ln w="31750">
+              <a:solidFill>
+                <a:srgbClr val="C00000"/>
+              </a:solidFill>
+              <a:tailEnd type="triangle"/>
+            </a:ln>
+          </p:spPr>
+          <p:style>
+            <a:lnRef idx="1">
+              <a:schemeClr val="accent1"/>
+            </a:lnRef>
+            <a:fillRef idx="0">
+              <a:schemeClr val="accent1"/>
+            </a:fillRef>
+            <a:effectRef idx="0">
+              <a:schemeClr val="accent1"/>
+            </a:effectRef>
+            <a:fontRef idx="minor">
+              <a:schemeClr val="tx1"/>
+            </a:fontRef>
+          </p:style>
+        </p:cxnSp>
+        <p:cxnSp>
+          <p:nvCxnSpPr>
+            <p:cNvPr id="20" name="Straight Arrow Connector 19">
+              <a:extLst>
+                <a:ext uri="{FF2B5EF4-FFF2-40B4-BE49-F238E27FC236}">
+                  <a16:creationId xmlns:a16="http://schemas.microsoft.com/office/drawing/2014/main" id="{3FF5BDB9-7EDB-0349-ABDD-AD0419F894F5}"/>
+                </a:ext>
+              </a:extLst>
+            </p:cNvPr>
+            <p:cNvCxnSpPr>
+              <a:cxnSpLocks/>
+            </p:cNvCxnSpPr>
+            <p:nvPr/>
+          </p:nvCxnSpPr>
+          <p:spPr>
+            <a:xfrm>
+              <a:off x="5651157" y="2327190"/>
+              <a:ext cx="0" cy="543693"/>
+            </a:xfrm>
+            <a:prstGeom prst="straightConnector1">
+              <a:avLst/>
+            </a:prstGeom>
+            <a:ln w="31750">
+              <a:solidFill>
+                <a:srgbClr val="C00000"/>
+              </a:solidFill>
+              <a:tailEnd type="triangle"/>
+            </a:ln>
+          </p:spPr>
+          <p:style>
+            <a:lnRef idx="1">
+              <a:schemeClr val="accent1"/>
+            </a:lnRef>
+            <a:fillRef idx="0">
+              <a:schemeClr val="accent1"/>
+            </a:fillRef>
+            <a:effectRef idx="0">
+              <a:schemeClr val="accent1"/>
+            </a:effectRef>
+            <a:fontRef idx="minor">
+              <a:schemeClr val="tx1"/>
+            </a:fontRef>
+          </p:style>
+        </p:cxnSp>
+        <p:cxnSp>
+          <p:nvCxnSpPr>
+            <p:cNvPr id="21" name="Straight Arrow Connector 20">
+              <a:extLst>
+                <a:ext uri="{FF2B5EF4-FFF2-40B4-BE49-F238E27FC236}">
+                  <a16:creationId xmlns:a16="http://schemas.microsoft.com/office/drawing/2014/main" id="{698A9819-EF2B-E44D-A073-74DD0226D468}"/>
+                </a:ext>
+              </a:extLst>
+            </p:cNvPr>
+            <p:cNvCxnSpPr>
+              <a:cxnSpLocks/>
+            </p:cNvCxnSpPr>
+            <p:nvPr/>
+          </p:nvCxnSpPr>
+          <p:spPr>
+            <a:xfrm>
+              <a:off x="7749747" y="2327190"/>
+              <a:ext cx="0" cy="543693"/>
+            </a:xfrm>
+            <a:prstGeom prst="straightConnector1">
+              <a:avLst/>
+            </a:prstGeom>
+            <a:ln w="31750">
+              <a:solidFill>
+                <a:srgbClr val="C00000"/>
+              </a:solidFill>
+              <a:tailEnd type="triangle"/>
+            </a:ln>
+          </p:spPr>
+          <p:style>
+            <a:lnRef idx="1">
+              <a:schemeClr val="accent1"/>
+            </a:lnRef>
+            <a:fillRef idx="0">
+              <a:schemeClr val="accent1"/>
+            </a:fillRef>
+            <a:effectRef idx="0">
+              <a:schemeClr val="accent1"/>
+            </a:effectRef>
+            <a:fontRef idx="minor">
+              <a:schemeClr val="tx1"/>
+            </a:fontRef>
+          </p:style>
+        </p:cxnSp>
+        <p:cxnSp>
+          <p:nvCxnSpPr>
+            <p:cNvPr id="22" name="Straight Arrow Connector 21">
+              <a:extLst>
+                <a:ext uri="{FF2B5EF4-FFF2-40B4-BE49-F238E27FC236}">
+                  <a16:creationId xmlns:a16="http://schemas.microsoft.com/office/drawing/2014/main" id="{2453E96B-8EA9-DD4F-B21A-8C52835E4729}"/>
+                </a:ext>
+              </a:extLst>
+            </p:cNvPr>
+            <p:cNvCxnSpPr>
+              <a:cxnSpLocks/>
+            </p:cNvCxnSpPr>
+            <p:nvPr/>
+          </p:nvCxnSpPr>
+          <p:spPr>
+            <a:xfrm>
+              <a:off x="3552567" y="3865601"/>
+              <a:ext cx="0" cy="325399"/>
+            </a:xfrm>
+            <a:prstGeom prst="straightConnector1">
+              <a:avLst/>
+            </a:prstGeom>
+            <a:ln w="31750">
+              <a:solidFill>
+                <a:srgbClr val="C00000"/>
+              </a:solidFill>
+              <a:tailEnd type="triangle"/>
+            </a:ln>
+          </p:spPr>
+          <p:style>
+            <a:lnRef idx="1">
+              <a:schemeClr val="accent1"/>
+            </a:lnRef>
+            <a:fillRef idx="0">
+              <a:schemeClr val="accent1"/>
+            </a:fillRef>
+            <a:effectRef idx="0">
+              <a:schemeClr val="accent1"/>
+            </a:effectRef>
+            <a:fontRef idx="minor">
+              <a:schemeClr val="tx1"/>
+            </a:fontRef>
+          </p:style>
+        </p:cxnSp>
+        <p:cxnSp>
+          <p:nvCxnSpPr>
+            <p:cNvPr id="23" name="Straight Arrow Connector 22">
+              <a:extLst>
+                <a:ext uri="{FF2B5EF4-FFF2-40B4-BE49-F238E27FC236}">
+                  <a16:creationId xmlns:a16="http://schemas.microsoft.com/office/drawing/2014/main" id="{F32B68FF-F276-2C4F-AC70-2FB2121C4C62}"/>
+                </a:ext>
+              </a:extLst>
+            </p:cNvPr>
+            <p:cNvCxnSpPr>
+              <a:cxnSpLocks/>
+            </p:cNvCxnSpPr>
+            <p:nvPr/>
+          </p:nvCxnSpPr>
+          <p:spPr>
+            <a:xfrm>
+              <a:off x="5651157" y="3840201"/>
+              <a:ext cx="0" cy="350799"/>
+            </a:xfrm>
+            <a:prstGeom prst="straightConnector1">
+              <a:avLst/>
+            </a:prstGeom>
+            <a:ln w="31750">
+              <a:solidFill>
+                <a:srgbClr val="C00000"/>
+              </a:solidFill>
+              <a:tailEnd type="triangle"/>
+            </a:ln>
+          </p:spPr>
+          <p:style>
+            <a:lnRef idx="1">
+              <a:schemeClr val="accent1"/>
+            </a:lnRef>
+            <a:fillRef idx="0">
+              <a:schemeClr val="accent1"/>
+            </a:fillRef>
+            <a:effectRef idx="0">
+              <a:schemeClr val="accent1"/>
+            </a:effectRef>
+            <a:fontRef idx="minor">
+              <a:schemeClr val="tx1"/>
+            </a:fontRef>
+          </p:style>
+        </p:cxnSp>
+        <p:cxnSp>
+          <p:nvCxnSpPr>
+            <p:cNvPr id="24" name="Straight Arrow Connector 23">
+              <a:extLst>
+                <a:ext uri="{FF2B5EF4-FFF2-40B4-BE49-F238E27FC236}">
+                  <a16:creationId xmlns:a16="http://schemas.microsoft.com/office/drawing/2014/main" id="{A2B911F9-FFB9-F24B-9668-2483F60DA77C}"/>
+                </a:ext>
+              </a:extLst>
+            </p:cNvPr>
+            <p:cNvCxnSpPr>
+              <a:cxnSpLocks/>
+            </p:cNvCxnSpPr>
+            <p:nvPr/>
+          </p:nvCxnSpPr>
+          <p:spPr>
+            <a:xfrm>
+              <a:off x="7749747" y="3802101"/>
+              <a:ext cx="0" cy="388899"/>
+            </a:xfrm>
+            <a:prstGeom prst="straightConnector1">
+              <a:avLst/>
+            </a:prstGeom>
+            <a:ln w="31750">
+              <a:solidFill>
+                <a:srgbClr val="C00000"/>
+              </a:solidFill>
+              <a:tailEnd type="triangle"/>
+            </a:ln>
+          </p:spPr>
+          <p:style>
+            <a:lnRef idx="1">
+              <a:schemeClr val="accent1"/>
+            </a:lnRef>
+            <a:fillRef idx="0">
+              <a:schemeClr val="accent1"/>
+            </a:fillRef>
+            <a:effectRef idx="0">
+              <a:schemeClr val="accent1"/>
+            </a:effectRef>
+            <a:fontRef idx="minor">
+              <a:schemeClr val="tx1"/>
+            </a:fontRef>
+          </p:style>
+        </p:cxnSp>
+        <p:cxnSp>
+          <p:nvCxnSpPr>
+            <p:cNvPr id="25" name="Straight Connector 24">
+              <a:extLst>
+                <a:ext uri="{FF2B5EF4-FFF2-40B4-BE49-F238E27FC236}">
+                  <a16:creationId xmlns:a16="http://schemas.microsoft.com/office/drawing/2014/main" id="{E7A6B3D4-4318-1147-9938-3CB0B32E5FCA}"/>
+                </a:ext>
+              </a:extLst>
+            </p:cNvPr>
+            <p:cNvCxnSpPr/>
+            <p:nvPr/>
+          </p:nvCxnSpPr>
+          <p:spPr>
+            <a:xfrm>
+              <a:off x="3552567" y="4191000"/>
+              <a:ext cx="4197180" cy="0"/>
+            </a:xfrm>
+            <a:prstGeom prst="line">
+              <a:avLst/>
+            </a:prstGeom>
+            <a:ln w="31750">
+              <a:solidFill>
+                <a:srgbClr val="C00000"/>
+              </a:solidFill>
+            </a:ln>
+          </p:spPr>
+          <p:style>
+            <a:lnRef idx="1">
+              <a:schemeClr val="accent1"/>
+            </a:lnRef>
+            <a:fillRef idx="0">
+              <a:schemeClr val="accent1"/>
+            </a:fillRef>
+            <a:effectRef idx="0">
+              <a:schemeClr val="accent1"/>
+            </a:effectRef>
+            <a:fontRef idx="minor">
+              <a:schemeClr val="tx1"/>
+            </a:fontRef>
+          </p:style>
+        </p:cxnSp>
+        <p:pic>
+          <p:nvPicPr>
+            <p:cNvPr id="26" name="Picture 14">
+              <a:extLst>
+                <a:ext uri="{FF2B5EF4-FFF2-40B4-BE49-F238E27FC236}">
+                  <a16:creationId xmlns:a16="http://schemas.microsoft.com/office/drawing/2014/main" id="{04C4D5E7-C7C6-3146-90AE-1199EC55A5B9}"/>
+                </a:ext>
+              </a:extLst>
+            </p:cNvPr>
+            <p:cNvPicPr>
+              <a:picLocks noChangeAspect="1" noChangeArrowheads="1"/>
+            </p:cNvPicPr>
+            <p:nvPr/>
+          </p:nvPicPr>
+          <p:blipFill>
+            <a:blip r:embed="rId3">
+              <a:extLst>
+                <a:ext uri="{28A0092B-C50C-407E-A947-70E740481C1C}">
+                  <a14:useLocalDpi xmlns:a14="http://schemas.microsoft.com/office/drawing/2010/main" val="0"/>
+                </a:ext>
+              </a:extLst>
+            </a:blip>
+            <a:srcRect/>
+            <a:stretch>
+              <a:fillRect/>
+            </a:stretch>
+          </p:blipFill>
+          <p:spPr bwMode="auto">
+            <a:xfrm flipH="1">
+              <a:off x="2468255" y="1120688"/>
+              <a:ext cx="609594" cy="609594"/>
+            </a:xfrm>
+            <a:prstGeom prst="rect">
+              <a:avLst/>
+            </a:prstGeom>
+            <a:noFill/>
+            <a:extLst>
+              <a:ext uri="{909E8E84-426E-40DD-AFC4-6F175D3DCCD1}">
+                <a14:hiddenFill xmlns:a14="http://schemas.microsoft.com/office/drawing/2010/main">
+                  <a:solidFill>
+                    <a:srgbClr val="FFFFFF"/>
+                  </a:solidFill>
+                </a14:hiddenFill>
+              </a:ext>
+            </a:extLst>
+          </p:spPr>
+        </p:pic>
+        <p:pic>
+          <p:nvPicPr>
+            <p:cNvPr id="27" name="Picture 14">
+              <a:extLst>
+                <a:ext uri="{FF2B5EF4-FFF2-40B4-BE49-F238E27FC236}">
+                  <a16:creationId xmlns:a16="http://schemas.microsoft.com/office/drawing/2014/main" id="{A03B6C4E-D137-9449-9404-9AC23FC2DF2C}"/>
+                </a:ext>
+              </a:extLst>
+            </p:cNvPr>
+            <p:cNvPicPr>
+              <a:picLocks noChangeAspect="1" noChangeArrowheads="1"/>
+            </p:cNvPicPr>
+            <p:nvPr/>
+          </p:nvPicPr>
+          <p:blipFill>
+            <a:blip r:embed="rId3">
+              <a:extLst>
+                <a:ext uri="{28A0092B-C50C-407E-A947-70E740481C1C}">
+                  <a14:useLocalDpi xmlns:a14="http://schemas.microsoft.com/office/drawing/2010/main" val="0"/>
+                </a:ext>
+              </a:extLst>
+            </a:blip>
+            <a:srcRect/>
+            <a:stretch>
+              <a:fillRect/>
+            </a:stretch>
+          </p:blipFill>
+          <p:spPr bwMode="auto">
+            <a:xfrm flipH="1">
+              <a:off x="4561705" y="1123773"/>
+              <a:ext cx="609594" cy="609594"/>
+            </a:xfrm>
+            <a:prstGeom prst="rect">
+              <a:avLst/>
+            </a:prstGeom>
+            <a:noFill/>
+            <a:extLst>
+              <a:ext uri="{909E8E84-426E-40DD-AFC4-6F175D3DCCD1}">
+                <a14:hiddenFill xmlns:a14="http://schemas.microsoft.com/office/drawing/2010/main">
+                  <a:solidFill>
+                    <a:srgbClr val="FFFFFF"/>
+                  </a:solidFill>
+                </a14:hiddenFill>
+              </a:ext>
+            </a:extLst>
+          </p:spPr>
+        </p:pic>
+        <p:pic>
+          <p:nvPicPr>
+            <p:cNvPr id="28" name="Picture 14">
+              <a:extLst>
+                <a:ext uri="{FF2B5EF4-FFF2-40B4-BE49-F238E27FC236}">
+                  <a16:creationId xmlns:a16="http://schemas.microsoft.com/office/drawing/2014/main" id="{458855FA-47D6-EF43-A9EE-7172361AFF18}"/>
+                </a:ext>
+              </a:extLst>
+            </p:cNvPr>
+            <p:cNvPicPr>
+              <a:picLocks noChangeAspect="1" noChangeArrowheads="1"/>
+            </p:cNvPicPr>
+            <p:nvPr/>
+          </p:nvPicPr>
+          <p:blipFill>
+            <a:blip r:embed="rId3">
+              <a:extLst>
+                <a:ext uri="{28A0092B-C50C-407E-A947-70E740481C1C}">
+                  <a14:useLocalDpi xmlns:a14="http://schemas.microsoft.com/office/drawing/2010/main" val="0"/>
+                </a:ext>
+              </a:extLst>
+            </a:blip>
+            <a:srcRect/>
+            <a:stretch>
+              <a:fillRect/>
+            </a:stretch>
+          </p:blipFill>
+          <p:spPr bwMode="auto">
+            <a:xfrm flipH="1">
+              <a:off x="6660295" y="1124458"/>
+              <a:ext cx="609594" cy="609594"/>
+            </a:xfrm>
+            <a:prstGeom prst="rect">
+              <a:avLst/>
+            </a:prstGeom>
+            <a:noFill/>
+            <a:extLst>
+              <a:ext uri="{909E8E84-426E-40DD-AFC4-6F175D3DCCD1}">
+                <a14:hiddenFill xmlns:a14="http://schemas.microsoft.com/office/drawing/2010/main">
+                  <a:solidFill>
+                    <a:srgbClr val="FFFFFF"/>
+                  </a:solidFill>
+                </a14:hiddenFill>
+              </a:ext>
+            </a:extLst>
+          </p:spPr>
+        </p:pic>
+        <p:pic>
+          <p:nvPicPr>
+            <p:cNvPr id="29" name="Picture 28">
+              <a:extLst>
+                <a:ext uri="{FF2B5EF4-FFF2-40B4-BE49-F238E27FC236}">
+                  <a16:creationId xmlns:a16="http://schemas.microsoft.com/office/drawing/2014/main" id="{A01522F0-57F8-FC4F-B4DA-096599B4DCA9}"/>
+                </a:ext>
+              </a:extLst>
+            </p:cNvPr>
+            <p:cNvPicPr>
+              <a:picLocks noChangeAspect="1"/>
+            </p:cNvPicPr>
+            <p:nvPr/>
+          </p:nvPicPr>
+          <p:blipFill>
+            <a:blip r:embed="rId4"/>
+            <a:stretch>
+              <a:fillRect/>
+            </a:stretch>
+          </p:blipFill>
+          <p:spPr>
+            <a:xfrm>
+              <a:off x="2767912" y="2934724"/>
+              <a:ext cx="429643" cy="431802"/>
+            </a:xfrm>
+            <a:prstGeom prst="rect">
+              <a:avLst/>
+            </a:prstGeom>
+          </p:spPr>
+        </p:pic>
+        <p:pic>
+          <p:nvPicPr>
+            <p:cNvPr id="30" name="Picture 29">
+              <a:extLst>
+                <a:ext uri="{FF2B5EF4-FFF2-40B4-BE49-F238E27FC236}">
+                  <a16:creationId xmlns:a16="http://schemas.microsoft.com/office/drawing/2014/main" id="{A323BB18-E643-0C40-8EEF-A0F6027F36CD}"/>
+                </a:ext>
+              </a:extLst>
+            </p:cNvPr>
+            <p:cNvPicPr>
+              <a:picLocks noChangeAspect="1"/>
+            </p:cNvPicPr>
+            <p:nvPr/>
+          </p:nvPicPr>
+          <p:blipFill>
+            <a:blip r:embed="rId4"/>
+            <a:stretch>
+              <a:fillRect/>
+            </a:stretch>
+          </p:blipFill>
+          <p:spPr>
+            <a:xfrm>
+              <a:off x="4866502" y="2887355"/>
+              <a:ext cx="429643" cy="431802"/>
+            </a:xfrm>
+            <a:prstGeom prst="rect">
+              <a:avLst/>
+            </a:prstGeom>
+          </p:spPr>
+        </p:pic>
+        <p:pic>
+          <p:nvPicPr>
+            <p:cNvPr id="31" name="Picture 30">
+              <a:extLst>
+                <a:ext uri="{FF2B5EF4-FFF2-40B4-BE49-F238E27FC236}">
+                  <a16:creationId xmlns:a16="http://schemas.microsoft.com/office/drawing/2014/main" id="{1FA10B1E-1EE3-574E-A159-DC13AC1ED4EF}"/>
+                </a:ext>
+              </a:extLst>
+            </p:cNvPr>
+            <p:cNvPicPr>
+              <a:picLocks noChangeAspect="1"/>
+            </p:cNvPicPr>
+            <p:nvPr/>
+          </p:nvPicPr>
+          <p:blipFill>
+            <a:blip r:embed="rId4"/>
+            <a:stretch>
+              <a:fillRect/>
+            </a:stretch>
+          </p:blipFill>
+          <p:spPr>
+            <a:xfrm>
+              <a:off x="6965092" y="2871925"/>
+              <a:ext cx="429643" cy="431802"/>
+            </a:xfrm>
+            <a:prstGeom prst="rect">
+              <a:avLst/>
+            </a:prstGeom>
+          </p:spPr>
+        </p:pic>
+        <p:sp>
+          <p:nvSpPr>
+            <p:cNvPr id="32" name="Rectangle 31">
+              <a:extLst>
+                <a:ext uri="{FF2B5EF4-FFF2-40B4-BE49-F238E27FC236}">
+                  <a16:creationId xmlns:a16="http://schemas.microsoft.com/office/drawing/2014/main" id="{67D6D84C-4437-3545-8F51-9685C538C91F}"/>
+                </a:ext>
+              </a:extLst>
+            </p:cNvPr>
+            <p:cNvSpPr/>
+            <p:nvPr/>
+          </p:nvSpPr>
+          <p:spPr>
+            <a:xfrm>
+              <a:off x="4866502" y="4430607"/>
+              <a:ext cx="1569307" cy="609594"/>
+            </a:xfrm>
+            <a:prstGeom prst="rect">
+              <a:avLst/>
+            </a:prstGeom>
+          </p:spPr>
+          <p:style>
+            <a:lnRef idx="1">
+              <a:schemeClr val="accent3"/>
+            </a:lnRef>
+            <a:fillRef idx="2">
+              <a:schemeClr val="accent3"/>
+            </a:fillRef>
+            <a:effectRef idx="1">
+              <a:schemeClr val="accent3"/>
+            </a:effectRef>
+            <a:fontRef idx="minor">
+              <a:schemeClr val="dk1"/>
+            </a:fontRef>
+          </p:style>
+          <p:txBody>
+            <a:bodyPr rtlCol="0" anchor="ctr"/>
+            <a:lstStyle/>
+            <a:p>
+              <a:pPr algn="ctr"/>
+              <a:r>
+                <a:rPr lang="en-US" sz="1400" dirty="0">
+                  <a:solidFill>
+                    <a:srgbClr val="FF0000"/>
+                  </a:solidFill>
+                </a:rPr>
+                <a:t>pg_data_insert.py</a:t>
+              </a:r>
+            </a:p>
+          </p:txBody>
+        </p:sp>
+        <p:pic>
+          <p:nvPicPr>
+            <p:cNvPr id="33" name="Picture 14">
+              <a:extLst>
+                <a:ext uri="{FF2B5EF4-FFF2-40B4-BE49-F238E27FC236}">
+                  <a16:creationId xmlns:a16="http://schemas.microsoft.com/office/drawing/2014/main" id="{6A8E5AF9-7582-3949-AA06-82CE52F952F6}"/>
+                </a:ext>
+              </a:extLst>
+            </p:cNvPr>
+            <p:cNvPicPr>
+              <a:picLocks noChangeAspect="1" noChangeArrowheads="1"/>
+            </p:cNvPicPr>
+            <p:nvPr/>
+          </p:nvPicPr>
+          <p:blipFill>
+            <a:blip r:embed="rId3">
+              <a:extLst>
+                <a:ext uri="{28A0092B-C50C-407E-A947-70E740481C1C}">
+                  <a14:useLocalDpi xmlns:a14="http://schemas.microsoft.com/office/drawing/2010/main" val="0"/>
+                </a:ext>
+              </a:extLst>
+            </a:blip>
+            <a:srcRect/>
+            <a:stretch>
+              <a:fillRect/>
+            </a:stretch>
+          </p:blipFill>
+          <p:spPr bwMode="auto">
+            <a:xfrm flipH="1">
+              <a:off x="4337219" y="4462153"/>
+              <a:ext cx="609594" cy="609594"/>
+            </a:xfrm>
+            <a:prstGeom prst="rect">
+              <a:avLst/>
+            </a:prstGeom>
+            <a:noFill/>
+            <a:extLst>
+              <a:ext uri="{909E8E84-426E-40DD-AFC4-6F175D3DCCD1}">
+                <a14:hiddenFill xmlns:a14="http://schemas.microsoft.com/office/drawing/2010/main">
+                  <a:solidFill>
+                    <a:srgbClr val="FFFFFF"/>
+                  </a:solidFill>
+                </a14:hiddenFill>
+              </a:ext>
+            </a:extLst>
+          </p:spPr>
+        </p:pic>
+        <p:cxnSp>
+          <p:nvCxnSpPr>
+            <p:cNvPr id="34" name="Straight Arrow Connector 33">
+              <a:extLst>
+                <a:ext uri="{FF2B5EF4-FFF2-40B4-BE49-F238E27FC236}">
+                  <a16:creationId xmlns:a16="http://schemas.microsoft.com/office/drawing/2014/main" id="{2CB94DB9-CB2B-824B-BE7E-216F350084DF}"/>
+                </a:ext>
+              </a:extLst>
+            </p:cNvPr>
+            <p:cNvCxnSpPr>
+              <a:endCxn id="32" idx="0"/>
+            </p:cNvCxnSpPr>
+            <p:nvPr/>
+          </p:nvCxnSpPr>
+          <p:spPr>
+            <a:xfrm flipH="1">
+              <a:off x="5651156" y="4191000"/>
+              <a:ext cx="1" cy="239607"/>
+            </a:xfrm>
+            <a:prstGeom prst="straightConnector1">
+              <a:avLst/>
+            </a:prstGeom>
+            <a:ln w="31750">
+              <a:solidFill>
+                <a:srgbClr val="C00000"/>
+              </a:solidFill>
+              <a:tailEnd type="triangle"/>
+            </a:ln>
+          </p:spPr>
+          <p:style>
+            <a:lnRef idx="1">
+              <a:schemeClr val="accent1"/>
+            </a:lnRef>
+            <a:fillRef idx="0">
+              <a:schemeClr val="accent1"/>
+            </a:fillRef>
+            <a:effectRef idx="0">
+              <a:schemeClr val="accent1"/>
+            </a:effectRef>
+            <a:fontRef idx="minor">
+              <a:schemeClr val="tx1"/>
+            </a:fontRef>
+          </p:style>
+        </p:cxnSp>
+        <p:sp>
+          <p:nvSpPr>
+            <p:cNvPr id="35" name="Rectangle 34">
+              <a:extLst>
+                <a:ext uri="{FF2B5EF4-FFF2-40B4-BE49-F238E27FC236}">
+                  <a16:creationId xmlns:a16="http://schemas.microsoft.com/office/drawing/2014/main" id="{130801B5-070F-024C-BD6A-28B37786BE1E}"/>
+                </a:ext>
+              </a:extLst>
+            </p:cNvPr>
+            <p:cNvSpPr/>
+            <p:nvPr/>
+          </p:nvSpPr>
+          <p:spPr>
+            <a:xfrm>
+              <a:off x="2430241" y="4431644"/>
+              <a:ext cx="1569307" cy="598592"/>
+            </a:xfrm>
+            <a:prstGeom prst="rect">
+              <a:avLst/>
+            </a:prstGeom>
+          </p:spPr>
+          <p:style>
+            <a:lnRef idx="1">
+              <a:schemeClr val="accent3"/>
+            </a:lnRef>
+            <a:fillRef idx="2">
+              <a:schemeClr val="accent3"/>
+            </a:fillRef>
+            <a:effectRef idx="1">
+              <a:schemeClr val="accent3"/>
+            </a:effectRef>
+            <a:fontRef idx="minor">
+              <a:schemeClr val="dk1"/>
+            </a:fontRef>
+          </p:style>
+          <p:txBody>
+            <a:bodyPr rtlCol="0" anchor="ctr"/>
+            <a:lstStyle/>
+            <a:p>
+              <a:pPr algn="ctr"/>
+              <a:r>
+                <a:rPr lang="en-US" sz="1400" dirty="0">
+                  <a:solidFill>
+                    <a:srgbClr val="FF0000"/>
+                  </a:solidFill>
+                </a:rPr>
+                <a:t>pg_create_db.py</a:t>
+              </a:r>
+            </a:p>
+          </p:txBody>
+        </p:sp>
+        <p:cxnSp>
+          <p:nvCxnSpPr>
+            <p:cNvPr id="36" name="Straight Arrow Connector 35">
+              <a:extLst>
+                <a:ext uri="{FF2B5EF4-FFF2-40B4-BE49-F238E27FC236}">
+                  <a16:creationId xmlns:a16="http://schemas.microsoft.com/office/drawing/2014/main" id="{CFA2D530-8E1F-E04A-B14B-DE5836997197}"/>
+                </a:ext>
+              </a:extLst>
+            </p:cNvPr>
+            <p:cNvCxnSpPr>
+              <a:cxnSpLocks/>
+            </p:cNvCxnSpPr>
+            <p:nvPr/>
+          </p:nvCxnSpPr>
+          <p:spPr>
+            <a:xfrm>
+              <a:off x="3552565" y="5313400"/>
+              <a:ext cx="0" cy="325399"/>
+            </a:xfrm>
+            <a:prstGeom prst="straightConnector1">
+              <a:avLst/>
+            </a:prstGeom>
+            <a:ln w="31750">
+              <a:solidFill>
+                <a:srgbClr val="C00000"/>
+              </a:solidFill>
+              <a:tailEnd type="triangle"/>
+            </a:ln>
+          </p:spPr>
+          <p:style>
+            <a:lnRef idx="1">
+              <a:schemeClr val="accent1"/>
+            </a:lnRef>
+            <a:fillRef idx="0">
+              <a:schemeClr val="accent1"/>
+            </a:fillRef>
+            <a:effectRef idx="0">
+              <a:schemeClr val="accent1"/>
+            </a:effectRef>
+            <a:fontRef idx="minor">
+              <a:schemeClr val="tx1"/>
+            </a:fontRef>
+          </p:style>
+        </p:cxnSp>
+        <p:cxnSp>
+          <p:nvCxnSpPr>
+            <p:cNvPr id="37" name="Straight Arrow Connector 36">
+              <a:extLst>
+                <a:ext uri="{FF2B5EF4-FFF2-40B4-BE49-F238E27FC236}">
+                  <a16:creationId xmlns:a16="http://schemas.microsoft.com/office/drawing/2014/main" id="{285CD5EE-A33A-0141-9904-C7E27D70DB89}"/>
+                </a:ext>
+              </a:extLst>
+            </p:cNvPr>
+            <p:cNvCxnSpPr>
+              <a:cxnSpLocks/>
+            </p:cNvCxnSpPr>
+            <p:nvPr/>
+          </p:nvCxnSpPr>
+          <p:spPr>
+            <a:xfrm>
+              <a:off x="5651155" y="5313400"/>
+              <a:ext cx="0" cy="350799"/>
+            </a:xfrm>
+            <a:prstGeom prst="straightConnector1">
+              <a:avLst/>
+            </a:prstGeom>
+            <a:ln w="31750">
+              <a:solidFill>
+                <a:srgbClr val="C00000"/>
+              </a:solidFill>
+              <a:tailEnd type="triangle"/>
+            </a:ln>
+          </p:spPr>
+          <p:style>
+            <a:lnRef idx="1">
+              <a:schemeClr val="accent1"/>
+            </a:lnRef>
+            <a:fillRef idx="0">
+              <a:schemeClr val="accent1"/>
+            </a:fillRef>
+            <a:effectRef idx="0">
+              <a:schemeClr val="accent1"/>
+            </a:effectRef>
+            <a:fontRef idx="minor">
+              <a:schemeClr val="tx1"/>
+            </a:fontRef>
+          </p:style>
+        </p:cxnSp>
+        <p:cxnSp>
+          <p:nvCxnSpPr>
+            <p:cNvPr id="38" name="Straight Arrow Connector 37">
+              <a:extLst>
+                <a:ext uri="{FF2B5EF4-FFF2-40B4-BE49-F238E27FC236}">
+                  <a16:creationId xmlns:a16="http://schemas.microsoft.com/office/drawing/2014/main" id="{A6674FEF-ECBE-ED4D-96EA-43E0CA46B57A}"/>
+                </a:ext>
+              </a:extLst>
+            </p:cNvPr>
+            <p:cNvCxnSpPr>
+              <a:cxnSpLocks/>
+              <a:endCxn id="13" idx="0"/>
+            </p:cNvCxnSpPr>
+            <p:nvPr/>
+          </p:nvCxnSpPr>
+          <p:spPr>
+            <a:xfrm>
+              <a:off x="7749745" y="5313400"/>
+              <a:ext cx="1" cy="334670"/>
+            </a:xfrm>
+            <a:prstGeom prst="straightConnector1">
+              <a:avLst/>
+            </a:prstGeom>
+            <a:ln w="31750">
+              <a:solidFill>
+                <a:srgbClr val="C00000"/>
+              </a:solidFill>
+              <a:tailEnd type="triangle"/>
+            </a:ln>
+          </p:spPr>
+          <p:style>
+            <a:lnRef idx="1">
+              <a:schemeClr val="accent1"/>
+            </a:lnRef>
+            <a:fillRef idx="0">
+              <a:schemeClr val="accent1"/>
+            </a:fillRef>
+            <a:effectRef idx="0">
+              <a:schemeClr val="accent1"/>
+            </a:effectRef>
+            <a:fontRef idx="minor">
+              <a:schemeClr val="tx1"/>
+            </a:fontRef>
+          </p:style>
+        </p:cxnSp>
+        <p:cxnSp>
+          <p:nvCxnSpPr>
+            <p:cNvPr id="39" name="Straight Connector 38">
+              <a:extLst>
+                <a:ext uri="{FF2B5EF4-FFF2-40B4-BE49-F238E27FC236}">
+                  <a16:creationId xmlns:a16="http://schemas.microsoft.com/office/drawing/2014/main" id="{A0449B51-1299-7B45-A5ED-F9136FF3FA01}"/>
+                </a:ext>
+              </a:extLst>
+            </p:cNvPr>
+            <p:cNvCxnSpPr/>
+            <p:nvPr/>
+          </p:nvCxnSpPr>
+          <p:spPr>
+            <a:xfrm>
+              <a:off x="3552565" y="5313400"/>
+              <a:ext cx="4197180" cy="0"/>
+            </a:xfrm>
+            <a:prstGeom prst="line">
+              <a:avLst/>
+            </a:prstGeom>
+            <a:ln w="31750">
+              <a:solidFill>
+                <a:srgbClr val="C00000"/>
+              </a:solidFill>
+            </a:ln>
+          </p:spPr>
+          <p:style>
+            <a:lnRef idx="1">
+              <a:schemeClr val="accent1"/>
+            </a:lnRef>
+            <a:fillRef idx="0">
+              <a:schemeClr val="accent1"/>
+            </a:fillRef>
+            <a:effectRef idx="0">
+              <a:schemeClr val="accent1"/>
+            </a:effectRef>
+            <a:fontRef idx="minor">
+              <a:schemeClr val="tx1"/>
+            </a:fontRef>
+          </p:style>
+        </p:cxnSp>
+        <p:cxnSp>
+          <p:nvCxnSpPr>
+            <p:cNvPr id="40" name="Straight Arrow Connector 39">
+              <a:extLst>
+                <a:ext uri="{FF2B5EF4-FFF2-40B4-BE49-F238E27FC236}">
+                  <a16:creationId xmlns:a16="http://schemas.microsoft.com/office/drawing/2014/main" id="{419F76FD-308F-9143-A1C6-52D3CF364775}"/>
+                </a:ext>
+              </a:extLst>
+            </p:cNvPr>
+            <p:cNvCxnSpPr/>
+            <p:nvPr/>
+          </p:nvCxnSpPr>
+          <p:spPr>
+            <a:xfrm flipH="1">
+              <a:off x="5651154" y="5071747"/>
+              <a:ext cx="1" cy="239607"/>
+            </a:xfrm>
+            <a:prstGeom prst="straightConnector1">
+              <a:avLst/>
+            </a:prstGeom>
+            <a:ln w="31750">
+              <a:solidFill>
+                <a:srgbClr val="C00000"/>
+              </a:solidFill>
+              <a:tailEnd type="triangle"/>
+            </a:ln>
+          </p:spPr>
+          <p:style>
+            <a:lnRef idx="1">
+              <a:schemeClr val="accent1"/>
+            </a:lnRef>
+            <a:fillRef idx="0">
+              <a:schemeClr val="accent1"/>
+            </a:fillRef>
+            <a:effectRef idx="0">
+              <a:schemeClr val="accent1"/>
+            </a:effectRef>
+            <a:fontRef idx="minor">
+              <a:schemeClr val="tx1"/>
+            </a:fontRef>
+          </p:style>
+        </p:cxnSp>
+        <p:cxnSp>
+          <p:nvCxnSpPr>
+            <p:cNvPr id="41" name="Straight Arrow Connector 40">
+              <a:extLst>
+                <a:ext uri="{FF2B5EF4-FFF2-40B4-BE49-F238E27FC236}">
+                  <a16:creationId xmlns:a16="http://schemas.microsoft.com/office/drawing/2014/main" id="{FC9ECC92-07E7-824B-8C77-16F5E8CC366B}"/>
+                </a:ext>
+              </a:extLst>
+            </p:cNvPr>
+            <p:cNvCxnSpPr>
+              <a:cxnSpLocks/>
+              <a:stCxn id="35" idx="2"/>
+            </p:cNvCxnSpPr>
+            <p:nvPr/>
+          </p:nvCxnSpPr>
+          <p:spPr>
+            <a:xfrm>
+              <a:off x="3214895" y="5030236"/>
+              <a:ext cx="0" cy="517871"/>
+            </a:xfrm>
+            <a:prstGeom prst="straightConnector1">
+              <a:avLst/>
+            </a:prstGeom>
+            <a:ln w="31750">
+              <a:solidFill>
+                <a:srgbClr val="C00000"/>
+              </a:solidFill>
+              <a:tailEnd type="triangle"/>
+            </a:ln>
+          </p:spPr>
+          <p:style>
+            <a:lnRef idx="1">
+              <a:schemeClr val="accent1"/>
+            </a:lnRef>
+            <a:fillRef idx="0">
+              <a:schemeClr val="accent1"/>
+            </a:fillRef>
+            <a:effectRef idx="0">
+              <a:schemeClr val="accent1"/>
+            </a:effectRef>
+            <a:fontRef idx="minor">
+              <a:schemeClr val="tx1"/>
+            </a:fontRef>
+          </p:style>
+        </p:cxnSp>
+        <p:pic>
+          <p:nvPicPr>
+            <p:cNvPr id="42" name="Picture 14">
+              <a:extLst>
+                <a:ext uri="{FF2B5EF4-FFF2-40B4-BE49-F238E27FC236}">
+                  <a16:creationId xmlns:a16="http://schemas.microsoft.com/office/drawing/2014/main" id="{435C7769-900C-5A47-98F4-A669CB5D05AC}"/>
+                </a:ext>
+              </a:extLst>
+            </p:cNvPr>
+            <p:cNvPicPr>
+              <a:picLocks noChangeAspect="1" noChangeArrowheads="1"/>
+            </p:cNvPicPr>
+            <p:nvPr/>
+          </p:nvPicPr>
+          <p:blipFill>
+            <a:blip r:embed="rId3">
+              <a:extLst>
+                <a:ext uri="{28A0092B-C50C-407E-A947-70E740481C1C}">
+                  <a14:useLocalDpi xmlns:a14="http://schemas.microsoft.com/office/drawing/2010/main" val="0"/>
+                </a:ext>
+              </a:extLst>
+            </a:blip>
+            <a:srcRect/>
+            <a:stretch>
+              <a:fillRect/>
+            </a:stretch>
+          </p:blipFill>
+          <p:spPr bwMode="auto">
+            <a:xfrm flipH="1">
+              <a:off x="1900960" y="4439567"/>
+              <a:ext cx="609594" cy="609594"/>
+            </a:xfrm>
+            <a:prstGeom prst="rect">
+              <a:avLst/>
+            </a:prstGeom>
+            <a:noFill/>
+            <a:extLst>
+              <a:ext uri="{909E8E84-426E-40DD-AFC4-6F175D3DCCD1}">
+                <a14:hiddenFill xmlns:a14="http://schemas.microsoft.com/office/drawing/2010/main">
+                  <a:solidFill>
+                    <a:srgbClr val="FFFFFF"/>
+                  </a:solidFill>
+                </a14:hiddenFill>
+              </a:ext>
+            </a:extLst>
+          </p:spPr>
+        </p:pic>
+        <p:pic>
+          <p:nvPicPr>
+            <p:cNvPr id="43" name="Picture 42">
+              <a:extLst>
+                <a:ext uri="{FF2B5EF4-FFF2-40B4-BE49-F238E27FC236}">
+                  <a16:creationId xmlns:a16="http://schemas.microsoft.com/office/drawing/2014/main" id="{D9D7205B-191F-F94F-B0B3-0ED92E7CF9BD}"/>
+                </a:ext>
+              </a:extLst>
+            </p:cNvPr>
+            <p:cNvPicPr>
+              <a:picLocks noChangeAspect="1"/>
+            </p:cNvPicPr>
+            <p:nvPr/>
+          </p:nvPicPr>
+          <p:blipFill>
+            <a:blip r:embed="rId5"/>
+            <a:stretch>
+              <a:fillRect/>
+            </a:stretch>
+          </p:blipFill>
+          <p:spPr>
+            <a:xfrm>
+              <a:off x="4349573" y="306880"/>
+              <a:ext cx="543694" cy="543694"/>
+            </a:xfrm>
+            <a:prstGeom prst="rect">
+              <a:avLst/>
+            </a:prstGeom>
+          </p:spPr>
+        </p:pic>
+        <p:sp>
+          <p:nvSpPr>
+            <p:cNvPr id="44" name="Rectangle 43">
+              <a:extLst>
+                <a:ext uri="{FF2B5EF4-FFF2-40B4-BE49-F238E27FC236}">
+                  <a16:creationId xmlns:a16="http://schemas.microsoft.com/office/drawing/2014/main" id="{4B91D3F0-B7CA-D14F-B772-0AD0457E2D0F}"/>
+                </a:ext>
+              </a:extLst>
+            </p:cNvPr>
+            <p:cNvSpPr/>
+            <p:nvPr/>
+          </p:nvSpPr>
+          <p:spPr>
+            <a:xfrm>
+              <a:off x="646766" y="1092227"/>
+              <a:ext cx="9954155" cy="4118584"/>
+            </a:xfrm>
+            <a:prstGeom prst="rect">
+              <a:avLst/>
+            </a:prstGeom>
+            <a:solidFill>
+              <a:schemeClr val="lt1">
+                <a:alpha val="0"/>
+              </a:schemeClr>
+            </a:solidFill>
+            <a:ln w="25400">
+              <a:solidFill>
+                <a:schemeClr val="accent6">
+                  <a:lumMod val="60000"/>
+                  <a:lumOff val="40000"/>
+                </a:schemeClr>
+              </a:solidFill>
+              <a:prstDash val="dash"/>
+            </a:ln>
+          </p:spPr>
+          <p:style>
+            <a:lnRef idx="2">
+              <a:schemeClr val="accent3"/>
+            </a:lnRef>
+            <a:fillRef idx="1">
+              <a:schemeClr val="lt1"/>
+            </a:fillRef>
+            <a:effectRef idx="0">
+              <a:schemeClr val="accent3"/>
+            </a:effectRef>
+            <a:fontRef idx="minor">
+              <a:schemeClr val="dk1"/>
+            </a:fontRef>
+          </p:style>
+          <p:txBody>
+            <a:bodyPr rtlCol="0" anchor="ctr"/>
+            <a:lstStyle/>
+            <a:p>
+              <a:pPr algn="ctr"/>
+              <a:endParaRPr lang="en-US" dirty="0">
+                <a:solidFill>
+                  <a:srgbClr val="FF0000"/>
+                </a:solidFill>
+              </a:endParaRPr>
+            </a:p>
+          </p:txBody>
+        </p:sp>
+        <p:sp>
+          <p:nvSpPr>
+            <p:cNvPr id="45" name="Rectangle 44">
+              <a:extLst>
+                <a:ext uri="{FF2B5EF4-FFF2-40B4-BE49-F238E27FC236}">
+                  <a16:creationId xmlns:a16="http://schemas.microsoft.com/office/drawing/2014/main" id="{56C8FE8B-D9E2-FB47-AEB2-02648A4C5382}"/>
+                </a:ext>
+              </a:extLst>
+            </p:cNvPr>
+            <p:cNvSpPr/>
+            <p:nvPr/>
+          </p:nvSpPr>
+          <p:spPr>
+            <a:xfrm>
+              <a:off x="646750" y="5568595"/>
+              <a:ext cx="9954171" cy="1143502"/>
+            </a:xfrm>
+            <a:prstGeom prst="rect">
+              <a:avLst/>
+            </a:prstGeom>
+            <a:solidFill>
+              <a:schemeClr val="lt1">
+                <a:alpha val="0"/>
+              </a:schemeClr>
+            </a:solidFill>
+            <a:ln w="25400">
+              <a:solidFill>
+                <a:schemeClr val="accent4"/>
+              </a:solidFill>
+              <a:prstDash val="lgDash"/>
+            </a:ln>
+          </p:spPr>
+          <p:style>
+            <a:lnRef idx="2">
+              <a:schemeClr val="accent3"/>
+            </a:lnRef>
+            <a:fillRef idx="1">
+              <a:schemeClr val="lt1"/>
+            </a:fillRef>
+            <a:effectRef idx="0">
+              <a:schemeClr val="accent3"/>
+            </a:effectRef>
+            <a:fontRef idx="minor">
+              <a:schemeClr val="dk1"/>
+            </a:fontRef>
+          </p:style>
+          <p:txBody>
+            <a:bodyPr rtlCol="0" anchor="ctr"/>
+            <a:lstStyle/>
+            <a:p>
+              <a:pPr algn="ctr"/>
+              <a:endParaRPr lang="en-US" dirty="0">
+                <a:solidFill>
+                  <a:srgbClr val="FF0000"/>
+                </a:solidFill>
+              </a:endParaRPr>
+            </a:p>
+          </p:txBody>
+        </p:sp>
+        <p:pic>
+          <p:nvPicPr>
+            <p:cNvPr id="46" name="Picture 22" descr="Image for post">
+              <a:extLst>
+                <a:ext uri="{FF2B5EF4-FFF2-40B4-BE49-F238E27FC236}">
+                  <a16:creationId xmlns:a16="http://schemas.microsoft.com/office/drawing/2014/main" id="{3C796B09-2873-B145-93C7-39C230785583}"/>
+                </a:ext>
+              </a:extLst>
+            </p:cNvPr>
+            <p:cNvPicPr>
+              <a:picLocks noChangeAspect="1" noChangeArrowheads="1"/>
+            </p:cNvPicPr>
+            <p:nvPr/>
+          </p:nvPicPr>
+          <p:blipFill>
+            <a:blip r:embed="rId6">
+              <a:extLst>
+                <a:ext uri="{28A0092B-C50C-407E-A947-70E740481C1C}">
+                  <a14:useLocalDpi xmlns:a14="http://schemas.microsoft.com/office/drawing/2010/main" val="0"/>
+                </a:ext>
+              </a:extLst>
+            </a:blip>
+            <a:srcRect/>
+            <a:stretch>
+              <a:fillRect/>
+            </a:stretch>
+          </p:blipFill>
+          <p:spPr bwMode="auto">
+            <a:xfrm>
+              <a:off x="8759358" y="1103327"/>
+              <a:ext cx="1759743" cy="938530"/>
+            </a:xfrm>
+            <a:prstGeom prst="rect">
+              <a:avLst/>
+            </a:prstGeom>
+            <a:noFill/>
+            <a:extLst>
+              <a:ext uri="{909E8E84-426E-40DD-AFC4-6F175D3DCCD1}">
+                <a14:hiddenFill xmlns:a14="http://schemas.microsoft.com/office/drawing/2010/main">
+                  <a:solidFill>
+                    <a:srgbClr val="FFFFFF"/>
+                  </a:solidFill>
+                </a14:hiddenFill>
+              </a:ext>
+            </a:extLst>
+          </p:spPr>
+        </p:pic>
+        <p:pic>
+          <p:nvPicPr>
+            <p:cNvPr id="47" name="Picture 24" descr="The new Slack logo: Best, worst and funniest reactions to a B2B rebrand -  B2B News Network">
+              <a:extLst>
+                <a:ext uri="{FF2B5EF4-FFF2-40B4-BE49-F238E27FC236}">
+                  <a16:creationId xmlns:a16="http://schemas.microsoft.com/office/drawing/2014/main" id="{24178234-E6F0-8D4F-956C-E7C4B3C9A684}"/>
+                </a:ext>
+              </a:extLst>
+            </p:cNvPr>
+            <p:cNvPicPr>
+              <a:picLocks noChangeAspect="1" noChangeArrowheads="1"/>
+            </p:cNvPicPr>
+            <p:nvPr/>
+          </p:nvPicPr>
+          <p:blipFill>
+            <a:blip r:embed="rId7">
+              <a:extLst>
+                <a:ext uri="{28A0092B-C50C-407E-A947-70E740481C1C}">
+                  <a14:useLocalDpi xmlns:a14="http://schemas.microsoft.com/office/drawing/2010/main" val="0"/>
+                </a:ext>
+              </a:extLst>
+            </a:blip>
+            <a:srcRect/>
+            <a:stretch>
+              <a:fillRect/>
+            </a:stretch>
+          </p:blipFill>
+          <p:spPr bwMode="auto">
+            <a:xfrm>
+              <a:off x="10700978" y="2388278"/>
+              <a:ext cx="1376333" cy="714978"/>
+            </a:xfrm>
+            <a:prstGeom prst="rect">
+              <a:avLst/>
+            </a:prstGeom>
+            <a:noFill/>
+            <a:extLst>
+              <a:ext uri="{909E8E84-426E-40DD-AFC4-6F175D3DCCD1}">
+                <a14:hiddenFill xmlns:a14="http://schemas.microsoft.com/office/drawing/2010/main">
+                  <a:solidFill>
+                    <a:srgbClr val="FFFFFF"/>
+                  </a:solidFill>
+                </a14:hiddenFill>
+              </a:ext>
+            </a:extLst>
+          </p:spPr>
+        </p:pic>
+        <p:cxnSp>
+          <p:nvCxnSpPr>
+            <p:cNvPr id="48" name="Straight Arrow Connector 47">
+              <a:extLst>
+                <a:ext uri="{FF2B5EF4-FFF2-40B4-BE49-F238E27FC236}">
+                  <a16:creationId xmlns:a16="http://schemas.microsoft.com/office/drawing/2014/main" id="{08060C37-1EDF-A34B-8F97-A2CF671DAFE0}"/>
+                </a:ext>
+              </a:extLst>
+            </p:cNvPr>
+            <p:cNvCxnSpPr/>
+            <p:nvPr/>
+          </p:nvCxnSpPr>
+          <p:spPr>
+            <a:xfrm>
+              <a:off x="3552565" y="2599036"/>
+              <a:ext cx="5693035" cy="0"/>
+            </a:xfrm>
+            <a:prstGeom prst="straightConnector1">
+              <a:avLst/>
+            </a:prstGeom>
+            <a:ln w="25400">
+              <a:solidFill>
+                <a:srgbClr val="00B0F0"/>
+              </a:solidFill>
+              <a:tailEnd type="triangle"/>
+            </a:ln>
+          </p:spPr>
+          <p:style>
+            <a:lnRef idx="1">
+              <a:schemeClr val="accent1"/>
+            </a:lnRef>
+            <a:fillRef idx="0">
+              <a:schemeClr val="accent1"/>
+            </a:fillRef>
+            <a:effectRef idx="0">
+              <a:schemeClr val="accent1"/>
+            </a:effectRef>
+            <a:fontRef idx="minor">
+              <a:schemeClr val="tx1"/>
+            </a:fontRef>
+          </p:style>
+        </p:cxnSp>
+        <p:cxnSp>
+          <p:nvCxnSpPr>
+            <p:cNvPr id="49" name="Straight Arrow Connector 48">
+              <a:extLst>
+                <a:ext uri="{FF2B5EF4-FFF2-40B4-BE49-F238E27FC236}">
+                  <a16:creationId xmlns:a16="http://schemas.microsoft.com/office/drawing/2014/main" id="{97D565A5-69EC-0C43-B52B-77470C8A7565}"/>
+                </a:ext>
+              </a:extLst>
+            </p:cNvPr>
+            <p:cNvCxnSpPr>
+              <a:cxnSpLocks/>
+            </p:cNvCxnSpPr>
+            <p:nvPr/>
+          </p:nvCxnSpPr>
+          <p:spPr>
+            <a:xfrm>
+              <a:off x="6435809" y="4730940"/>
+              <a:ext cx="2809791" cy="0"/>
+            </a:xfrm>
+            <a:prstGeom prst="straightConnector1">
+              <a:avLst/>
+            </a:prstGeom>
+            <a:ln w="25400">
+              <a:solidFill>
+                <a:srgbClr val="00B0F0"/>
+              </a:solidFill>
+              <a:tailEnd type="triangle"/>
+            </a:ln>
+          </p:spPr>
+          <p:style>
+            <a:lnRef idx="1">
+              <a:schemeClr val="accent1"/>
+            </a:lnRef>
+            <a:fillRef idx="0">
+              <a:schemeClr val="accent1"/>
+            </a:fillRef>
+            <a:effectRef idx="0">
+              <a:schemeClr val="accent1"/>
+            </a:effectRef>
+            <a:fontRef idx="minor">
+              <a:schemeClr val="tx1"/>
+            </a:fontRef>
+          </p:style>
+        </p:cxnSp>
+        <p:cxnSp>
+          <p:nvCxnSpPr>
+            <p:cNvPr id="50" name="Straight Connector 49">
+              <a:extLst>
+                <a:ext uri="{FF2B5EF4-FFF2-40B4-BE49-F238E27FC236}">
+                  <a16:creationId xmlns:a16="http://schemas.microsoft.com/office/drawing/2014/main" id="{56EABCB1-D4CB-0447-9118-847FA9C8DD92}"/>
+                </a:ext>
+              </a:extLst>
+            </p:cNvPr>
+            <p:cNvCxnSpPr/>
+            <p:nvPr/>
+          </p:nvCxnSpPr>
+          <p:spPr>
+            <a:xfrm flipV="1">
+              <a:off x="9245600" y="2630957"/>
+              <a:ext cx="0" cy="2104447"/>
+            </a:xfrm>
+            <a:prstGeom prst="line">
+              <a:avLst/>
+            </a:prstGeom>
+            <a:ln w="25400">
+              <a:solidFill>
+                <a:srgbClr val="00B0F0"/>
+              </a:solidFill>
+            </a:ln>
+          </p:spPr>
+          <p:style>
+            <a:lnRef idx="1">
+              <a:schemeClr val="accent1"/>
+            </a:lnRef>
+            <a:fillRef idx="0">
+              <a:schemeClr val="accent1"/>
+            </a:fillRef>
+            <a:effectRef idx="0">
+              <a:schemeClr val="accent1"/>
+            </a:effectRef>
+            <a:fontRef idx="minor">
+              <a:schemeClr val="tx1"/>
+            </a:fontRef>
+          </p:style>
+        </p:cxnSp>
+        <p:cxnSp>
+          <p:nvCxnSpPr>
+            <p:cNvPr id="51" name="Straight Connector 50">
+              <a:extLst>
+                <a:ext uri="{FF2B5EF4-FFF2-40B4-BE49-F238E27FC236}">
+                  <a16:creationId xmlns:a16="http://schemas.microsoft.com/office/drawing/2014/main" id="{33C75E80-17A6-5642-9154-14A5DBD1FCD5}"/>
+                </a:ext>
+              </a:extLst>
+            </p:cNvPr>
+            <p:cNvCxnSpPr>
+              <a:cxnSpLocks/>
+            </p:cNvCxnSpPr>
+            <p:nvPr/>
+          </p:nvCxnSpPr>
+          <p:spPr>
+            <a:xfrm>
+              <a:off x="9245600" y="3683180"/>
+              <a:ext cx="2143544" cy="0"/>
+            </a:xfrm>
+            <a:prstGeom prst="line">
+              <a:avLst/>
+            </a:prstGeom>
+            <a:ln w="25400">
+              <a:solidFill>
+                <a:srgbClr val="00B0F0"/>
+              </a:solidFill>
+            </a:ln>
+          </p:spPr>
+          <p:style>
+            <a:lnRef idx="1">
+              <a:schemeClr val="accent1"/>
+            </a:lnRef>
+            <a:fillRef idx="0">
+              <a:schemeClr val="accent1"/>
+            </a:fillRef>
+            <a:effectRef idx="0">
+              <a:schemeClr val="accent1"/>
+            </a:effectRef>
+            <a:fontRef idx="minor">
+              <a:schemeClr val="tx1"/>
+            </a:fontRef>
+          </p:style>
+        </p:cxnSp>
+        <p:cxnSp>
+          <p:nvCxnSpPr>
+            <p:cNvPr id="52" name="Straight Arrow Connector 51">
+              <a:extLst>
+                <a:ext uri="{FF2B5EF4-FFF2-40B4-BE49-F238E27FC236}">
+                  <a16:creationId xmlns:a16="http://schemas.microsoft.com/office/drawing/2014/main" id="{1EF0FF93-3449-5B43-81BF-1258E2A5B9AD}"/>
+                </a:ext>
+              </a:extLst>
+            </p:cNvPr>
+            <p:cNvCxnSpPr>
+              <a:cxnSpLocks/>
+              <a:endCxn id="47" idx="2"/>
+            </p:cNvCxnSpPr>
+            <p:nvPr/>
+          </p:nvCxnSpPr>
+          <p:spPr>
+            <a:xfrm flipV="1">
+              <a:off x="11389144" y="3103256"/>
+              <a:ext cx="1" cy="579924"/>
+            </a:xfrm>
+            <a:prstGeom prst="straightConnector1">
+              <a:avLst/>
+            </a:prstGeom>
+            <a:ln w="25400">
+              <a:solidFill>
+                <a:srgbClr val="00B0F0"/>
+              </a:solidFill>
+              <a:tailEnd type="triangle"/>
+            </a:ln>
+          </p:spPr>
+          <p:style>
+            <a:lnRef idx="1">
+              <a:schemeClr val="accent1"/>
+            </a:lnRef>
+            <a:fillRef idx="0">
+              <a:schemeClr val="accent1"/>
+            </a:fillRef>
+            <a:effectRef idx="0">
+              <a:schemeClr val="accent1"/>
+            </a:effectRef>
+            <a:fontRef idx="minor">
+              <a:schemeClr val="tx1"/>
+            </a:fontRef>
+          </p:style>
+        </p:cxnSp>
+        <p:sp>
+          <p:nvSpPr>
+            <p:cNvPr id="53" name="TextBox 52">
+              <a:extLst>
+                <a:ext uri="{FF2B5EF4-FFF2-40B4-BE49-F238E27FC236}">
+                  <a16:creationId xmlns:a16="http://schemas.microsoft.com/office/drawing/2014/main" id="{8315D20D-78E6-7741-802B-1D285BC32E83}"/>
+                </a:ext>
+              </a:extLst>
+            </p:cNvPr>
+            <p:cNvSpPr txBox="1"/>
+            <p:nvPr/>
+          </p:nvSpPr>
+          <p:spPr>
+            <a:xfrm>
+              <a:off x="9310455" y="3721030"/>
+              <a:ext cx="1463531" cy="646331"/>
+            </a:xfrm>
+            <a:prstGeom prst="rect">
+              <a:avLst/>
+            </a:prstGeom>
+            <a:noFill/>
+          </p:spPr>
+          <p:txBody>
+            <a:bodyPr wrap="square" rtlCol="0">
+              <a:spAutoFit/>
+            </a:bodyPr>
+            <a:lstStyle/>
+            <a:p>
+              <a:r>
+                <a:rPr lang="en-US" dirty="0">
+                  <a:solidFill>
+                    <a:srgbClr val="FF0000"/>
+                  </a:solidFill>
+                </a:rPr>
+                <a:t>Slack </a:t>
+              </a:r>
+            </a:p>
+            <a:p>
+              <a:r>
+                <a:rPr lang="en-US" dirty="0">
+                  <a:solidFill>
+                    <a:srgbClr val="FF0000"/>
+                  </a:solidFill>
+                </a:rPr>
+                <a:t>notifications</a:t>
+              </a:r>
+            </a:p>
+          </p:txBody>
+        </p:sp>
+        <p:pic>
+          <p:nvPicPr>
+            <p:cNvPr id="54" name="Picture 26" descr="scrapy-big-logo">
+              <a:extLst>
+                <a:ext uri="{FF2B5EF4-FFF2-40B4-BE49-F238E27FC236}">
+                  <a16:creationId xmlns:a16="http://schemas.microsoft.com/office/drawing/2014/main" id="{4D885E78-34C1-C64D-A4B4-D6A0AD77F4EE}"/>
+                </a:ext>
+              </a:extLst>
+            </p:cNvPr>
+            <p:cNvPicPr>
+              <a:picLocks noChangeAspect="1" noChangeArrowheads="1"/>
+            </p:cNvPicPr>
+            <p:nvPr/>
+          </p:nvPicPr>
+          <p:blipFill>
+            <a:blip r:embed="rId8">
+              <a:extLst>
+                <a:ext uri="{28A0092B-C50C-407E-A947-70E740481C1C}">
+                  <a14:useLocalDpi xmlns:a14="http://schemas.microsoft.com/office/drawing/2010/main" val="0"/>
+                </a:ext>
+              </a:extLst>
+            </a:blip>
+            <a:srcRect/>
+            <a:stretch>
+              <a:fillRect/>
+            </a:stretch>
+          </p:blipFill>
+          <p:spPr bwMode="auto">
+            <a:xfrm>
+              <a:off x="4101057" y="1982296"/>
+              <a:ext cx="478113" cy="609595"/>
+            </a:xfrm>
+            <a:prstGeom prst="rect">
+              <a:avLst/>
+            </a:prstGeom>
+            <a:noFill/>
+            <a:extLst>
+              <a:ext uri="{909E8E84-426E-40DD-AFC4-6F175D3DCCD1}">
+                <a14:hiddenFill xmlns:a14="http://schemas.microsoft.com/office/drawing/2010/main">
+                  <a:solidFill>
+                    <a:srgbClr val="FFFFFF"/>
+                  </a:solidFill>
+                </a14:hiddenFill>
+              </a:ext>
+            </a:extLst>
+          </p:spPr>
+        </p:pic>
+        <p:pic>
+          <p:nvPicPr>
+            <p:cNvPr id="55" name="Picture 26" descr="scrapy-big-logo">
+              <a:extLst>
+                <a:ext uri="{FF2B5EF4-FFF2-40B4-BE49-F238E27FC236}">
+                  <a16:creationId xmlns:a16="http://schemas.microsoft.com/office/drawing/2014/main" id="{0FDBD032-3B40-0445-9525-B5525E534123}"/>
+                </a:ext>
+              </a:extLst>
+            </p:cNvPr>
+            <p:cNvPicPr>
+              <a:picLocks noChangeAspect="1" noChangeArrowheads="1"/>
+            </p:cNvPicPr>
+            <p:nvPr/>
+          </p:nvPicPr>
+          <p:blipFill>
+            <a:blip r:embed="rId8">
+              <a:extLst>
+                <a:ext uri="{28A0092B-C50C-407E-A947-70E740481C1C}">
+                  <a14:useLocalDpi xmlns:a14="http://schemas.microsoft.com/office/drawing/2010/main" val="0"/>
+                </a:ext>
+              </a:extLst>
+            </a:blip>
+            <a:srcRect/>
+            <a:stretch>
+              <a:fillRect/>
+            </a:stretch>
+          </p:blipFill>
+          <p:spPr bwMode="auto">
+            <a:xfrm>
+              <a:off x="6178315" y="1957721"/>
+              <a:ext cx="478113" cy="609595"/>
+            </a:xfrm>
+            <a:prstGeom prst="rect">
+              <a:avLst/>
+            </a:prstGeom>
+            <a:noFill/>
+            <a:extLst>
+              <a:ext uri="{909E8E84-426E-40DD-AFC4-6F175D3DCCD1}">
+                <a14:hiddenFill xmlns:a14="http://schemas.microsoft.com/office/drawing/2010/main">
+                  <a:solidFill>
+                    <a:srgbClr val="FFFFFF"/>
+                  </a:solidFill>
+                </a14:hiddenFill>
+              </a:ext>
+            </a:extLst>
+          </p:spPr>
+        </p:pic>
+        <p:pic>
+          <p:nvPicPr>
+            <p:cNvPr id="56" name="Picture 26" descr="scrapy-big-logo">
+              <a:extLst>
+                <a:ext uri="{FF2B5EF4-FFF2-40B4-BE49-F238E27FC236}">
+                  <a16:creationId xmlns:a16="http://schemas.microsoft.com/office/drawing/2014/main" id="{2E16C604-6A84-D349-BAFC-489AC046CADF}"/>
+                </a:ext>
+              </a:extLst>
+            </p:cNvPr>
+            <p:cNvPicPr>
+              <a:picLocks noChangeAspect="1" noChangeArrowheads="1"/>
+            </p:cNvPicPr>
+            <p:nvPr/>
+          </p:nvPicPr>
+          <p:blipFill>
+            <a:blip r:embed="rId8">
+              <a:extLst>
+                <a:ext uri="{28A0092B-C50C-407E-A947-70E740481C1C}">
+                  <a14:useLocalDpi xmlns:a14="http://schemas.microsoft.com/office/drawing/2010/main" val="0"/>
+                </a:ext>
+              </a:extLst>
+            </a:blip>
+            <a:srcRect/>
+            <a:stretch>
+              <a:fillRect/>
+            </a:stretch>
+          </p:blipFill>
+          <p:spPr bwMode="auto">
+            <a:xfrm>
+              <a:off x="8295342" y="1946869"/>
+              <a:ext cx="478113" cy="609595"/>
+            </a:xfrm>
+            <a:prstGeom prst="rect">
+              <a:avLst/>
+            </a:prstGeom>
+            <a:noFill/>
+            <a:extLst>
+              <a:ext uri="{909E8E84-426E-40DD-AFC4-6F175D3DCCD1}">
+                <a14:hiddenFill xmlns:a14="http://schemas.microsoft.com/office/drawing/2010/main">
+                  <a:solidFill>
+                    <a:srgbClr val="FFFFFF"/>
+                  </a:solidFill>
+                </a14:hiddenFill>
+              </a:ext>
+            </a:extLst>
+          </p:spPr>
+        </p:pic>
+        <p:sp>
+          <p:nvSpPr>
+            <p:cNvPr id="57" name="Left Brace 56">
+              <a:extLst>
+                <a:ext uri="{FF2B5EF4-FFF2-40B4-BE49-F238E27FC236}">
+                  <a16:creationId xmlns:a16="http://schemas.microsoft.com/office/drawing/2014/main" id="{5603AB65-BA52-8340-81A5-5D00EF4689D5}"/>
+                </a:ext>
+              </a:extLst>
+            </p:cNvPr>
+            <p:cNvSpPr/>
+            <p:nvPr/>
+          </p:nvSpPr>
+          <p:spPr>
+            <a:xfrm>
+              <a:off x="1510256" y="4439567"/>
+              <a:ext cx="207170" cy="771244"/>
+            </a:xfrm>
+            <a:prstGeom prst="leftBrace">
+              <a:avLst/>
+            </a:prstGeom>
+            <a:ln w="19050">
+              <a:solidFill>
+                <a:srgbClr val="FF0000"/>
+              </a:solidFill>
+            </a:ln>
+          </p:spPr>
+          <p:style>
+            <a:lnRef idx="1">
+              <a:schemeClr val="dk1"/>
+            </a:lnRef>
+            <a:fillRef idx="0">
+              <a:schemeClr val="dk1"/>
+            </a:fillRef>
+            <a:effectRef idx="0">
+              <a:schemeClr val="dk1"/>
+            </a:effectRef>
+            <a:fontRef idx="minor">
+              <a:schemeClr val="tx1"/>
+            </a:fontRef>
+          </p:style>
+          <p:txBody>
+            <a:bodyPr rtlCol="0" anchor="ctr"/>
+            <a:lstStyle/>
+            <a:p>
+              <a:pPr algn="ctr"/>
+              <a:endParaRPr lang="en-US">
+                <a:solidFill>
+                  <a:srgbClr val="FF0000"/>
+                </a:solidFill>
+              </a:endParaRPr>
+            </a:p>
+          </p:txBody>
+        </p:sp>
+        <p:sp>
+          <p:nvSpPr>
+            <p:cNvPr id="58" name="Left Brace 57">
+              <a:extLst>
+                <a:ext uri="{FF2B5EF4-FFF2-40B4-BE49-F238E27FC236}">
+                  <a16:creationId xmlns:a16="http://schemas.microsoft.com/office/drawing/2014/main" id="{526FCD2D-9E99-C548-9909-62BBBA4E87CF}"/>
+                </a:ext>
+              </a:extLst>
+            </p:cNvPr>
+            <p:cNvSpPr/>
+            <p:nvPr/>
+          </p:nvSpPr>
+          <p:spPr>
+            <a:xfrm>
+              <a:off x="1721360" y="4430607"/>
+              <a:ext cx="224479" cy="2227618"/>
+            </a:xfrm>
+            <a:prstGeom prst="leftBrace">
+              <a:avLst/>
+            </a:prstGeom>
+            <a:ln w="19050">
+              <a:solidFill>
+                <a:srgbClr val="FF0000"/>
+              </a:solidFill>
+            </a:ln>
+          </p:spPr>
+          <p:style>
+            <a:lnRef idx="1">
+              <a:schemeClr val="dk1"/>
+            </a:lnRef>
+            <a:fillRef idx="0">
+              <a:schemeClr val="dk1"/>
+            </a:fillRef>
+            <a:effectRef idx="0">
+              <a:schemeClr val="dk1"/>
+            </a:effectRef>
+            <a:fontRef idx="minor">
+              <a:schemeClr val="tx1"/>
+            </a:fontRef>
+          </p:style>
+          <p:txBody>
+            <a:bodyPr rtlCol="0" anchor="ctr"/>
+            <a:lstStyle/>
+            <a:p>
+              <a:pPr algn="ctr"/>
+              <a:endParaRPr lang="en-US">
+                <a:solidFill>
+                  <a:srgbClr val="FF0000"/>
+                </a:solidFill>
+              </a:endParaRPr>
+            </a:p>
+          </p:txBody>
+        </p:sp>
+        <p:sp>
+          <p:nvSpPr>
+            <p:cNvPr id="59" name="TextBox 58">
+              <a:extLst>
+                <a:ext uri="{FF2B5EF4-FFF2-40B4-BE49-F238E27FC236}">
+                  <a16:creationId xmlns:a16="http://schemas.microsoft.com/office/drawing/2014/main" id="{B58E4C7E-50FD-2047-937A-7E9F37D50166}"/>
+                </a:ext>
+              </a:extLst>
+            </p:cNvPr>
+            <p:cNvSpPr txBox="1"/>
+            <p:nvPr/>
+          </p:nvSpPr>
+          <p:spPr>
+            <a:xfrm>
+              <a:off x="636751" y="1946869"/>
+              <a:ext cx="834652" cy="369332"/>
+            </a:xfrm>
+            <a:prstGeom prst="rect">
+              <a:avLst/>
+            </a:prstGeom>
+            <a:noFill/>
+          </p:spPr>
+          <p:txBody>
+            <a:bodyPr wrap="none" rtlCol="0">
+              <a:spAutoFit/>
+            </a:bodyPr>
+            <a:lstStyle/>
+            <a:p>
+              <a:r>
+                <a:rPr lang="en-US" dirty="0">
+                  <a:solidFill>
+                    <a:srgbClr val="FF0000"/>
+                  </a:solidFill>
+                </a:rPr>
+                <a:t>Extract</a:t>
+              </a:r>
+            </a:p>
+          </p:txBody>
+        </p:sp>
+        <p:sp>
+          <p:nvSpPr>
+            <p:cNvPr id="60" name="TextBox 59">
+              <a:extLst>
+                <a:ext uri="{FF2B5EF4-FFF2-40B4-BE49-F238E27FC236}">
+                  <a16:creationId xmlns:a16="http://schemas.microsoft.com/office/drawing/2014/main" id="{131CB29A-C29B-3E4E-9C1F-7EBFB9A5BB4D}"/>
+                </a:ext>
+              </a:extLst>
+            </p:cNvPr>
+            <p:cNvSpPr txBox="1"/>
+            <p:nvPr/>
+          </p:nvSpPr>
+          <p:spPr>
+            <a:xfrm>
+              <a:off x="404883" y="4651777"/>
+              <a:ext cx="1130053" cy="369332"/>
+            </a:xfrm>
+            <a:prstGeom prst="rect">
+              <a:avLst/>
+            </a:prstGeom>
+            <a:noFill/>
+          </p:spPr>
+          <p:txBody>
+            <a:bodyPr wrap="none" rtlCol="0">
+              <a:spAutoFit/>
+            </a:bodyPr>
+            <a:lstStyle/>
+            <a:p>
+              <a:r>
+                <a:rPr lang="en-US" dirty="0">
+                  <a:solidFill>
+                    <a:srgbClr val="FF0000"/>
+                  </a:solidFill>
+                </a:rPr>
+                <a:t>Transform</a:t>
+              </a:r>
+            </a:p>
+          </p:txBody>
+        </p:sp>
+        <p:sp>
+          <p:nvSpPr>
+            <p:cNvPr id="61" name="TextBox 60">
+              <a:extLst>
+                <a:ext uri="{FF2B5EF4-FFF2-40B4-BE49-F238E27FC236}">
+                  <a16:creationId xmlns:a16="http://schemas.microsoft.com/office/drawing/2014/main" id="{37101CE7-4AC9-4D44-9727-A33AE322C929}"/>
+                </a:ext>
+              </a:extLst>
+            </p:cNvPr>
+            <p:cNvSpPr txBox="1"/>
+            <p:nvPr/>
+          </p:nvSpPr>
+          <p:spPr>
+            <a:xfrm>
+              <a:off x="1105249" y="5445517"/>
+              <a:ext cx="636713" cy="369332"/>
+            </a:xfrm>
+            <a:prstGeom prst="rect">
+              <a:avLst/>
+            </a:prstGeom>
+            <a:noFill/>
+          </p:spPr>
+          <p:txBody>
+            <a:bodyPr wrap="none" rtlCol="0">
+              <a:spAutoFit/>
+            </a:bodyPr>
+            <a:lstStyle/>
+            <a:p>
+              <a:r>
+                <a:rPr lang="en-US" dirty="0">
+                  <a:solidFill>
+                    <a:srgbClr val="FF0000"/>
+                  </a:solidFill>
+                </a:rPr>
+                <a:t>Load</a:t>
+              </a:r>
+            </a:p>
+          </p:txBody>
+        </p:sp>
+        <p:sp>
+          <p:nvSpPr>
+            <p:cNvPr id="62" name="Left Brace 61">
+              <a:extLst>
+                <a:ext uri="{FF2B5EF4-FFF2-40B4-BE49-F238E27FC236}">
+                  <a16:creationId xmlns:a16="http://schemas.microsoft.com/office/drawing/2014/main" id="{4473EC34-93B2-7446-A62B-09DA3D35EB39}"/>
+                </a:ext>
+              </a:extLst>
+            </p:cNvPr>
+            <p:cNvSpPr/>
+            <p:nvPr/>
+          </p:nvSpPr>
+          <p:spPr>
+            <a:xfrm>
+              <a:off x="1771061" y="282503"/>
+              <a:ext cx="180200" cy="3583085"/>
+            </a:xfrm>
+            <a:prstGeom prst="leftBrace">
+              <a:avLst/>
+            </a:prstGeom>
+            <a:ln w="19050">
+              <a:solidFill>
+                <a:srgbClr val="FF0000"/>
+              </a:solidFill>
+            </a:ln>
+          </p:spPr>
+          <p:style>
+            <a:lnRef idx="1">
+              <a:schemeClr val="dk1"/>
+            </a:lnRef>
+            <a:fillRef idx="0">
+              <a:schemeClr val="dk1"/>
+            </a:fillRef>
+            <a:effectRef idx="0">
+              <a:schemeClr val="dk1"/>
+            </a:effectRef>
+            <a:fontRef idx="minor">
+              <a:schemeClr val="tx1"/>
+            </a:fontRef>
+          </p:style>
+          <p:txBody>
+            <a:bodyPr rtlCol="0" anchor="ctr"/>
+            <a:lstStyle/>
+            <a:p>
+              <a:pPr algn="ctr"/>
+              <a:endParaRPr lang="en-US">
+                <a:solidFill>
+                  <a:srgbClr val="FF0000"/>
+                </a:solidFill>
+              </a:endParaRPr>
+            </a:p>
+          </p:txBody>
+        </p:sp>
+      </p:grpSp>
+    </p:spTree>
+    <p:extLst>
+      <p:ext uri="{BB962C8B-B14F-4D97-AF65-F5344CB8AC3E}">
+        <p14:creationId xmlns:p14="http://schemas.microsoft.com/office/powerpoint/2010/main" val="2502796257"/>
+      </p:ext>
+    </p:extLst>
+  </p:cSld>
+  <p:clrMapOvr>
+    <a:masterClrMapping/>
+  </p:clrMapOvr>
+</p:sld>
+</file>
+
+<file path=ppt/slides/slide6.xml><?xml version="1.0" encoding="utf-8"?>
 <p:sld xmlns:a="http://schemas.openxmlformats.org/drawingml/2006/main" xmlns:r="http://schemas.openxmlformats.org/officeDocument/2006/relationships" xmlns:p="http://schemas.openxmlformats.org/presentationml/2006/main">
   <p:cSld>
     <p:spTree>

</xml_diff>